<commit_message>
Added findings in ppt for what days of week are affected
</commit_message>
<xml_diff>
--- a/Hospital Analysis Overview & Findings.pptx
+++ b/Hospital Analysis Overview & Findings.pptx
@@ -4,11 +4,15 @@
   <p:sldMasterIdLst>
     <p:sldMasterId id="2147483687" r:id="rId1"/>
   </p:sldMasterIdLst>
+  <p:notesMasterIdLst>
+    <p:notesMasterId r:id="rId7"/>
+  </p:notesMasterIdLst>
   <p:sldIdLst>
     <p:sldId id="256" r:id="rId2"/>
     <p:sldId id="257" r:id="rId3"/>
     <p:sldId id="258" r:id="rId4"/>
     <p:sldId id="259" r:id="rId5"/>
+    <p:sldId id="260" r:id="rId6"/>
   </p:sldIdLst>
   <p:sldSz cx="12192000" cy="6858000"/>
   <p:notesSz cx="6858000" cy="9144000"/>
@@ -263,7 +267,7 @@
                   <a:bodyPr/>
                   <a:lstStyle/>
                   <a:p>
-                    <a:fld id="{097D0AEA-6E0D-453C-8E9D-71BFDAFCFEF1}" type="CELLRANGE">
+                    <a:fld id="{DB6347AD-0F14-4F5F-8695-17ECE89B9BF6}" type="CELLRANGE">
                       <a:rPr lang="en-US" baseline="0"/>
                       <a:pPr/>
                       <a:t>[CELLRANGE]</a:t>
@@ -272,7 +276,7 @@
                       <a:rPr lang="en-US" baseline="0"/>
                       <a:t>, </a:t>
                     </a:r>
-                    <a:fld id="{7B01E22C-70EE-4CAA-991A-EDF548FA5B2A}" type="CATEGORYNAME">
+                    <a:fld id="{4EF29741-6CD7-4841-89CD-2CC5F69EB401}" type="CATEGORYNAME">
                       <a:rPr lang="en-US" baseline="0"/>
                       <a:pPr/>
                       <a:t>[CATEGORY NAME]</a:t>
@@ -281,7 +285,7 @@
                       <a:rPr lang="en-US" baseline="0"/>
                       <a:t>, </a:t>
                     </a:r>
-                    <a:fld id="{91E328AA-D797-4040-BDB2-FD16AC33B1F2}" type="VALUE">
+                    <a:fld id="{E4C160FC-3F25-4CBC-B279-19FD552BCE6E}" type="VALUE">
                       <a:rPr lang="en-US" baseline="0"/>
                       <a:pPr/>
                       <a:t>[VALUE]</a:t>
@@ -316,7 +320,7 @@
                   <a:bodyPr/>
                   <a:lstStyle/>
                   <a:p>
-                    <a:fld id="{02EC22B6-BABC-485E-BF95-464F10303D0B}" type="CELLRANGE">
+                    <a:fld id="{8F9D6933-1817-401B-8DB0-BC4C2FFD23A5}" type="CELLRANGE">
                       <a:rPr lang="en-US"/>
                       <a:pPr/>
                       <a:t>[CELLRANGE]</a:t>
@@ -325,7 +329,7 @@
                       <a:rPr lang="en-US" baseline="0"/>
                       <a:t>, </a:t>
                     </a:r>
-                    <a:fld id="{E68B84FC-246B-42BE-861F-2DC8E0CDA94E}" type="CATEGORYNAME">
+                    <a:fld id="{F84936D6-5601-437C-8CC5-57D0CD41FDC9}" type="CATEGORYNAME">
                       <a:rPr lang="en-US" baseline="0"/>
                       <a:pPr/>
                       <a:t>[CATEGORY NAME]</a:t>
@@ -334,7 +338,7 @@
                       <a:rPr lang="en-US" baseline="0"/>
                       <a:t>, </a:t>
                     </a:r>
-                    <a:fld id="{CFAC3806-AC73-456E-AF4D-2033F363C041}" type="VALUE">
+                    <a:fld id="{30251910-C15F-4C2F-89D9-A9D611CC9175}" type="VALUE">
                       <a:rPr lang="en-US" baseline="0"/>
                       <a:pPr/>
                       <a:t>[VALUE]</a:t>
@@ -370,7 +374,7 @@
                   <a:bodyPr/>
                   <a:lstStyle/>
                   <a:p>
-                    <a:fld id="{D56AFFA4-EC56-40FF-90B7-492B788724E8}" type="CELLRANGE">
+                    <a:fld id="{7E5A6473-A4D1-4E31-9C4C-23CF84D94971}" type="CELLRANGE">
                       <a:rPr lang="en-US"/>
                       <a:pPr/>
                       <a:t>[CELLRANGE]</a:t>
@@ -379,7 +383,7 @@
                       <a:rPr lang="en-US" baseline="0"/>
                       <a:t>, </a:t>
                     </a:r>
-                    <a:fld id="{2AD0A3D3-3A55-459B-ADF3-49DB0C637169}" type="CATEGORYNAME">
+                    <a:fld id="{D6AA71ED-AD3E-45A1-A309-69C89230D5DB}" type="CATEGORYNAME">
                       <a:rPr lang="en-US" baseline="0"/>
                       <a:pPr/>
                       <a:t>[CATEGORY NAME]</a:t>
@@ -388,7 +392,7 @@
                       <a:rPr lang="en-US" baseline="0"/>
                       <a:t>, </a:t>
                     </a:r>
-                    <a:fld id="{D246EB40-F18D-45E4-B4C9-BFCDBB4E96F8}" type="VALUE">
+                    <a:fld id="{83BB55D3-0C5A-431E-8958-960E0F0CB5AB}" type="VALUE">
                       <a:rPr lang="en-US" baseline="0"/>
                       <a:pPr/>
                       <a:t>[VALUE]</a:t>
@@ -424,7 +428,7 @@
                   <a:bodyPr/>
                   <a:lstStyle/>
                   <a:p>
-                    <a:fld id="{06057EE6-10EC-4DC9-9114-EE90C76CEC56}" type="CELLRANGE">
+                    <a:fld id="{C77FAA4E-D2FD-4EA3-AAFE-80B5A59DF771}" type="CELLRANGE">
                       <a:rPr lang="en-US"/>
                       <a:pPr/>
                       <a:t>[CELLRANGE]</a:t>
@@ -433,7 +437,7 @@
                       <a:rPr lang="en-US" baseline="0"/>
                       <a:t>, </a:t>
                     </a:r>
-                    <a:fld id="{2416D651-EC07-4E43-AD40-855C2F0FAC03}" type="CATEGORYNAME">
+                    <a:fld id="{F8634771-E609-4D6C-AD31-ADD3E38D91CF}" type="CATEGORYNAME">
                       <a:rPr lang="en-US" baseline="0"/>
                       <a:pPr/>
                       <a:t>[CATEGORY NAME]</a:t>
@@ -442,7 +446,7 @@
                       <a:rPr lang="en-US" baseline="0"/>
                       <a:t>, </a:t>
                     </a:r>
-                    <a:fld id="{F9E23B7D-B49D-4FA9-AF29-E40DCAE933B4}" type="VALUE">
+                    <a:fld id="{0F69DDA5-3257-4BAE-B1CC-A8072DF92625}" type="VALUE">
                       <a:rPr lang="en-US" baseline="0"/>
                       <a:pPr/>
                       <a:t>[VALUE]</a:t>
@@ -478,7 +482,7 @@
                   <a:bodyPr/>
                   <a:lstStyle/>
                   <a:p>
-                    <a:fld id="{C0505DD4-50AE-4C22-A70C-712B8CBF0119}" type="CELLRANGE">
+                    <a:fld id="{B6498804-4CDE-4ECE-AB9C-8C62FFBFACAF}" type="CELLRANGE">
                       <a:rPr lang="en-US"/>
                       <a:pPr/>
                       <a:t>[CELLRANGE]</a:t>
@@ -487,7 +491,7 @@
                       <a:rPr lang="en-US" baseline="0"/>
                       <a:t>, </a:t>
                     </a:r>
-                    <a:fld id="{DF94094E-0840-4E5C-879E-5E0EDE97141F}" type="CATEGORYNAME">
+                    <a:fld id="{CABE19DB-00B1-41DA-BF1F-ACBC84CB2995}" type="CATEGORYNAME">
                       <a:rPr lang="en-US" baseline="0"/>
                       <a:pPr/>
                       <a:t>[CATEGORY NAME]</a:t>
@@ -496,7 +500,7 @@
                       <a:rPr lang="en-US" baseline="0"/>
                       <a:t>, </a:t>
                     </a:r>
-                    <a:fld id="{EA0D31F1-1BD6-4315-B942-C42DA6C38446}" type="VALUE">
+                    <a:fld id="{B706E869-7930-459F-90A8-448ECAB692B2}" type="VALUE">
                       <a:rPr lang="en-US" baseline="0"/>
                       <a:pPr/>
                       <a:t>[VALUE]</a:t>
@@ -736,7 +740,760 @@
 </c:chartSpace>
 </file>
 
+<file path=ppt/charts/chart2.xml><?xml version="1.0" encoding="utf-8"?>
+<c:chartSpace xmlns:c="http://schemas.openxmlformats.org/drawingml/2006/chart" xmlns:a="http://schemas.openxmlformats.org/drawingml/2006/main" xmlns:r="http://schemas.openxmlformats.org/officeDocument/2006/relationships" xmlns:c16r2="http://schemas.microsoft.com/office/drawing/2015/06/chart">
+  <c:date1904 val="0"/>
+  <c:lang val="en-US"/>
+  <c:roundedCorners val="0"/>
+  <mc:AlternateContent xmlns:mc="http://schemas.openxmlformats.org/markup-compatibility/2006">
+    <mc:Choice xmlns:c14="http://schemas.microsoft.com/office/drawing/2007/8/2/chart" Requires="c14">
+      <c14:style val="102"/>
+    </mc:Choice>
+    <mc:Fallback>
+      <c:style val="2"/>
+    </mc:Fallback>
+  </mc:AlternateContent>
+  <c:clrMapOvr bg1="lt1" tx1="dk1" bg2="lt2" tx2="dk2" accent1="accent1" accent2="accent2" accent3="accent3" accent4="accent4" accent5="accent5" accent6="accent6" hlink="hlink" folHlink="folHlink"/>
+  <c:chart>
+    <c:title>
+      <c:tx>
+        <c:rich>
+          <a:bodyPr rot="0" spcFirstLastPara="1" vertOverflow="ellipsis" vert="horz" wrap="square" anchor="ctr" anchorCtr="1"/>
+          <a:lstStyle/>
+          <a:p>
+            <a:pPr>
+              <a:defRPr sz="1400" b="0" i="0" u="none" strike="noStrike" kern="1200" spc="0" baseline="0">
+                <a:solidFill>
+                  <a:schemeClr val="tx1">
+                    <a:lumMod val="65000"/>
+                    <a:lumOff val="35000"/>
+                  </a:schemeClr>
+                </a:solidFill>
+                <a:latin typeface="+mn-lt"/>
+                <a:ea typeface="+mn-ea"/>
+                <a:cs typeface="+mn-cs"/>
+              </a:defRPr>
+            </a:pPr>
+            <a:r>
+              <a:rPr lang="en-US" b="1"/>
+              <a:t>Wait Time Breakdown by Day</a:t>
+            </a:r>
+          </a:p>
+        </c:rich>
+      </c:tx>
+      <c:layout/>
+      <c:overlay val="0"/>
+      <c:spPr>
+        <a:noFill/>
+        <a:ln>
+          <a:noFill/>
+        </a:ln>
+        <a:effectLst/>
+      </c:spPr>
+      <c:txPr>
+        <a:bodyPr rot="0" spcFirstLastPara="1" vertOverflow="ellipsis" vert="horz" wrap="square" anchor="ctr" anchorCtr="1"/>
+        <a:lstStyle/>
+        <a:p>
+          <a:pPr>
+            <a:defRPr sz="1400" b="0" i="0" u="none" strike="noStrike" kern="1200" spc="0" baseline="0">
+              <a:solidFill>
+                <a:schemeClr val="tx1">
+                  <a:lumMod val="65000"/>
+                  <a:lumOff val="35000"/>
+                </a:schemeClr>
+              </a:solidFill>
+              <a:latin typeface="+mn-lt"/>
+              <a:ea typeface="+mn-ea"/>
+              <a:cs typeface="+mn-cs"/>
+            </a:defRPr>
+          </a:pPr>
+          <a:endParaRPr lang="en-US"/>
+        </a:p>
+      </c:txPr>
+    </c:title>
+    <c:autoTitleDeleted val="0"/>
+    <c:plotArea>
+      <c:layout/>
+      <c:barChart>
+        <c:barDir val="col"/>
+        <c:grouping val="clustered"/>
+        <c:varyColors val="0"/>
+        <c:ser>
+          <c:idx val="0"/>
+          <c:order val="0"/>
+          <c:tx>
+            <c:strRef>
+              <c:f>Visuals!$E$15</c:f>
+              <c:strCache>
+                <c:ptCount val="1"/>
+                <c:pt idx="0">
+                  <c:v>Count of Patient ID</c:v>
+                </c:pt>
+              </c:strCache>
+            </c:strRef>
+          </c:tx>
+          <c:spPr>
+            <a:solidFill>
+              <a:schemeClr val="accent1"/>
+            </a:solidFill>
+            <a:ln>
+              <a:noFill/>
+            </a:ln>
+            <a:effectLst/>
+          </c:spPr>
+          <c:invertIfNegative val="0"/>
+          <c:dLbls>
+            <c:dLbl>
+              <c:idx val="0"/>
+              <c:layout/>
+              <c:tx>
+                <c:rich>
+                  <a:bodyPr/>
+                  <a:lstStyle/>
+                  <a:p>
+                    <a:fld id="{99405296-A20B-4468-A158-6850371ABA3F}" type="CELLRANGE">
+                      <a:rPr lang="en-US"/>
+                      <a:pPr/>
+                      <a:t>[CELLRANGE]</a:t>
+                    </a:fld>
+                    <a:r>
+                      <a:rPr lang="en-US" baseline="0"/>
+                      <a:t>, </a:t>
+                    </a:r>
+                    <a:fld id="{5842B8C9-B950-4E33-BA62-2F84FA8B28FF}" type="VALUE">
+                      <a:rPr lang="en-US" baseline="0"/>
+                      <a:pPr/>
+                      <a:t>[VALUE]</a:t>
+                    </a:fld>
+                    <a:endParaRPr lang="en-US" baseline="0"/>
+                  </a:p>
+                </c:rich>
+              </c:tx>
+              <c:dLblPos val="outEnd"/>
+              <c:showLegendKey val="0"/>
+              <c:showVal val="1"/>
+              <c:showCatName val="0"/>
+              <c:showSerName val="0"/>
+              <c:showPercent val="0"/>
+              <c:showBubbleSize val="0"/>
+              <c:extLst>
+                <c:ext xmlns:c15="http://schemas.microsoft.com/office/drawing/2012/chart" uri="{CE6537A1-D6FC-4f65-9D91-7224C49458BB}">
+                  <c15:layout/>
+                  <c15:dlblFieldTable/>
+                  <c15:xForSave val="1"/>
+                  <c15:showDataLabelsRange val="1"/>
+                </c:ext>
+                <c:ext xmlns:c16="http://schemas.microsoft.com/office/drawing/2014/chart" uri="{C3380CC4-5D6E-409C-BE32-E72D297353CC}">
+                  <c16:uniqueId val="{00000000-76BD-481E-9E7D-08997AD1B86E}"/>
+                </c:ext>
+              </c:extLst>
+            </c:dLbl>
+            <c:dLbl>
+              <c:idx val="1"/>
+              <c:layout/>
+              <c:tx>
+                <c:rich>
+                  <a:bodyPr/>
+                  <a:lstStyle/>
+                  <a:p>
+                    <a:fld id="{5F889F67-4C8D-4A6E-BF62-0E230964099D}" type="CELLRANGE">
+                      <a:rPr lang="en-US"/>
+                      <a:pPr/>
+                      <a:t>[CELLRANGE]</a:t>
+                    </a:fld>
+                    <a:r>
+                      <a:rPr lang="en-US" baseline="0"/>
+                      <a:t>, </a:t>
+                    </a:r>
+                    <a:fld id="{3C655B39-6B6F-4BDA-AB70-BFC975F9AE3A}" type="VALUE">
+                      <a:rPr lang="en-US" baseline="0"/>
+                      <a:pPr/>
+                      <a:t>[VALUE]</a:t>
+                    </a:fld>
+                    <a:endParaRPr lang="en-US" baseline="0"/>
+                  </a:p>
+                </c:rich>
+              </c:tx>
+              <c:dLblPos val="outEnd"/>
+              <c:showLegendKey val="0"/>
+              <c:showVal val="1"/>
+              <c:showCatName val="0"/>
+              <c:showSerName val="0"/>
+              <c:showPercent val="0"/>
+              <c:showBubbleSize val="0"/>
+              <c:extLst>
+                <c:ext xmlns:c15="http://schemas.microsoft.com/office/drawing/2012/chart" uri="{CE6537A1-D6FC-4f65-9D91-7224C49458BB}">
+                  <c15:layout/>
+                  <c15:dlblFieldTable/>
+                  <c15:xForSave val="1"/>
+                  <c15:showDataLabelsRange val="1"/>
+                </c:ext>
+                <c:ext xmlns:c16="http://schemas.microsoft.com/office/drawing/2014/chart" uri="{C3380CC4-5D6E-409C-BE32-E72D297353CC}">
+                  <c16:uniqueId val="{00000001-76BD-481E-9E7D-08997AD1B86E}"/>
+                </c:ext>
+              </c:extLst>
+            </c:dLbl>
+            <c:dLbl>
+              <c:idx val="2"/>
+              <c:layout/>
+              <c:tx>
+                <c:rich>
+                  <a:bodyPr/>
+                  <a:lstStyle/>
+                  <a:p>
+                    <a:fld id="{F3A16361-078B-46CE-93EE-53ECD8F736B0}" type="CELLRANGE">
+                      <a:rPr lang="en-US"/>
+                      <a:pPr/>
+                      <a:t>[CELLRANGE]</a:t>
+                    </a:fld>
+                    <a:r>
+                      <a:rPr lang="en-US" baseline="0"/>
+                      <a:t>, </a:t>
+                    </a:r>
+                    <a:fld id="{A7B97F3E-57DE-4B0A-AE9E-6D1F06EE39D4}" type="VALUE">
+                      <a:rPr lang="en-US" baseline="0"/>
+                      <a:pPr/>
+                      <a:t>[VALUE]</a:t>
+                    </a:fld>
+                    <a:endParaRPr lang="en-US" baseline="0"/>
+                  </a:p>
+                </c:rich>
+              </c:tx>
+              <c:dLblPos val="outEnd"/>
+              <c:showLegendKey val="0"/>
+              <c:showVal val="1"/>
+              <c:showCatName val="0"/>
+              <c:showSerName val="0"/>
+              <c:showPercent val="0"/>
+              <c:showBubbleSize val="0"/>
+              <c:extLst>
+                <c:ext xmlns:c15="http://schemas.microsoft.com/office/drawing/2012/chart" uri="{CE6537A1-D6FC-4f65-9D91-7224C49458BB}">
+                  <c15:layout/>
+                  <c15:dlblFieldTable/>
+                  <c15:xForSave val="1"/>
+                  <c15:showDataLabelsRange val="1"/>
+                </c:ext>
+                <c:ext xmlns:c16="http://schemas.microsoft.com/office/drawing/2014/chart" uri="{C3380CC4-5D6E-409C-BE32-E72D297353CC}">
+                  <c16:uniqueId val="{00000002-76BD-481E-9E7D-08997AD1B86E}"/>
+                </c:ext>
+              </c:extLst>
+            </c:dLbl>
+            <c:dLbl>
+              <c:idx val="3"/>
+              <c:layout/>
+              <c:tx>
+                <c:rich>
+                  <a:bodyPr/>
+                  <a:lstStyle/>
+                  <a:p>
+                    <a:fld id="{D83F8033-DD05-4830-AA2F-1B4BC24A3E9C}" type="CELLRANGE">
+                      <a:rPr lang="en-US"/>
+                      <a:pPr/>
+                      <a:t>[CELLRANGE]</a:t>
+                    </a:fld>
+                    <a:r>
+                      <a:rPr lang="en-US" baseline="0"/>
+                      <a:t>, </a:t>
+                    </a:r>
+                    <a:fld id="{5E13FA3A-A1C6-4688-8CE1-08E4C2F340BF}" type="VALUE">
+                      <a:rPr lang="en-US" baseline="0"/>
+                      <a:pPr/>
+                      <a:t>[VALUE]</a:t>
+                    </a:fld>
+                    <a:endParaRPr lang="en-US" baseline="0"/>
+                  </a:p>
+                </c:rich>
+              </c:tx>
+              <c:dLblPos val="outEnd"/>
+              <c:showLegendKey val="0"/>
+              <c:showVal val="1"/>
+              <c:showCatName val="0"/>
+              <c:showSerName val="0"/>
+              <c:showPercent val="0"/>
+              <c:showBubbleSize val="0"/>
+              <c:extLst>
+                <c:ext xmlns:c15="http://schemas.microsoft.com/office/drawing/2012/chart" uri="{CE6537A1-D6FC-4f65-9D91-7224C49458BB}">
+                  <c15:layout/>
+                  <c15:dlblFieldTable/>
+                  <c15:xForSave val="1"/>
+                  <c15:showDataLabelsRange val="1"/>
+                </c:ext>
+                <c:ext xmlns:c16="http://schemas.microsoft.com/office/drawing/2014/chart" uri="{C3380CC4-5D6E-409C-BE32-E72D297353CC}">
+                  <c16:uniqueId val="{00000003-76BD-481E-9E7D-08997AD1B86E}"/>
+                </c:ext>
+              </c:extLst>
+            </c:dLbl>
+            <c:dLbl>
+              <c:idx val="4"/>
+              <c:layout/>
+              <c:tx>
+                <c:rich>
+                  <a:bodyPr/>
+                  <a:lstStyle/>
+                  <a:p>
+                    <a:fld id="{AFA4D56A-0854-47FE-A625-DDC25D83A7D4}" type="CELLRANGE">
+                      <a:rPr lang="en-US"/>
+                      <a:pPr/>
+                      <a:t>[CELLRANGE]</a:t>
+                    </a:fld>
+                    <a:r>
+                      <a:rPr lang="en-US" baseline="0"/>
+                      <a:t>, </a:t>
+                    </a:r>
+                    <a:fld id="{6CD2724A-DEE2-4034-AAC8-5C5DBBD3061C}" type="VALUE">
+                      <a:rPr lang="en-US" baseline="0"/>
+                      <a:pPr/>
+                      <a:t>[VALUE]</a:t>
+                    </a:fld>
+                    <a:endParaRPr lang="en-US" baseline="0"/>
+                  </a:p>
+                </c:rich>
+              </c:tx>
+              <c:dLblPos val="outEnd"/>
+              <c:showLegendKey val="0"/>
+              <c:showVal val="1"/>
+              <c:showCatName val="0"/>
+              <c:showSerName val="0"/>
+              <c:showPercent val="0"/>
+              <c:showBubbleSize val="0"/>
+              <c:extLst>
+                <c:ext xmlns:c15="http://schemas.microsoft.com/office/drawing/2012/chart" uri="{CE6537A1-D6FC-4f65-9D91-7224C49458BB}">
+                  <c15:layout/>
+                  <c15:dlblFieldTable/>
+                  <c15:xForSave val="1"/>
+                  <c15:showDataLabelsRange val="1"/>
+                </c:ext>
+                <c:ext xmlns:c16="http://schemas.microsoft.com/office/drawing/2014/chart" uri="{C3380CC4-5D6E-409C-BE32-E72D297353CC}">
+                  <c16:uniqueId val="{00000004-76BD-481E-9E7D-08997AD1B86E}"/>
+                </c:ext>
+              </c:extLst>
+            </c:dLbl>
+            <c:dLbl>
+              <c:idx val="5"/>
+              <c:layout/>
+              <c:tx>
+                <c:rich>
+                  <a:bodyPr/>
+                  <a:lstStyle/>
+                  <a:p>
+                    <a:fld id="{7CE26DB9-A5A7-48B5-830D-4762F341E3CB}" type="CELLRANGE">
+                      <a:rPr lang="en-US"/>
+                      <a:pPr/>
+                      <a:t>[CELLRANGE]</a:t>
+                    </a:fld>
+                    <a:r>
+                      <a:rPr lang="en-US" baseline="0"/>
+                      <a:t>, </a:t>
+                    </a:r>
+                    <a:fld id="{E13006EF-1BA3-40EC-9D59-9D2B033B63D8}" type="VALUE">
+                      <a:rPr lang="en-US" baseline="0"/>
+                      <a:pPr/>
+                      <a:t>[VALUE]</a:t>
+                    </a:fld>
+                    <a:endParaRPr lang="en-US" baseline="0"/>
+                  </a:p>
+                </c:rich>
+              </c:tx>
+              <c:dLblPos val="outEnd"/>
+              <c:showLegendKey val="0"/>
+              <c:showVal val="1"/>
+              <c:showCatName val="0"/>
+              <c:showSerName val="0"/>
+              <c:showPercent val="0"/>
+              <c:showBubbleSize val="0"/>
+              <c:extLst>
+                <c:ext xmlns:c15="http://schemas.microsoft.com/office/drawing/2012/chart" uri="{CE6537A1-D6FC-4f65-9D91-7224C49458BB}">
+                  <c15:layout/>
+                  <c15:dlblFieldTable/>
+                  <c15:xForSave val="1"/>
+                  <c15:showDataLabelsRange val="1"/>
+                </c:ext>
+                <c:ext xmlns:c16="http://schemas.microsoft.com/office/drawing/2014/chart" uri="{C3380CC4-5D6E-409C-BE32-E72D297353CC}">
+                  <c16:uniqueId val="{00000005-76BD-481E-9E7D-08997AD1B86E}"/>
+                </c:ext>
+              </c:extLst>
+            </c:dLbl>
+            <c:dLbl>
+              <c:idx val="6"/>
+              <c:layout/>
+              <c:tx>
+                <c:rich>
+                  <a:bodyPr/>
+                  <a:lstStyle/>
+                  <a:p>
+                    <a:fld id="{9F24EB22-0199-4271-9F63-EC3704C19534}" type="CELLRANGE">
+                      <a:rPr lang="en-US"/>
+                      <a:pPr/>
+                      <a:t>[CELLRANGE]</a:t>
+                    </a:fld>
+                    <a:r>
+                      <a:rPr lang="en-US" baseline="0"/>
+                      <a:t>, </a:t>
+                    </a:r>
+                    <a:fld id="{D776270E-C796-4BAF-BB8B-FAC1C9B26E6F}" type="VALUE">
+                      <a:rPr lang="en-US" baseline="0"/>
+                      <a:pPr/>
+                      <a:t>[VALUE]</a:t>
+                    </a:fld>
+                    <a:endParaRPr lang="en-US" baseline="0"/>
+                  </a:p>
+                </c:rich>
+              </c:tx>
+              <c:dLblPos val="outEnd"/>
+              <c:showLegendKey val="0"/>
+              <c:showVal val="1"/>
+              <c:showCatName val="0"/>
+              <c:showSerName val="0"/>
+              <c:showPercent val="0"/>
+              <c:showBubbleSize val="0"/>
+              <c:extLst>
+                <c:ext xmlns:c15="http://schemas.microsoft.com/office/drawing/2012/chart" uri="{CE6537A1-D6FC-4f65-9D91-7224C49458BB}">
+                  <c15:layout/>
+                  <c15:dlblFieldTable/>
+                  <c15:xForSave val="1"/>
+                  <c15:showDataLabelsRange val="1"/>
+                </c:ext>
+                <c:ext xmlns:c16="http://schemas.microsoft.com/office/drawing/2014/chart" uri="{C3380CC4-5D6E-409C-BE32-E72D297353CC}">
+                  <c16:uniqueId val="{00000006-76BD-481E-9E7D-08997AD1B86E}"/>
+                </c:ext>
+              </c:extLst>
+            </c:dLbl>
+            <c:spPr>
+              <a:noFill/>
+              <a:ln>
+                <a:noFill/>
+              </a:ln>
+              <a:effectLst/>
+            </c:spPr>
+            <c:txPr>
+              <a:bodyPr rot="0" spcFirstLastPara="1" vertOverflow="ellipsis" vert="horz" wrap="square" lIns="38100" tIns="19050" rIns="38100" bIns="19050" anchor="ctr" anchorCtr="1">
+                <a:spAutoFit/>
+              </a:bodyPr>
+              <a:lstStyle/>
+              <a:p>
+                <a:pPr>
+                  <a:defRPr sz="900" b="0" i="0" u="none" strike="noStrike" kern="1200" baseline="0">
+                    <a:solidFill>
+                      <a:schemeClr val="tx1">
+                        <a:lumMod val="75000"/>
+                        <a:lumOff val="25000"/>
+                      </a:schemeClr>
+                    </a:solidFill>
+                    <a:latin typeface="+mn-lt"/>
+                    <a:ea typeface="+mn-ea"/>
+                    <a:cs typeface="+mn-cs"/>
+                  </a:defRPr>
+                </a:pPr>
+                <a:endParaRPr lang="en-US"/>
+              </a:p>
+            </c:txPr>
+            <c:dLblPos val="outEnd"/>
+            <c:showLegendKey val="0"/>
+            <c:showVal val="1"/>
+            <c:showCatName val="0"/>
+            <c:showSerName val="0"/>
+            <c:showPercent val="0"/>
+            <c:showBubbleSize val="0"/>
+            <c:showLeaderLines val="0"/>
+            <c:extLst>
+              <c:ext xmlns:c15="http://schemas.microsoft.com/office/drawing/2012/chart" uri="{CE6537A1-D6FC-4f65-9D91-7224C49458BB}">
+                <c15:layout/>
+                <c15:showDataLabelsRange val="1"/>
+                <c15:showLeaderLines val="1"/>
+                <c15:leaderLines>
+                  <c:spPr>
+                    <a:ln w="9525" cap="flat" cmpd="sng" algn="ctr">
+                      <a:solidFill>
+                        <a:schemeClr val="tx1">
+                          <a:lumMod val="35000"/>
+                          <a:lumOff val="65000"/>
+                        </a:schemeClr>
+                      </a:solidFill>
+                      <a:round/>
+                    </a:ln>
+                    <a:effectLst/>
+                  </c:spPr>
+                </c15:leaderLines>
+              </c:ext>
+            </c:extLst>
+          </c:dLbls>
+          <c:cat>
+            <c:strRef>
+              <c:f>Visuals!$C$16:$C$22</c:f>
+              <c:strCache>
+                <c:ptCount val="7"/>
+                <c:pt idx="0">
+                  <c:v>Sunday</c:v>
+                </c:pt>
+                <c:pt idx="1">
+                  <c:v>Monday</c:v>
+                </c:pt>
+                <c:pt idx="2">
+                  <c:v>Tuesday</c:v>
+                </c:pt>
+                <c:pt idx="3">
+                  <c:v>Wednesday</c:v>
+                </c:pt>
+                <c:pt idx="4">
+                  <c:v>Thursday</c:v>
+                </c:pt>
+                <c:pt idx="5">
+                  <c:v>Friday</c:v>
+                </c:pt>
+                <c:pt idx="6">
+                  <c:v>Saturday</c:v>
+                </c:pt>
+              </c:strCache>
+            </c:strRef>
+          </c:cat>
+          <c:val>
+            <c:numRef>
+              <c:f>Visuals!$E$16:$E$22</c:f>
+              <c:numCache>
+                <c:formatCode>_(* #,##0_);_(* \(#,##0\);_(* "-"??_);_(@_)</c:formatCode>
+                <c:ptCount val="7"/>
+                <c:pt idx="0">
+                  <c:v>2549</c:v>
+                </c:pt>
+                <c:pt idx="1">
+                  <c:v>6982</c:v>
+                </c:pt>
+                <c:pt idx="2">
+                  <c:v>5690</c:v>
+                </c:pt>
+                <c:pt idx="3">
+                  <c:v>4171</c:v>
+                </c:pt>
+                <c:pt idx="4">
+                  <c:v>2673</c:v>
+                </c:pt>
+                <c:pt idx="5">
+                  <c:v>4923</c:v>
+                </c:pt>
+                <c:pt idx="6">
+                  <c:v>3010</c:v>
+                </c:pt>
+              </c:numCache>
+            </c:numRef>
+          </c:val>
+          <c:extLst>
+            <c:ext xmlns:c15="http://schemas.microsoft.com/office/drawing/2012/chart" uri="{02D57815-91ED-43cb-92C2-25804820EDAC}">
+              <c15:datalabelsRange>
+                <c15:f>Visuals!$D$16:$D$22</c15:f>
+                <c15:dlblRangeCache>
+                  <c:ptCount val="7"/>
+                  <c:pt idx="0">
+                    <c:v>33</c:v>
+                  </c:pt>
+                  <c:pt idx="1">
+                    <c:v>49</c:v>
+                  </c:pt>
+                  <c:pt idx="2">
+                    <c:v>42</c:v>
+                  </c:pt>
+                  <c:pt idx="3">
+                    <c:v>47</c:v>
+                  </c:pt>
+                  <c:pt idx="4">
+                    <c:v>42</c:v>
+                  </c:pt>
+                  <c:pt idx="5">
+                    <c:v>42</c:v>
+                  </c:pt>
+                  <c:pt idx="6">
+                    <c:v>42</c:v>
+                  </c:pt>
+                </c15:dlblRangeCache>
+              </c15:datalabelsRange>
+            </c:ext>
+            <c:ext xmlns:c16="http://schemas.microsoft.com/office/drawing/2014/chart" uri="{C3380CC4-5D6E-409C-BE32-E72D297353CC}">
+              <c16:uniqueId val="{00000007-76BD-481E-9E7D-08997AD1B86E}"/>
+            </c:ext>
+          </c:extLst>
+        </c:ser>
+        <c:dLbls>
+          <c:dLblPos val="outEnd"/>
+          <c:showLegendKey val="0"/>
+          <c:showVal val="1"/>
+          <c:showCatName val="0"/>
+          <c:showSerName val="0"/>
+          <c:showPercent val="0"/>
+          <c:showBubbleSize val="0"/>
+        </c:dLbls>
+        <c:gapWidth val="55"/>
+        <c:overlap val="-27"/>
+        <c:axId val="1254107375"/>
+        <c:axId val="1254107791"/>
+      </c:barChart>
+      <c:catAx>
+        <c:axId val="1254107375"/>
+        <c:scaling>
+          <c:orientation val="minMax"/>
+        </c:scaling>
+        <c:delete val="0"/>
+        <c:axPos val="b"/>
+        <c:numFmt formatCode="General" sourceLinked="1"/>
+        <c:majorTickMark val="none"/>
+        <c:minorTickMark val="none"/>
+        <c:tickLblPos val="nextTo"/>
+        <c:spPr>
+          <a:noFill/>
+          <a:ln w="9525" cap="flat" cmpd="sng" algn="ctr">
+            <a:solidFill>
+              <a:schemeClr val="tx1">
+                <a:lumMod val="15000"/>
+                <a:lumOff val="85000"/>
+              </a:schemeClr>
+            </a:solidFill>
+            <a:round/>
+          </a:ln>
+          <a:effectLst/>
+        </c:spPr>
+        <c:txPr>
+          <a:bodyPr rot="-60000000" spcFirstLastPara="1" vertOverflow="ellipsis" vert="horz" wrap="square" anchor="ctr" anchorCtr="1"/>
+          <a:lstStyle/>
+          <a:p>
+            <a:pPr>
+              <a:defRPr sz="900" b="0" i="0" u="none" strike="noStrike" kern="1200" baseline="0">
+                <a:solidFill>
+                  <a:schemeClr val="tx1">
+                    <a:lumMod val="65000"/>
+                    <a:lumOff val="35000"/>
+                  </a:schemeClr>
+                </a:solidFill>
+                <a:latin typeface="+mn-lt"/>
+                <a:ea typeface="+mn-ea"/>
+                <a:cs typeface="+mn-cs"/>
+              </a:defRPr>
+            </a:pPr>
+            <a:endParaRPr lang="en-US"/>
+          </a:p>
+        </c:txPr>
+        <c:crossAx val="1254107791"/>
+        <c:crosses val="autoZero"/>
+        <c:auto val="1"/>
+        <c:lblAlgn val="ctr"/>
+        <c:lblOffset val="100"/>
+        <c:noMultiLvlLbl val="0"/>
+      </c:catAx>
+      <c:valAx>
+        <c:axId val="1254107791"/>
+        <c:scaling>
+          <c:orientation val="minMax"/>
+        </c:scaling>
+        <c:delete val="0"/>
+        <c:axPos val="l"/>
+        <c:numFmt formatCode="_(* #,##0_);_(* \(#,##0\);_(* &quot;-&quot;??_);_(@_)" sourceLinked="1"/>
+        <c:majorTickMark val="none"/>
+        <c:minorTickMark val="none"/>
+        <c:tickLblPos val="nextTo"/>
+        <c:spPr>
+          <a:noFill/>
+          <a:ln>
+            <a:noFill/>
+          </a:ln>
+          <a:effectLst/>
+        </c:spPr>
+        <c:txPr>
+          <a:bodyPr rot="-60000000" spcFirstLastPara="1" vertOverflow="ellipsis" vert="horz" wrap="square" anchor="ctr" anchorCtr="1"/>
+          <a:lstStyle/>
+          <a:p>
+            <a:pPr>
+              <a:defRPr sz="900" b="0" i="0" u="none" strike="noStrike" kern="1200" baseline="0">
+                <a:solidFill>
+                  <a:schemeClr val="tx1">
+                    <a:lumMod val="65000"/>
+                    <a:lumOff val="35000"/>
+                  </a:schemeClr>
+                </a:solidFill>
+                <a:latin typeface="+mn-lt"/>
+                <a:ea typeface="+mn-ea"/>
+                <a:cs typeface="+mn-cs"/>
+              </a:defRPr>
+            </a:pPr>
+            <a:endParaRPr lang="en-US"/>
+          </a:p>
+        </c:txPr>
+        <c:crossAx val="1254107375"/>
+        <c:crosses val="autoZero"/>
+        <c:crossBetween val="between"/>
+      </c:valAx>
+      <c:spPr>
+        <a:noFill/>
+        <a:ln>
+          <a:noFill/>
+        </a:ln>
+        <a:effectLst/>
+      </c:spPr>
+    </c:plotArea>
+    <c:plotVisOnly val="1"/>
+    <c:dispBlanksAs val="gap"/>
+    <c:showDLblsOverMax val="0"/>
+  </c:chart>
+  <c:spPr>
+    <a:noFill/>
+    <a:ln>
+      <a:noFill/>
+    </a:ln>
+    <a:effectLst/>
+  </c:spPr>
+  <c:txPr>
+    <a:bodyPr/>
+    <a:lstStyle/>
+    <a:p>
+      <a:pPr>
+        <a:defRPr/>
+      </a:pPr>
+      <a:endParaRPr lang="en-US"/>
+    </a:p>
+  </c:txPr>
+  <c:externalData r:id="rId4">
+    <c:autoUpdate val="0"/>
+  </c:externalData>
+</c:chartSpace>
+</file>
+
 <file path=ppt/charts/colors1.xml><?xml version="1.0" encoding="utf-8"?>
+<cs:colorStyle xmlns:cs="http://schemas.microsoft.com/office/drawing/2012/chartStyle" xmlns:a="http://schemas.openxmlformats.org/drawingml/2006/main" meth="cycle" id="10">
+  <a:schemeClr val="accent1"/>
+  <a:schemeClr val="accent2"/>
+  <a:schemeClr val="accent3"/>
+  <a:schemeClr val="accent4"/>
+  <a:schemeClr val="accent5"/>
+  <a:schemeClr val="accent6"/>
+  <cs:variation/>
+  <cs:variation>
+    <a:lumMod val="60000"/>
+  </cs:variation>
+  <cs:variation>
+    <a:lumMod val="80000"/>
+    <a:lumOff val="20000"/>
+  </cs:variation>
+  <cs:variation>
+    <a:lumMod val="80000"/>
+  </cs:variation>
+  <cs:variation>
+    <a:lumMod val="60000"/>
+    <a:lumOff val="40000"/>
+  </cs:variation>
+  <cs:variation>
+    <a:lumMod val="50000"/>
+  </cs:variation>
+  <cs:variation>
+    <a:lumMod val="70000"/>
+    <a:lumOff val="30000"/>
+  </cs:variation>
+  <cs:variation>
+    <a:lumMod val="70000"/>
+  </cs:variation>
+  <cs:variation>
+    <a:lumMod val="50000"/>
+    <a:lumOff val="50000"/>
+  </cs:variation>
+</cs:colorStyle>
+</file>
+
+<file path=ppt/charts/colors2.xml><?xml version="1.0" encoding="utf-8"?>
 <cs:colorStyle xmlns:cs="http://schemas.microsoft.com/office/drawing/2012/chartStyle" xmlns:a="http://schemas.openxmlformats.org/drawingml/2006/main" meth="cycle" id="10">
   <a:schemeClr val="accent1"/>
   <a:schemeClr val="accent2"/>
@@ -1295,6 +2052,943 @@
 </cs:chartStyle>
 </file>
 
+<file path=ppt/charts/style2.xml><?xml version="1.0" encoding="utf-8"?>
+<cs:chartStyle xmlns:cs="http://schemas.microsoft.com/office/drawing/2012/chartStyle" xmlns:a="http://schemas.openxmlformats.org/drawingml/2006/main" id="201">
+  <cs:axisTitle>
+    <cs:lnRef idx="0"/>
+    <cs:fillRef idx="0"/>
+    <cs:effectRef idx="0"/>
+    <cs:fontRef idx="minor">
+      <a:schemeClr val="tx1">
+        <a:lumMod val="65000"/>
+        <a:lumOff val="35000"/>
+      </a:schemeClr>
+    </cs:fontRef>
+    <cs:defRPr sz="1000" kern="1200"/>
+  </cs:axisTitle>
+  <cs:categoryAxis>
+    <cs:lnRef idx="0"/>
+    <cs:fillRef idx="0"/>
+    <cs:effectRef idx="0"/>
+    <cs:fontRef idx="minor">
+      <a:schemeClr val="tx1">
+        <a:lumMod val="65000"/>
+        <a:lumOff val="35000"/>
+      </a:schemeClr>
+    </cs:fontRef>
+    <cs:spPr>
+      <a:ln w="9525" cap="flat" cmpd="sng" algn="ctr">
+        <a:solidFill>
+          <a:schemeClr val="tx1">
+            <a:lumMod val="15000"/>
+            <a:lumOff val="85000"/>
+          </a:schemeClr>
+        </a:solidFill>
+        <a:round/>
+      </a:ln>
+    </cs:spPr>
+    <cs:defRPr sz="900" kern="1200"/>
+  </cs:categoryAxis>
+  <cs:chartArea mods="allowNoFillOverride allowNoLineOverride">
+    <cs:lnRef idx="0"/>
+    <cs:fillRef idx="0"/>
+    <cs:effectRef idx="0"/>
+    <cs:fontRef idx="minor">
+      <a:schemeClr val="tx1"/>
+    </cs:fontRef>
+    <cs:spPr>
+      <a:solidFill>
+        <a:schemeClr val="bg1"/>
+      </a:solidFill>
+      <a:ln w="9525" cap="flat" cmpd="sng" algn="ctr">
+        <a:solidFill>
+          <a:schemeClr val="tx1">
+            <a:lumMod val="15000"/>
+            <a:lumOff val="85000"/>
+          </a:schemeClr>
+        </a:solidFill>
+        <a:round/>
+      </a:ln>
+    </cs:spPr>
+    <cs:defRPr sz="1000" kern="1200"/>
+  </cs:chartArea>
+  <cs:dataLabel>
+    <cs:lnRef idx="0"/>
+    <cs:fillRef idx="0"/>
+    <cs:effectRef idx="0"/>
+    <cs:fontRef idx="minor">
+      <a:schemeClr val="tx1">
+        <a:lumMod val="75000"/>
+        <a:lumOff val="25000"/>
+      </a:schemeClr>
+    </cs:fontRef>
+    <cs:defRPr sz="900" kern="1200"/>
+  </cs:dataLabel>
+  <cs:dataLabelCallout>
+    <cs:lnRef idx="0"/>
+    <cs:fillRef idx="0"/>
+    <cs:effectRef idx="0"/>
+    <cs:fontRef idx="minor">
+      <a:schemeClr val="dk1">
+        <a:lumMod val="65000"/>
+        <a:lumOff val="35000"/>
+      </a:schemeClr>
+    </cs:fontRef>
+    <cs:spPr>
+      <a:solidFill>
+        <a:schemeClr val="lt1"/>
+      </a:solidFill>
+      <a:ln>
+        <a:solidFill>
+          <a:schemeClr val="dk1">
+            <a:lumMod val="25000"/>
+            <a:lumOff val="75000"/>
+          </a:schemeClr>
+        </a:solidFill>
+      </a:ln>
+    </cs:spPr>
+    <cs:defRPr sz="900" kern="1200"/>
+    <cs:bodyPr rot="0" spcFirstLastPara="1" vertOverflow="clip" horzOverflow="clip" vert="horz" wrap="square" lIns="36576" tIns="18288" rIns="36576" bIns="18288" anchor="ctr" anchorCtr="1">
+      <a:spAutoFit/>
+    </cs:bodyPr>
+  </cs:dataLabelCallout>
+  <cs:dataPoint>
+    <cs:lnRef idx="0"/>
+    <cs:fillRef idx="1">
+      <cs:styleClr val="auto"/>
+    </cs:fillRef>
+    <cs:effectRef idx="0"/>
+    <cs:fontRef idx="minor">
+      <a:schemeClr val="tx1"/>
+    </cs:fontRef>
+  </cs:dataPoint>
+  <cs:dataPoint3D>
+    <cs:lnRef idx="0"/>
+    <cs:fillRef idx="1">
+      <cs:styleClr val="auto"/>
+    </cs:fillRef>
+    <cs:effectRef idx="0"/>
+    <cs:fontRef idx="minor">
+      <a:schemeClr val="tx1"/>
+    </cs:fontRef>
+  </cs:dataPoint3D>
+  <cs:dataPointLine>
+    <cs:lnRef idx="0">
+      <cs:styleClr val="auto"/>
+    </cs:lnRef>
+    <cs:fillRef idx="1"/>
+    <cs:effectRef idx="0"/>
+    <cs:fontRef idx="minor">
+      <a:schemeClr val="tx1"/>
+    </cs:fontRef>
+    <cs:spPr>
+      <a:ln w="28575" cap="rnd">
+        <a:solidFill>
+          <a:schemeClr val="phClr"/>
+        </a:solidFill>
+        <a:round/>
+      </a:ln>
+    </cs:spPr>
+  </cs:dataPointLine>
+  <cs:dataPointMarker>
+    <cs:lnRef idx="0">
+      <cs:styleClr val="auto"/>
+    </cs:lnRef>
+    <cs:fillRef idx="1">
+      <cs:styleClr val="auto"/>
+    </cs:fillRef>
+    <cs:effectRef idx="0"/>
+    <cs:fontRef idx="minor">
+      <a:schemeClr val="tx1"/>
+    </cs:fontRef>
+    <cs:spPr>
+      <a:ln w="9525">
+        <a:solidFill>
+          <a:schemeClr val="phClr"/>
+        </a:solidFill>
+      </a:ln>
+    </cs:spPr>
+  </cs:dataPointMarker>
+  <cs:dataPointMarkerLayout symbol="circle" size="5"/>
+  <cs:dataPointWireframe>
+    <cs:lnRef idx="0">
+      <cs:styleClr val="auto"/>
+    </cs:lnRef>
+    <cs:fillRef idx="1"/>
+    <cs:effectRef idx="0"/>
+    <cs:fontRef idx="minor">
+      <a:schemeClr val="tx1"/>
+    </cs:fontRef>
+    <cs:spPr>
+      <a:ln w="9525" cap="rnd">
+        <a:solidFill>
+          <a:schemeClr val="phClr"/>
+        </a:solidFill>
+        <a:round/>
+      </a:ln>
+    </cs:spPr>
+  </cs:dataPointWireframe>
+  <cs:dataTable>
+    <cs:lnRef idx="0"/>
+    <cs:fillRef idx="0"/>
+    <cs:effectRef idx="0"/>
+    <cs:fontRef idx="minor">
+      <a:schemeClr val="tx1">
+        <a:lumMod val="65000"/>
+        <a:lumOff val="35000"/>
+      </a:schemeClr>
+    </cs:fontRef>
+    <cs:spPr>
+      <a:noFill/>
+      <a:ln w="9525" cap="flat" cmpd="sng" algn="ctr">
+        <a:solidFill>
+          <a:schemeClr val="tx1">
+            <a:lumMod val="15000"/>
+            <a:lumOff val="85000"/>
+          </a:schemeClr>
+        </a:solidFill>
+        <a:round/>
+      </a:ln>
+    </cs:spPr>
+    <cs:defRPr sz="900" kern="1200"/>
+  </cs:dataTable>
+  <cs:downBar>
+    <cs:lnRef idx="0"/>
+    <cs:fillRef idx="0"/>
+    <cs:effectRef idx="0"/>
+    <cs:fontRef idx="minor">
+      <a:schemeClr val="dk1"/>
+    </cs:fontRef>
+    <cs:spPr>
+      <a:solidFill>
+        <a:schemeClr val="dk1">
+          <a:lumMod val="65000"/>
+          <a:lumOff val="35000"/>
+        </a:schemeClr>
+      </a:solidFill>
+      <a:ln w="9525">
+        <a:solidFill>
+          <a:schemeClr val="tx1">
+            <a:lumMod val="65000"/>
+            <a:lumOff val="35000"/>
+          </a:schemeClr>
+        </a:solidFill>
+      </a:ln>
+    </cs:spPr>
+  </cs:downBar>
+  <cs:dropLine>
+    <cs:lnRef idx="0"/>
+    <cs:fillRef idx="0"/>
+    <cs:effectRef idx="0"/>
+    <cs:fontRef idx="minor">
+      <a:schemeClr val="tx1"/>
+    </cs:fontRef>
+    <cs:spPr>
+      <a:ln w="9525" cap="flat" cmpd="sng" algn="ctr">
+        <a:solidFill>
+          <a:schemeClr val="tx1">
+            <a:lumMod val="35000"/>
+            <a:lumOff val="65000"/>
+          </a:schemeClr>
+        </a:solidFill>
+        <a:round/>
+      </a:ln>
+    </cs:spPr>
+  </cs:dropLine>
+  <cs:errorBar>
+    <cs:lnRef idx="0"/>
+    <cs:fillRef idx="0"/>
+    <cs:effectRef idx="0"/>
+    <cs:fontRef idx="minor">
+      <a:schemeClr val="tx1"/>
+    </cs:fontRef>
+    <cs:spPr>
+      <a:ln w="9525" cap="flat" cmpd="sng" algn="ctr">
+        <a:solidFill>
+          <a:schemeClr val="tx1">
+            <a:lumMod val="65000"/>
+            <a:lumOff val="35000"/>
+          </a:schemeClr>
+        </a:solidFill>
+        <a:round/>
+      </a:ln>
+    </cs:spPr>
+  </cs:errorBar>
+  <cs:floor>
+    <cs:lnRef idx="0"/>
+    <cs:fillRef idx="0"/>
+    <cs:effectRef idx="0"/>
+    <cs:fontRef idx="minor">
+      <a:schemeClr val="tx1"/>
+    </cs:fontRef>
+    <cs:spPr>
+      <a:noFill/>
+      <a:ln>
+        <a:noFill/>
+      </a:ln>
+    </cs:spPr>
+  </cs:floor>
+  <cs:gridlineMajor>
+    <cs:lnRef idx="0"/>
+    <cs:fillRef idx="0"/>
+    <cs:effectRef idx="0"/>
+    <cs:fontRef idx="minor">
+      <a:schemeClr val="tx1"/>
+    </cs:fontRef>
+    <cs:spPr>
+      <a:ln w="9525" cap="flat" cmpd="sng" algn="ctr">
+        <a:solidFill>
+          <a:schemeClr val="tx1">
+            <a:lumMod val="15000"/>
+            <a:lumOff val="85000"/>
+          </a:schemeClr>
+        </a:solidFill>
+        <a:round/>
+      </a:ln>
+    </cs:spPr>
+  </cs:gridlineMajor>
+  <cs:gridlineMinor>
+    <cs:lnRef idx="0"/>
+    <cs:fillRef idx="0"/>
+    <cs:effectRef idx="0"/>
+    <cs:fontRef idx="minor">
+      <a:schemeClr val="tx1"/>
+    </cs:fontRef>
+    <cs:spPr>
+      <a:ln w="9525" cap="flat" cmpd="sng" algn="ctr">
+        <a:solidFill>
+          <a:schemeClr val="tx1">
+            <a:lumMod val="5000"/>
+            <a:lumOff val="95000"/>
+          </a:schemeClr>
+        </a:solidFill>
+        <a:round/>
+      </a:ln>
+    </cs:spPr>
+  </cs:gridlineMinor>
+  <cs:hiLoLine>
+    <cs:lnRef idx="0"/>
+    <cs:fillRef idx="0"/>
+    <cs:effectRef idx="0"/>
+    <cs:fontRef idx="minor">
+      <a:schemeClr val="tx1"/>
+    </cs:fontRef>
+    <cs:spPr>
+      <a:ln w="9525" cap="flat" cmpd="sng" algn="ctr">
+        <a:solidFill>
+          <a:schemeClr val="tx1">
+            <a:lumMod val="75000"/>
+            <a:lumOff val="25000"/>
+          </a:schemeClr>
+        </a:solidFill>
+        <a:round/>
+      </a:ln>
+    </cs:spPr>
+  </cs:hiLoLine>
+  <cs:leaderLine>
+    <cs:lnRef idx="0"/>
+    <cs:fillRef idx="0"/>
+    <cs:effectRef idx="0"/>
+    <cs:fontRef idx="minor">
+      <a:schemeClr val="tx1"/>
+    </cs:fontRef>
+    <cs:spPr>
+      <a:ln w="9525" cap="flat" cmpd="sng" algn="ctr">
+        <a:solidFill>
+          <a:schemeClr val="tx1">
+            <a:lumMod val="35000"/>
+            <a:lumOff val="65000"/>
+          </a:schemeClr>
+        </a:solidFill>
+        <a:round/>
+      </a:ln>
+    </cs:spPr>
+  </cs:leaderLine>
+  <cs:legend>
+    <cs:lnRef idx="0"/>
+    <cs:fillRef idx="0"/>
+    <cs:effectRef idx="0"/>
+    <cs:fontRef idx="minor">
+      <a:schemeClr val="tx1">
+        <a:lumMod val="65000"/>
+        <a:lumOff val="35000"/>
+      </a:schemeClr>
+    </cs:fontRef>
+    <cs:defRPr sz="900" kern="1200"/>
+  </cs:legend>
+  <cs:plotArea mods="allowNoFillOverride allowNoLineOverride">
+    <cs:lnRef idx="0"/>
+    <cs:fillRef idx="0"/>
+    <cs:effectRef idx="0"/>
+    <cs:fontRef idx="minor">
+      <a:schemeClr val="tx1"/>
+    </cs:fontRef>
+  </cs:plotArea>
+  <cs:plotArea3D mods="allowNoFillOverride allowNoLineOverride">
+    <cs:lnRef idx="0"/>
+    <cs:fillRef idx="0"/>
+    <cs:effectRef idx="0"/>
+    <cs:fontRef idx="minor">
+      <a:schemeClr val="tx1"/>
+    </cs:fontRef>
+  </cs:plotArea3D>
+  <cs:seriesAxis>
+    <cs:lnRef idx="0"/>
+    <cs:fillRef idx="0"/>
+    <cs:effectRef idx="0"/>
+    <cs:fontRef idx="minor">
+      <a:schemeClr val="tx1">
+        <a:lumMod val="65000"/>
+        <a:lumOff val="35000"/>
+      </a:schemeClr>
+    </cs:fontRef>
+    <cs:defRPr sz="900" kern="1200"/>
+  </cs:seriesAxis>
+  <cs:seriesLine>
+    <cs:lnRef idx="0"/>
+    <cs:fillRef idx="0"/>
+    <cs:effectRef idx="0"/>
+    <cs:fontRef idx="minor">
+      <a:schemeClr val="tx1"/>
+    </cs:fontRef>
+    <cs:spPr>
+      <a:ln w="9525" cap="flat" cmpd="sng" algn="ctr">
+        <a:solidFill>
+          <a:schemeClr val="tx1">
+            <a:lumMod val="35000"/>
+            <a:lumOff val="65000"/>
+          </a:schemeClr>
+        </a:solidFill>
+        <a:round/>
+      </a:ln>
+    </cs:spPr>
+  </cs:seriesLine>
+  <cs:title>
+    <cs:lnRef idx="0"/>
+    <cs:fillRef idx="0"/>
+    <cs:effectRef idx="0"/>
+    <cs:fontRef idx="minor">
+      <a:schemeClr val="tx1">
+        <a:lumMod val="65000"/>
+        <a:lumOff val="35000"/>
+      </a:schemeClr>
+    </cs:fontRef>
+    <cs:defRPr sz="1400" b="0" kern="1200" spc="0" baseline="0"/>
+  </cs:title>
+  <cs:trendline>
+    <cs:lnRef idx="0">
+      <cs:styleClr val="auto"/>
+    </cs:lnRef>
+    <cs:fillRef idx="0"/>
+    <cs:effectRef idx="0"/>
+    <cs:fontRef idx="minor">
+      <a:schemeClr val="tx1"/>
+    </cs:fontRef>
+    <cs:spPr>
+      <a:ln w="19050" cap="rnd">
+        <a:solidFill>
+          <a:schemeClr val="phClr"/>
+        </a:solidFill>
+        <a:prstDash val="sysDot"/>
+      </a:ln>
+    </cs:spPr>
+  </cs:trendline>
+  <cs:trendlineLabel>
+    <cs:lnRef idx="0"/>
+    <cs:fillRef idx="0"/>
+    <cs:effectRef idx="0"/>
+    <cs:fontRef idx="minor">
+      <a:schemeClr val="tx1">
+        <a:lumMod val="65000"/>
+        <a:lumOff val="35000"/>
+      </a:schemeClr>
+    </cs:fontRef>
+    <cs:defRPr sz="900" kern="1200"/>
+  </cs:trendlineLabel>
+  <cs:upBar>
+    <cs:lnRef idx="0"/>
+    <cs:fillRef idx="0"/>
+    <cs:effectRef idx="0"/>
+    <cs:fontRef idx="minor">
+      <a:schemeClr val="dk1"/>
+    </cs:fontRef>
+    <cs:spPr>
+      <a:solidFill>
+        <a:schemeClr val="lt1"/>
+      </a:solidFill>
+      <a:ln w="9525">
+        <a:solidFill>
+          <a:schemeClr val="tx1">
+            <a:lumMod val="15000"/>
+            <a:lumOff val="85000"/>
+          </a:schemeClr>
+        </a:solidFill>
+      </a:ln>
+    </cs:spPr>
+  </cs:upBar>
+  <cs:valueAxis>
+    <cs:lnRef idx="0"/>
+    <cs:fillRef idx="0"/>
+    <cs:effectRef idx="0"/>
+    <cs:fontRef idx="minor">
+      <a:schemeClr val="tx1">
+        <a:lumMod val="65000"/>
+        <a:lumOff val="35000"/>
+      </a:schemeClr>
+    </cs:fontRef>
+    <cs:defRPr sz="900" kern="1200"/>
+  </cs:valueAxis>
+  <cs:wall>
+    <cs:lnRef idx="0"/>
+    <cs:fillRef idx="0"/>
+    <cs:effectRef idx="0"/>
+    <cs:fontRef idx="minor">
+      <a:schemeClr val="tx1"/>
+    </cs:fontRef>
+    <cs:spPr>
+      <a:noFill/>
+      <a:ln>
+        <a:noFill/>
+      </a:ln>
+    </cs:spPr>
+  </cs:wall>
+</cs:chartStyle>
+</file>
+
+<file path=ppt/notesMasters/notesMaster1.xml><?xml version="1.0" encoding="utf-8"?>
+<p:notesMaster xmlns:a="http://schemas.openxmlformats.org/drawingml/2006/main" xmlns:r="http://schemas.openxmlformats.org/officeDocument/2006/relationships" xmlns:p="http://schemas.openxmlformats.org/presentationml/2006/main">
+  <p:cSld>
+    <p:bg>
+      <p:bgRef idx="1001">
+        <a:schemeClr val="bg1"/>
+      </p:bgRef>
+    </p:bg>
+    <p:spTree>
+      <p:nvGrpSpPr>
+        <p:cNvPr id="1" name=""/>
+        <p:cNvGrpSpPr/>
+        <p:nvPr/>
+      </p:nvGrpSpPr>
+      <p:grpSpPr>
+        <a:xfrm>
+          <a:off x="0" y="0"/>
+          <a:ext cx="0" cy="0"/>
+          <a:chOff x="0" y="0"/>
+          <a:chExt cx="0" cy="0"/>
+        </a:xfrm>
+      </p:grpSpPr>
+      <p:sp>
+        <p:nvSpPr>
+          <p:cNvPr id="2" name="Header Placeholder 1"/>
+          <p:cNvSpPr>
+            <a:spLocks noGrp="1"/>
+          </p:cNvSpPr>
+          <p:nvPr>
+            <p:ph type="hdr" sz="quarter"/>
+          </p:nvPr>
+        </p:nvSpPr>
+        <p:spPr>
+          <a:xfrm>
+            <a:off x="0" y="0"/>
+            <a:ext cx="2971800" cy="458788"/>
+          </a:xfrm>
+          <a:prstGeom prst="rect">
+            <a:avLst/>
+          </a:prstGeom>
+        </p:spPr>
+        <p:txBody>
+          <a:bodyPr vert="horz" lIns="91440" tIns="45720" rIns="91440" bIns="45720" rtlCol="0"/>
+          <a:lstStyle>
+            <a:lvl1pPr algn="l">
+              <a:defRPr sz="1200"/>
+            </a:lvl1pPr>
+          </a:lstStyle>
+          <a:p>
+            <a:endParaRPr lang="en-US"/>
+          </a:p>
+        </p:txBody>
+      </p:sp>
+      <p:sp>
+        <p:nvSpPr>
+          <p:cNvPr id="3" name="Date Placeholder 2"/>
+          <p:cNvSpPr>
+            <a:spLocks noGrp="1"/>
+          </p:cNvSpPr>
+          <p:nvPr>
+            <p:ph type="dt" idx="1"/>
+          </p:nvPr>
+        </p:nvSpPr>
+        <p:spPr>
+          <a:xfrm>
+            <a:off x="3884613" y="0"/>
+            <a:ext cx="2971800" cy="458788"/>
+          </a:xfrm>
+          <a:prstGeom prst="rect">
+            <a:avLst/>
+          </a:prstGeom>
+        </p:spPr>
+        <p:txBody>
+          <a:bodyPr vert="horz" lIns="91440" tIns="45720" rIns="91440" bIns="45720" rtlCol="0"/>
+          <a:lstStyle>
+            <a:lvl1pPr algn="r">
+              <a:defRPr sz="1200"/>
+            </a:lvl1pPr>
+          </a:lstStyle>
+          <a:p>
+            <a:fld id="{054158E7-077C-4C7C-BD4B-A067E88E7289}" type="datetimeFigureOut">
+              <a:rPr lang="en-US" smtClean="0"/>
+              <a:t>6/30/2024</a:t>
+            </a:fld>
+            <a:endParaRPr lang="en-US"/>
+          </a:p>
+        </p:txBody>
+      </p:sp>
+      <p:sp>
+        <p:nvSpPr>
+          <p:cNvPr id="4" name="Slide Image Placeholder 3"/>
+          <p:cNvSpPr>
+            <a:spLocks noGrp="1" noRot="1" noChangeAspect="1"/>
+          </p:cNvSpPr>
+          <p:nvPr>
+            <p:ph type="sldImg" idx="2"/>
+          </p:nvPr>
+        </p:nvSpPr>
+        <p:spPr>
+          <a:xfrm>
+            <a:off x="685800" y="1143000"/>
+            <a:ext cx="5486400" cy="3086100"/>
+          </a:xfrm>
+          <a:prstGeom prst="rect">
+            <a:avLst/>
+          </a:prstGeom>
+          <a:noFill/>
+          <a:ln w="12700">
+            <a:solidFill>
+              <a:prstClr val="black"/>
+            </a:solidFill>
+          </a:ln>
+        </p:spPr>
+        <p:txBody>
+          <a:bodyPr vert="horz" lIns="91440" tIns="45720" rIns="91440" bIns="45720" rtlCol="0" anchor="ctr"/>
+          <a:lstStyle/>
+          <a:p>
+            <a:endParaRPr lang="en-US"/>
+          </a:p>
+        </p:txBody>
+      </p:sp>
+      <p:sp>
+        <p:nvSpPr>
+          <p:cNvPr id="5" name="Notes Placeholder 4"/>
+          <p:cNvSpPr>
+            <a:spLocks noGrp="1"/>
+          </p:cNvSpPr>
+          <p:nvPr>
+            <p:ph type="body" sz="quarter" idx="3"/>
+          </p:nvPr>
+        </p:nvSpPr>
+        <p:spPr>
+          <a:xfrm>
+            <a:off x="685800" y="4400550"/>
+            <a:ext cx="5486400" cy="3600450"/>
+          </a:xfrm>
+          <a:prstGeom prst="rect">
+            <a:avLst/>
+          </a:prstGeom>
+        </p:spPr>
+        <p:txBody>
+          <a:bodyPr vert="horz" lIns="91440" tIns="45720" rIns="91440" bIns="45720" rtlCol="0"/>
+          <a:lstStyle/>
+          <a:p>
+            <a:pPr lvl="0"/>
+            <a:r>
+              <a:rPr lang="en-US" smtClean="0"/>
+              <a:t>Edit Master text styles</a:t>
+            </a:r>
+          </a:p>
+          <a:p>
+            <a:pPr lvl="1"/>
+            <a:r>
+              <a:rPr lang="en-US" smtClean="0"/>
+              <a:t>Second level</a:t>
+            </a:r>
+          </a:p>
+          <a:p>
+            <a:pPr lvl="2"/>
+            <a:r>
+              <a:rPr lang="en-US" smtClean="0"/>
+              <a:t>Third level</a:t>
+            </a:r>
+          </a:p>
+          <a:p>
+            <a:pPr lvl="3"/>
+            <a:r>
+              <a:rPr lang="en-US" smtClean="0"/>
+              <a:t>Fourth level</a:t>
+            </a:r>
+          </a:p>
+          <a:p>
+            <a:pPr lvl="4"/>
+            <a:r>
+              <a:rPr lang="en-US" smtClean="0"/>
+              <a:t>Fifth level</a:t>
+            </a:r>
+            <a:endParaRPr lang="en-US"/>
+          </a:p>
+        </p:txBody>
+      </p:sp>
+      <p:sp>
+        <p:nvSpPr>
+          <p:cNvPr id="6" name="Footer Placeholder 5"/>
+          <p:cNvSpPr>
+            <a:spLocks noGrp="1"/>
+          </p:cNvSpPr>
+          <p:nvPr>
+            <p:ph type="ftr" sz="quarter" idx="4"/>
+          </p:nvPr>
+        </p:nvSpPr>
+        <p:spPr>
+          <a:xfrm>
+            <a:off x="0" y="8685213"/>
+            <a:ext cx="2971800" cy="458787"/>
+          </a:xfrm>
+          <a:prstGeom prst="rect">
+            <a:avLst/>
+          </a:prstGeom>
+        </p:spPr>
+        <p:txBody>
+          <a:bodyPr vert="horz" lIns="91440" tIns="45720" rIns="91440" bIns="45720" rtlCol="0" anchor="b"/>
+          <a:lstStyle>
+            <a:lvl1pPr algn="l">
+              <a:defRPr sz="1200"/>
+            </a:lvl1pPr>
+          </a:lstStyle>
+          <a:p>
+            <a:endParaRPr lang="en-US"/>
+          </a:p>
+        </p:txBody>
+      </p:sp>
+      <p:sp>
+        <p:nvSpPr>
+          <p:cNvPr id="7" name="Slide Number Placeholder 6"/>
+          <p:cNvSpPr>
+            <a:spLocks noGrp="1"/>
+          </p:cNvSpPr>
+          <p:nvPr>
+            <p:ph type="sldNum" sz="quarter" idx="5"/>
+          </p:nvPr>
+        </p:nvSpPr>
+        <p:spPr>
+          <a:xfrm>
+            <a:off x="3884613" y="8685213"/>
+            <a:ext cx="2971800" cy="458787"/>
+          </a:xfrm>
+          <a:prstGeom prst="rect">
+            <a:avLst/>
+          </a:prstGeom>
+        </p:spPr>
+        <p:txBody>
+          <a:bodyPr vert="horz" lIns="91440" tIns="45720" rIns="91440" bIns="45720" rtlCol="0" anchor="b"/>
+          <a:lstStyle>
+            <a:lvl1pPr algn="r">
+              <a:defRPr sz="1200"/>
+            </a:lvl1pPr>
+          </a:lstStyle>
+          <a:p>
+            <a:fld id="{9C75A850-D01F-4609-A459-FE408FB5BF3B}" type="slidenum">
+              <a:rPr lang="en-US" smtClean="0"/>
+              <a:t>‹#›</a:t>
+            </a:fld>
+            <a:endParaRPr lang="en-US"/>
+          </a:p>
+        </p:txBody>
+      </p:sp>
+    </p:spTree>
+    <p:extLst>
+      <p:ext uri="{BB962C8B-B14F-4D97-AF65-F5344CB8AC3E}">
+        <p14:creationId xmlns:p14="http://schemas.microsoft.com/office/powerpoint/2010/main" val="2109491334"/>
+      </p:ext>
+    </p:extLst>
+  </p:cSld>
+  <p:clrMap bg1="lt1" tx1="dk1" bg2="lt2" tx2="dk2" accent1="accent1" accent2="accent2" accent3="accent3" accent4="accent4" accent5="accent5" accent6="accent6" hlink="hlink" folHlink="folHlink"/>
+  <p:notesStyle>
+    <a:lvl1pPr marL="0" algn="l" defTabSz="914400" rtl="0" eaLnBrk="1" latinLnBrk="0" hangingPunct="1">
+      <a:defRPr sz="1200" kern="1200">
+        <a:solidFill>
+          <a:schemeClr val="tx1"/>
+        </a:solidFill>
+        <a:latin typeface="+mn-lt"/>
+        <a:ea typeface="+mn-ea"/>
+        <a:cs typeface="+mn-cs"/>
+      </a:defRPr>
+    </a:lvl1pPr>
+    <a:lvl2pPr marL="457200" algn="l" defTabSz="914400" rtl="0" eaLnBrk="1" latinLnBrk="0" hangingPunct="1">
+      <a:defRPr sz="1200" kern="1200">
+        <a:solidFill>
+          <a:schemeClr val="tx1"/>
+        </a:solidFill>
+        <a:latin typeface="+mn-lt"/>
+        <a:ea typeface="+mn-ea"/>
+        <a:cs typeface="+mn-cs"/>
+      </a:defRPr>
+    </a:lvl2pPr>
+    <a:lvl3pPr marL="914400" algn="l" defTabSz="914400" rtl="0" eaLnBrk="1" latinLnBrk="0" hangingPunct="1">
+      <a:defRPr sz="1200" kern="1200">
+        <a:solidFill>
+          <a:schemeClr val="tx1"/>
+        </a:solidFill>
+        <a:latin typeface="+mn-lt"/>
+        <a:ea typeface="+mn-ea"/>
+        <a:cs typeface="+mn-cs"/>
+      </a:defRPr>
+    </a:lvl3pPr>
+    <a:lvl4pPr marL="1371600" algn="l" defTabSz="914400" rtl="0" eaLnBrk="1" latinLnBrk="0" hangingPunct="1">
+      <a:defRPr sz="1200" kern="1200">
+        <a:solidFill>
+          <a:schemeClr val="tx1"/>
+        </a:solidFill>
+        <a:latin typeface="+mn-lt"/>
+        <a:ea typeface="+mn-ea"/>
+        <a:cs typeface="+mn-cs"/>
+      </a:defRPr>
+    </a:lvl4pPr>
+    <a:lvl5pPr marL="1828800" algn="l" defTabSz="914400" rtl="0" eaLnBrk="1" latinLnBrk="0" hangingPunct="1">
+      <a:defRPr sz="1200" kern="1200">
+        <a:solidFill>
+          <a:schemeClr val="tx1"/>
+        </a:solidFill>
+        <a:latin typeface="+mn-lt"/>
+        <a:ea typeface="+mn-ea"/>
+        <a:cs typeface="+mn-cs"/>
+      </a:defRPr>
+    </a:lvl5pPr>
+    <a:lvl6pPr marL="2286000" algn="l" defTabSz="914400" rtl="0" eaLnBrk="1" latinLnBrk="0" hangingPunct="1">
+      <a:defRPr sz="1200" kern="1200">
+        <a:solidFill>
+          <a:schemeClr val="tx1"/>
+        </a:solidFill>
+        <a:latin typeface="+mn-lt"/>
+        <a:ea typeface="+mn-ea"/>
+        <a:cs typeface="+mn-cs"/>
+      </a:defRPr>
+    </a:lvl6pPr>
+    <a:lvl7pPr marL="2743200" algn="l" defTabSz="914400" rtl="0" eaLnBrk="1" latinLnBrk="0" hangingPunct="1">
+      <a:defRPr sz="1200" kern="1200">
+        <a:solidFill>
+          <a:schemeClr val="tx1"/>
+        </a:solidFill>
+        <a:latin typeface="+mn-lt"/>
+        <a:ea typeface="+mn-ea"/>
+        <a:cs typeface="+mn-cs"/>
+      </a:defRPr>
+    </a:lvl7pPr>
+    <a:lvl8pPr marL="3200400" algn="l" defTabSz="914400" rtl="0" eaLnBrk="1" latinLnBrk="0" hangingPunct="1">
+      <a:defRPr sz="1200" kern="1200">
+        <a:solidFill>
+          <a:schemeClr val="tx1"/>
+        </a:solidFill>
+        <a:latin typeface="+mn-lt"/>
+        <a:ea typeface="+mn-ea"/>
+        <a:cs typeface="+mn-cs"/>
+      </a:defRPr>
+    </a:lvl8pPr>
+    <a:lvl9pPr marL="3657600" algn="l" defTabSz="914400" rtl="0" eaLnBrk="1" latinLnBrk="0" hangingPunct="1">
+      <a:defRPr sz="1200" kern="1200">
+        <a:solidFill>
+          <a:schemeClr val="tx1"/>
+        </a:solidFill>
+        <a:latin typeface="+mn-lt"/>
+        <a:ea typeface="+mn-ea"/>
+        <a:cs typeface="+mn-cs"/>
+      </a:defRPr>
+    </a:lvl9pPr>
+  </p:notesStyle>
+</p:notesMaster>
+</file>
+
+<file path=ppt/notesSlides/notesSlide1.xml><?xml version="1.0" encoding="utf-8"?>
+<p:notes xmlns:a="http://schemas.openxmlformats.org/drawingml/2006/main" xmlns:r="http://schemas.openxmlformats.org/officeDocument/2006/relationships" xmlns:p="http://schemas.openxmlformats.org/presentationml/2006/main">
+  <p:cSld>
+    <p:spTree>
+      <p:nvGrpSpPr>
+        <p:cNvPr id="1" name=""/>
+        <p:cNvGrpSpPr/>
+        <p:nvPr/>
+      </p:nvGrpSpPr>
+      <p:grpSpPr>
+        <a:xfrm>
+          <a:off x="0" y="0"/>
+          <a:ext cx="0" cy="0"/>
+          <a:chOff x="0" y="0"/>
+          <a:chExt cx="0" cy="0"/>
+        </a:xfrm>
+      </p:grpSpPr>
+      <p:sp>
+        <p:nvSpPr>
+          <p:cNvPr id="2" name="Slide Image Placeholder 1"/>
+          <p:cNvSpPr>
+            <a:spLocks noGrp="1" noRot="1" noChangeAspect="1"/>
+          </p:cNvSpPr>
+          <p:nvPr>
+            <p:ph type="sldImg"/>
+          </p:nvPr>
+        </p:nvSpPr>
+        <p:spPr/>
+      </p:sp>
+      <p:sp>
+        <p:nvSpPr>
+          <p:cNvPr id="3" name="Notes Placeholder 2"/>
+          <p:cNvSpPr>
+            <a:spLocks noGrp="1"/>
+          </p:cNvSpPr>
+          <p:nvPr>
+            <p:ph type="body" idx="1"/>
+          </p:nvPr>
+        </p:nvSpPr>
+        <p:spPr/>
+        <p:txBody>
+          <a:bodyPr/>
+          <a:lstStyle/>
+          <a:p>
+            <a:endParaRPr lang="en-US" dirty="0"/>
+          </a:p>
+        </p:txBody>
+      </p:sp>
+      <p:sp>
+        <p:nvSpPr>
+          <p:cNvPr id="4" name="Slide Number Placeholder 3"/>
+          <p:cNvSpPr>
+            <a:spLocks noGrp="1"/>
+          </p:cNvSpPr>
+          <p:nvPr>
+            <p:ph type="sldNum" sz="quarter" idx="10"/>
+          </p:nvPr>
+        </p:nvSpPr>
+        <p:spPr/>
+        <p:txBody>
+          <a:bodyPr/>
+          <a:lstStyle/>
+          <a:p>
+            <a:fld id="{9C75A850-D01F-4609-A459-FE408FB5BF3B}" type="slidenum">
+              <a:rPr lang="en-US" smtClean="0"/>
+              <a:t>5</a:t>
+            </a:fld>
+            <a:endParaRPr lang="en-US"/>
+          </a:p>
+        </p:txBody>
+      </p:sp>
+    </p:spTree>
+    <p:extLst>
+      <p:ext uri="{BB962C8B-B14F-4D97-AF65-F5344CB8AC3E}">
+        <p14:creationId xmlns:p14="http://schemas.microsoft.com/office/powerpoint/2010/main" val="158058473"/>
+      </p:ext>
+    </p:extLst>
+  </p:cSld>
+  <p:clrMapOvr>
+    <a:masterClrMapping/>
+  </p:clrMapOvr>
+</p:notes>
+</file>
+
 <file path=ppt/slideLayouts/slideLayout1.xml><?xml version="1.0" encoding="utf-8"?>
 <p:sldLayout xmlns:a="http://schemas.openxmlformats.org/drawingml/2006/main" xmlns:r="http://schemas.openxmlformats.org/officeDocument/2006/relationships" xmlns:p="http://schemas.openxmlformats.org/presentationml/2006/main" showMasterSp="0" type="title" preserve="1">
   <p:cSld name="Title Slide">
@@ -5732,6 +7426,111 @@
 </p:sld>
 </file>
 
+<file path=ppt/slides/slide5.xml><?xml version="1.0" encoding="utf-8"?>
+<p:sld xmlns:a="http://schemas.openxmlformats.org/drawingml/2006/main" xmlns:r="http://schemas.openxmlformats.org/officeDocument/2006/relationships" xmlns:p="http://schemas.openxmlformats.org/presentationml/2006/main">
+  <p:cSld>
+    <p:spTree>
+      <p:nvGrpSpPr>
+        <p:cNvPr id="1" name=""/>
+        <p:cNvGrpSpPr/>
+        <p:nvPr/>
+      </p:nvGrpSpPr>
+      <p:grpSpPr>
+        <a:xfrm>
+          <a:off x="0" y="0"/>
+          <a:ext cx="0" cy="0"/>
+          <a:chOff x="0" y="0"/>
+          <a:chExt cx="0" cy="0"/>
+        </a:xfrm>
+      </p:grpSpPr>
+      <p:sp>
+        <p:nvSpPr>
+          <p:cNvPr id="2" name="Title 1"/>
+          <p:cNvSpPr>
+            <a:spLocks noGrp="1"/>
+          </p:cNvSpPr>
+          <p:nvPr>
+            <p:ph type="title"/>
+          </p:nvPr>
+        </p:nvSpPr>
+        <p:spPr/>
+        <p:txBody>
+          <a:bodyPr>
+            <a:normAutofit/>
+          </a:bodyPr>
+          <a:lstStyle/>
+          <a:p>
+            <a:r>
+              <a:rPr lang="en-US" sz="4000" b="1" dirty="0" smtClean="0"/>
+              <a:t>What Days of Week are Affected</a:t>
+            </a:r>
+            <a:endParaRPr lang="en-US" sz="4000" b="1" dirty="0"/>
+          </a:p>
+        </p:txBody>
+      </p:sp>
+      <p:pic>
+        <p:nvPicPr>
+          <p:cNvPr id="9" name="Content Placeholder 8"/>
+          <p:cNvPicPr>
+            <a:picLocks noGrp="1" noChangeAspect="1"/>
+          </p:cNvPicPr>
+          <p:nvPr>
+            <p:ph idx="1"/>
+          </p:nvPr>
+        </p:nvPicPr>
+        <p:blipFill>
+          <a:blip r:embed="rId3"/>
+          <a:stretch>
+            <a:fillRect/>
+          </a:stretch>
+        </p:blipFill>
+        <p:spPr>
+          <a:xfrm>
+            <a:off x="1278731" y="2457451"/>
+            <a:ext cx="2750344" cy="2864644"/>
+          </a:xfrm>
+          <a:prstGeom prst="rect">
+            <a:avLst/>
+          </a:prstGeom>
+        </p:spPr>
+      </p:pic>
+      <p:graphicFrame>
+        <p:nvGraphicFramePr>
+          <p:cNvPr id="7" name="Chart 6"/>
+          <p:cNvGraphicFramePr>
+            <a:graphicFrameLocks/>
+          </p:cNvGraphicFramePr>
+          <p:nvPr>
+            <p:extLst>
+              <p:ext uri="{D42A27DB-BD31-4B8C-83A1-F6EECF244321}">
+                <p14:modId xmlns:p14="http://schemas.microsoft.com/office/powerpoint/2010/main" val="3272115273"/>
+              </p:ext>
+            </p:extLst>
+          </p:nvPr>
+        </p:nvGraphicFramePr>
+        <p:xfrm>
+          <a:off x="4422933" y="2114549"/>
+          <a:ext cx="6578441" cy="3514725"/>
+        </p:xfrm>
+        <a:graphic>
+          <a:graphicData uri="http://schemas.openxmlformats.org/drawingml/2006/chart">
+            <c:chart xmlns:c="http://schemas.openxmlformats.org/drawingml/2006/chart" xmlns:r="http://schemas.openxmlformats.org/officeDocument/2006/relationships" r:id="rId4"/>
+          </a:graphicData>
+        </a:graphic>
+      </p:graphicFrame>
+    </p:spTree>
+    <p:extLst>
+      <p:ext uri="{BB962C8B-B14F-4D97-AF65-F5344CB8AC3E}">
+        <p14:creationId xmlns:p14="http://schemas.microsoft.com/office/powerpoint/2010/main" val="2336312873"/>
+      </p:ext>
+    </p:extLst>
+  </p:cSld>
+  <p:clrMapOvr>
+    <a:masterClrMapping/>
+  </p:clrMapOvr>
+</p:sld>
+</file>
+
 <file path=ppt/theme/theme1.xml><?xml version="1.0" encoding="utf-8"?>
 <a:theme xmlns:a="http://schemas.openxmlformats.org/drawingml/2006/main" name="Retrospect">
   <a:themeElements>
@@ -6010,6 +7809,267 @@
   <a:extLst>
     <a:ext uri="{05A4C25C-085E-4340-85A3-A5531E510DB2}">
       <thm15:themeFamily xmlns:thm15="http://schemas.microsoft.com/office/thememl/2012/main" name="Retrospect" id="{5F128B03-DCCA-4EEB-AB3B-CF2899314A46}" vid="{3F1AAB62-24C6-49D2-8E01-B56FAC9A3DCD}"/>
+    </a:ext>
+  </a:extLst>
+</a:theme>
+</file>
+
+<file path=ppt/theme/theme2.xml><?xml version="1.0" encoding="utf-8"?>
+<a:theme xmlns:a="http://schemas.openxmlformats.org/drawingml/2006/main" name="Office Theme">
+  <a:themeElements>
+    <a:clrScheme name="Office">
+      <a:dk1>
+        <a:sysClr val="windowText" lastClr="000000"/>
+      </a:dk1>
+      <a:lt1>
+        <a:sysClr val="window" lastClr="FFFFFF"/>
+      </a:lt1>
+      <a:dk2>
+        <a:srgbClr val="44546A"/>
+      </a:dk2>
+      <a:lt2>
+        <a:srgbClr val="E7E6E6"/>
+      </a:lt2>
+      <a:accent1>
+        <a:srgbClr val="5B9BD5"/>
+      </a:accent1>
+      <a:accent2>
+        <a:srgbClr val="ED7D31"/>
+      </a:accent2>
+      <a:accent3>
+        <a:srgbClr val="A5A5A5"/>
+      </a:accent3>
+      <a:accent4>
+        <a:srgbClr val="FFC000"/>
+      </a:accent4>
+      <a:accent5>
+        <a:srgbClr val="4472C4"/>
+      </a:accent5>
+      <a:accent6>
+        <a:srgbClr val="70AD47"/>
+      </a:accent6>
+      <a:hlink>
+        <a:srgbClr val="0563C1"/>
+      </a:hlink>
+      <a:folHlink>
+        <a:srgbClr val="954F72"/>
+      </a:folHlink>
+    </a:clrScheme>
+    <a:fontScheme name="Office">
+      <a:majorFont>
+        <a:latin typeface="Calibri Light" panose="020F0302020204030204"/>
+        <a:ea typeface=""/>
+        <a:cs typeface=""/>
+        <a:font script="Jpan" typeface="游ゴシック Light"/>
+        <a:font script="Hang" typeface="맑은 고딕"/>
+        <a:font script="Hans" typeface="等线 Light"/>
+        <a:font script="Hant" typeface="新細明體"/>
+        <a:font script="Arab" typeface="Times New Roman"/>
+        <a:font script="Hebr" typeface="Times New Roman"/>
+        <a:font script="Thai" typeface="Angsana New"/>
+        <a:font script="Ethi" typeface="Nyala"/>
+        <a:font script="Beng" typeface="Vrinda"/>
+        <a:font script="Gujr" typeface="Shruti"/>
+        <a:font script="Khmr" typeface="MoolBoran"/>
+        <a:font script="Knda" typeface="Tunga"/>
+        <a:font script="Guru" typeface="Raavi"/>
+        <a:font script="Cans" typeface="Euphemia"/>
+        <a:font script="Cher" typeface="Plantagenet Cherokee"/>
+        <a:font script="Yiii" typeface="Microsoft Yi Baiti"/>
+        <a:font script="Tibt" typeface="Microsoft Himalaya"/>
+        <a:font script="Thaa" typeface="MV Boli"/>
+        <a:font script="Deva" typeface="Mangal"/>
+        <a:font script="Telu" typeface="Gautami"/>
+        <a:font script="Taml" typeface="Latha"/>
+        <a:font script="Syrc" typeface="Estrangelo Edessa"/>
+        <a:font script="Orya" typeface="Kalinga"/>
+        <a:font script="Mlym" typeface="Kartika"/>
+        <a:font script="Laoo" typeface="DokChampa"/>
+        <a:font script="Sinh" typeface="Iskoola Pota"/>
+        <a:font script="Mong" typeface="Mongolian Baiti"/>
+        <a:font script="Viet" typeface="Times New Roman"/>
+        <a:font script="Uigh" typeface="Microsoft Uighur"/>
+        <a:font script="Geor" typeface="Sylfaen"/>
+      </a:majorFont>
+      <a:minorFont>
+        <a:latin typeface="Calibri" panose="020F0502020204030204"/>
+        <a:ea typeface=""/>
+        <a:cs typeface=""/>
+        <a:font script="Jpan" typeface="游ゴシック"/>
+        <a:font script="Hang" typeface="맑은 고딕"/>
+        <a:font script="Hans" typeface="等线"/>
+        <a:font script="Hant" typeface="新細明體"/>
+        <a:font script="Arab" typeface="Arial"/>
+        <a:font script="Hebr" typeface="Arial"/>
+        <a:font script="Thai" typeface="Cordia New"/>
+        <a:font script="Ethi" typeface="Nyala"/>
+        <a:font script="Beng" typeface="Vrinda"/>
+        <a:font script="Gujr" typeface="Shruti"/>
+        <a:font script="Khmr" typeface="DaunPenh"/>
+        <a:font script="Knda" typeface="Tunga"/>
+        <a:font script="Guru" typeface="Raavi"/>
+        <a:font script="Cans" typeface="Euphemia"/>
+        <a:font script="Cher" typeface="Plantagenet Cherokee"/>
+        <a:font script="Yiii" typeface="Microsoft Yi Baiti"/>
+        <a:font script="Tibt" typeface="Microsoft Himalaya"/>
+        <a:font script="Thaa" typeface="MV Boli"/>
+        <a:font script="Deva" typeface="Mangal"/>
+        <a:font script="Telu" typeface="Gautami"/>
+        <a:font script="Taml" typeface="Latha"/>
+        <a:font script="Syrc" typeface="Estrangelo Edessa"/>
+        <a:font script="Orya" typeface="Kalinga"/>
+        <a:font script="Mlym" typeface="Kartika"/>
+        <a:font script="Laoo" typeface="DokChampa"/>
+        <a:font script="Sinh" typeface="Iskoola Pota"/>
+        <a:font script="Mong" typeface="Mongolian Baiti"/>
+        <a:font script="Viet" typeface="Arial"/>
+        <a:font script="Uigh" typeface="Microsoft Uighur"/>
+        <a:font script="Geor" typeface="Sylfaen"/>
+      </a:minorFont>
+    </a:fontScheme>
+    <a:fmtScheme name="Office">
+      <a:fillStyleLst>
+        <a:solidFill>
+          <a:schemeClr val="phClr"/>
+        </a:solidFill>
+        <a:gradFill rotWithShape="1">
+          <a:gsLst>
+            <a:gs pos="0">
+              <a:schemeClr val="phClr">
+                <a:lumMod val="110000"/>
+                <a:satMod val="105000"/>
+                <a:tint val="67000"/>
+              </a:schemeClr>
+            </a:gs>
+            <a:gs pos="50000">
+              <a:schemeClr val="phClr">
+                <a:lumMod val="105000"/>
+                <a:satMod val="103000"/>
+                <a:tint val="73000"/>
+              </a:schemeClr>
+            </a:gs>
+            <a:gs pos="100000">
+              <a:schemeClr val="phClr">
+                <a:lumMod val="105000"/>
+                <a:satMod val="109000"/>
+                <a:tint val="81000"/>
+              </a:schemeClr>
+            </a:gs>
+          </a:gsLst>
+          <a:lin ang="5400000" scaled="0"/>
+        </a:gradFill>
+        <a:gradFill rotWithShape="1">
+          <a:gsLst>
+            <a:gs pos="0">
+              <a:schemeClr val="phClr">
+                <a:satMod val="103000"/>
+                <a:lumMod val="102000"/>
+                <a:tint val="94000"/>
+              </a:schemeClr>
+            </a:gs>
+            <a:gs pos="50000">
+              <a:schemeClr val="phClr">
+                <a:satMod val="110000"/>
+                <a:lumMod val="100000"/>
+                <a:shade val="100000"/>
+              </a:schemeClr>
+            </a:gs>
+            <a:gs pos="100000">
+              <a:schemeClr val="phClr">
+                <a:lumMod val="99000"/>
+                <a:satMod val="120000"/>
+                <a:shade val="78000"/>
+              </a:schemeClr>
+            </a:gs>
+          </a:gsLst>
+          <a:lin ang="5400000" scaled="0"/>
+        </a:gradFill>
+      </a:fillStyleLst>
+      <a:lnStyleLst>
+        <a:ln w="6350" cap="flat" cmpd="sng" algn="ctr">
+          <a:solidFill>
+            <a:schemeClr val="phClr"/>
+          </a:solidFill>
+          <a:prstDash val="solid"/>
+          <a:miter lim="800000"/>
+        </a:ln>
+        <a:ln w="12700" cap="flat" cmpd="sng" algn="ctr">
+          <a:solidFill>
+            <a:schemeClr val="phClr"/>
+          </a:solidFill>
+          <a:prstDash val="solid"/>
+          <a:miter lim="800000"/>
+        </a:ln>
+        <a:ln w="19050" cap="flat" cmpd="sng" algn="ctr">
+          <a:solidFill>
+            <a:schemeClr val="phClr"/>
+          </a:solidFill>
+          <a:prstDash val="solid"/>
+          <a:miter lim="800000"/>
+        </a:ln>
+      </a:lnStyleLst>
+      <a:effectStyleLst>
+        <a:effectStyle>
+          <a:effectLst/>
+        </a:effectStyle>
+        <a:effectStyle>
+          <a:effectLst/>
+        </a:effectStyle>
+        <a:effectStyle>
+          <a:effectLst>
+            <a:outerShdw blurRad="57150" dist="19050" dir="5400000" algn="ctr" rotWithShape="0">
+              <a:srgbClr val="000000">
+                <a:alpha val="63000"/>
+              </a:srgbClr>
+            </a:outerShdw>
+          </a:effectLst>
+        </a:effectStyle>
+      </a:effectStyleLst>
+      <a:bgFillStyleLst>
+        <a:solidFill>
+          <a:schemeClr val="phClr"/>
+        </a:solidFill>
+        <a:solidFill>
+          <a:schemeClr val="phClr">
+            <a:tint val="95000"/>
+            <a:satMod val="170000"/>
+          </a:schemeClr>
+        </a:solidFill>
+        <a:gradFill rotWithShape="1">
+          <a:gsLst>
+            <a:gs pos="0">
+              <a:schemeClr val="phClr">
+                <a:tint val="93000"/>
+                <a:satMod val="150000"/>
+                <a:shade val="98000"/>
+                <a:lumMod val="102000"/>
+              </a:schemeClr>
+            </a:gs>
+            <a:gs pos="50000">
+              <a:schemeClr val="phClr">
+                <a:tint val="98000"/>
+                <a:satMod val="130000"/>
+                <a:shade val="90000"/>
+                <a:lumMod val="103000"/>
+              </a:schemeClr>
+            </a:gs>
+            <a:gs pos="100000">
+              <a:schemeClr val="phClr">
+                <a:shade val="63000"/>
+                <a:satMod val="120000"/>
+              </a:schemeClr>
+            </a:gs>
+          </a:gsLst>
+          <a:lin ang="5400000" scaled="0"/>
+        </a:gradFill>
+      </a:bgFillStyleLst>
+    </a:fmtScheme>
+  </a:themeElements>
+  <a:objectDefaults/>
+  <a:extraClrSchemeLst/>
+  <a:extLst>
+    <a:ext uri="{05A4C25C-085E-4340-85A3-A5531E510DB2}">
+      <thm15:themeFamily xmlns:thm15="http://schemas.microsoft.com/office/thememl/2012/main" name="Office Theme" id="{62F939B6-93AF-4DB8-9C6B-D6C7DFDC589F}" vid="{4A3C46E8-61CC-4603-A589-7422A47A8E4A}"/>
     </a:ext>
   </a:extLst>
 </a:theme>
@@ -6299,4 +8359,290 @@
     </a:bgFillStyleLst>
   </a:fmtScheme>
 </a:themeOverride>
+</file>
+
+<file path=ppt/theme/themeOverride2.xml><?xml version="1.0" encoding="utf-8"?>
+<a:themeOverride xmlns:a="http://schemas.openxmlformats.org/drawingml/2006/main">
+  <a:clrScheme name="Office">
+    <a:dk1>
+      <a:sysClr val="windowText" lastClr="000000"/>
+    </a:dk1>
+    <a:lt1>
+      <a:sysClr val="window" lastClr="FFFFFF"/>
+    </a:lt1>
+    <a:dk2>
+      <a:srgbClr val="44546A"/>
+    </a:dk2>
+    <a:lt2>
+      <a:srgbClr val="E7E6E6"/>
+    </a:lt2>
+    <a:accent1>
+      <a:srgbClr val="4472C4"/>
+    </a:accent1>
+    <a:accent2>
+      <a:srgbClr val="ED7D31"/>
+    </a:accent2>
+    <a:accent3>
+      <a:srgbClr val="A5A5A5"/>
+    </a:accent3>
+    <a:accent4>
+      <a:srgbClr val="FFC000"/>
+    </a:accent4>
+    <a:accent5>
+      <a:srgbClr val="5B9BD5"/>
+    </a:accent5>
+    <a:accent6>
+      <a:srgbClr val="70AD47"/>
+    </a:accent6>
+    <a:hlink>
+      <a:srgbClr val="0563C1"/>
+    </a:hlink>
+    <a:folHlink>
+      <a:srgbClr val="954F72"/>
+    </a:folHlink>
+  </a:clrScheme>
+  <a:fontScheme name="Office">
+    <a:majorFont>
+      <a:latin typeface="Calibri Light" panose="020F0302020204030204"/>
+      <a:ea typeface=""/>
+      <a:cs typeface=""/>
+      <a:font script="Jpan" typeface="游ゴシック Light"/>
+      <a:font script="Hang" typeface="맑은 고딕"/>
+      <a:font script="Hans" typeface="等线 Light"/>
+      <a:font script="Hant" typeface="新細明體"/>
+      <a:font script="Arab" typeface="Times New Roman"/>
+      <a:font script="Hebr" typeface="Times New Roman"/>
+      <a:font script="Thai" typeface="Tahoma"/>
+      <a:font script="Ethi" typeface="Nyala"/>
+      <a:font script="Beng" typeface="Vrinda"/>
+      <a:font script="Gujr" typeface="Shruti"/>
+      <a:font script="Khmr" typeface="MoolBoran"/>
+      <a:font script="Knda" typeface="Tunga"/>
+      <a:font script="Guru" typeface="Raavi"/>
+      <a:font script="Cans" typeface="Euphemia"/>
+      <a:font script="Cher" typeface="Plantagenet Cherokee"/>
+      <a:font script="Yiii" typeface="Microsoft Yi Baiti"/>
+      <a:font script="Tibt" typeface="Microsoft Himalaya"/>
+      <a:font script="Thaa" typeface="MV Boli"/>
+      <a:font script="Deva" typeface="Mangal"/>
+      <a:font script="Telu" typeface="Gautami"/>
+      <a:font script="Taml" typeface="Latha"/>
+      <a:font script="Syrc" typeface="Estrangelo Edessa"/>
+      <a:font script="Orya" typeface="Kalinga"/>
+      <a:font script="Mlym" typeface="Kartika"/>
+      <a:font script="Laoo" typeface="DokChampa"/>
+      <a:font script="Sinh" typeface="Iskoola Pota"/>
+      <a:font script="Mong" typeface="Mongolian Baiti"/>
+      <a:font script="Viet" typeface="Times New Roman"/>
+      <a:font script="Uigh" typeface="Microsoft Uighur"/>
+      <a:font script="Geor" typeface="Sylfaen"/>
+      <a:font script="Armn" typeface="Arial"/>
+      <a:font script="Bugi" typeface="Leelawadee UI"/>
+      <a:font script="Bopo" typeface="Microsoft JhengHei"/>
+      <a:font script="Java" typeface="Javanese Text"/>
+      <a:font script="Lisu" typeface="Segoe UI"/>
+      <a:font script="Mymr" typeface="Myanmar Text"/>
+      <a:font script="Nkoo" typeface="Ebrima"/>
+      <a:font script="Olck" typeface="Nirmala UI"/>
+      <a:font script="Osma" typeface="Ebrima"/>
+      <a:font script="Phag" typeface="Phagspa"/>
+      <a:font script="Syrn" typeface="Estrangelo Edessa"/>
+      <a:font script="Syrj" typeface="Estrangelo Edessa"/>
+      <a:font script="Syre" typeface="Estrangelo Edessa"/>
+      <a:font script="Sora" typeface="Nirmala UI"/>
+      <a:font script="Tale" typeface="Microsoft Tai Le"/>
+      <a:font script="Talu" typeface="Microsoft New Tai Lue"/>
+      <a:font script="Tfng" typeface="Ebrima"/>
+    </a:majorFont>
+    <a:minorFont>
+      <a:latin typeface="Calibri" panose="020F0502020204030204"/>
+      <a:ea typeface=""/>
+      <a:cs typeface=""/>
+      <a:font script="Jpan" typeface="游ゴシック"/>
+      <a:font script="Hang" typeface="맑은 고딕"/>
+      <a:font script="Hans" typeface="等线"/>
+      <a:font script="Hant" typeface="新細明體"/>
+      <a:font script="Arab" typeface="Arial"/>
+      <a:font script="Hebr" typeface="Arial"/>
+      <a:font script="Thai" typeface="Tahoma"/>
+      <a:font script="Ethi" typeface="Nyala"/>
+      <a:font script="Beng" typeface="Vrinda"/>
+      <a:font script="Gujr" typeface="Shruti"/>
+      <a:font script="Khmr" typeface="DaunPenh"/>
+      <a:font script="Knda" typeface="Tunga"/>
+      <a:font script="Guru" typeface="Raavi"/>
+      <a:font script="Cans" typeface="Euphemia"/>
+      <a:font script="Cher" typeface="Plantagenet Cherokee"/>
+      <a:font script="Yiii" typeface="Microsoft Yi Baiti"/>
+      <a:font script="Tibt" typeface="Microsoft Himalaya"/>
+      <a:font script="Thaa" typeface="MV Boli"/>
+      <a:font script="Deva" typeface="Mangal"/>
+      <a:font script="Telu" typeface="Gautami"/>
+      <a:font script="Taml" typeface="Latha"/>
+      <a:font script="Syrc" typeface="Estrangelo Edessa"/>
+      <a:font script="Orya" typeface="Kalinga"/>
+      <a:font script="Mlym" typeface="Kartika"/>
+      <a:font script="Laoo" typeface="DokChampa"/>
+      <a:font script="Sinh" typeface="Iskoola Pota"/>
+      <a:font script="Mong" typeface="Mongolian Baiti"/>
+      <a:font script="Viet" typeface="Arial"/>
+      <a:font script="Uigh" typeface="Microsoft Uighur"/>
+      <a:font script="Geor" typeface="Sylfaen"/>
+      <a:font script="Armn" typeface="Arial"/>
+      <a:font script="Bugi" typeface="Leelawadee UI"/>
+      <a:font script="Bopo" typeface="Microsoft JhengHei"/>
+      <a:font script="Java" typeface="Javanese Text"/>
+      <a:font script="Lisu" typeface="Segoe UI"/>
+      <a:font script="Mymr" typeface="Myanmar Text"/>
+      <a:font script="Nkoo" typeface="Ebrima"/>
+      <a:font script="Olck" typeface="Nirmala UI"/>
+      <a:font script="Osma" typeface="Ebrima"/>
+      <a:font script="Phag" typeface="Phagspa"/>
+      <a:font script="Syrn" typeface="Estrangelo Edessa"/>
+      <a:font script="Syrj" typeface="Estrangelo Edessa"/>
+      <a:font script="Syre" typeface="Estrangelo Edessa"/>
+      <a:font script="Sora" typeface="Nirmala UI"/>
+      <a:font script="Tale" typeface="Microsoft Tai Le"/>
+      <a:font script="Talu" typeface="Microsoft New Tai Lue"/>
+      <a:font script="Tfng" typeface="Ebrima"/>
+    </a:minorFont>
+  </a:fontScheme>
+  <a:fmtScheme name="Office">
+    <a:fillStyleLst>
+      <a:solidFill>
+        <a:schemeClr val="phClr"/>
+      </a:solidFill>
+      <a:gradFill rotWithShape="1">
+        <a:gsLst>
+          <a:gs pos="0">
+            <a:schemeClr val="phClr">
+              <a:lumMod val="110000"/>
+              <a:satMod val="105000"/>
+              <a:tint val="67000"/>
+            </a:schemeClr>
+          </a:gs>
+          <a:gs pos="50000">
+            <a:schemeClr val="phClr">
+              <a:lumMod val="105000"/>
+              <a:satMod val="103000"/>
+              <a:tint val="73000"/>
+            </a:schemeClr>
+          </a:gs>
+          <a:gs pos="100000">
+            <a:schemeClr val="phClr">
+              <a:lumMod val="105000"/>
+              <a:satMod val="109000"/>
+              <a:tint val="81000"/>
+            </a:schemeClr>
+          </a:gs>
+        </a:gsLst>
+        <a:lin ang="5400000" scaled="0"/>
+      </a:gradFill>
+      <a:gradFill rotWithShape="1">
+        <a:gsLst>
+          <a:gs pos="0">
+            <a:schemeClr val="phClr">
+              <a:satMod val="103000"/>
+              <a:lumMod val="102000"/>
+              <a:tint val="94000"/>
+            </a:schemeClr>
+          </a:gs>
+          <a:gs pos="50000">
+            <a:schemeClr val="phClr">
+              <a:satMod val="110000"/>
+              <a:lumMod val="100000"/>
+              <a:shade val="100000"/>
+            </a:schemeClr>
+          </a:gs>
+          <a:gs pos="100000">
+            <a:schemeClr val="phClr">
+              <a:lumMod val="99000"/>
+              <a:satMod val="120000"/>
+              <a:shade val="78000"/>
+            </a:schemeClr>
+          </a:gs>
+        </a:gsLst>
+        <a:lin ang="5400000" scaled="0"/>
+      </a:gradFill>
+    </a:fillStyleLst>
+    <a:lnStyleLst>
+      <a:ln w="6350" cap="flat" cmpd="sng" algn="ctr">
+        <a:solidFill>
+          <a:schemeClr val="phClr"/>
+        </a:solidFill>
+        <a:prstDash val="solid"/>
+        <a:miter lim="800000"/>
+      </a:ln>
+      <a:ln w="12700" cap="flat" cmpd="sng" algn="ctr">
+        <a:solidFill>
+          <a:schemeClr val="phClr"/>
+        </a:solidFill>
+        <a:prstDash val="solid"/>
+        <a:miter lim="800000"/>
+      </a:ln>
+      <a:ln w="19050" cap="flat" cmpd="sng" algn="ctr">
+        <a:solidFill>
+          <a:schemeClr val="phClr"/>
+        </a:solidFill>
+        <a:prstDash val="solid"/>
+        <a:miter lim="800000"/>
+      </a:ln>
+    </a:lnStyleLst>
+    <a:effectStyleLst>
+      <a:effectStyle>
+        <a:effectLst/>
+      </a:effectStyle>
+      <a:effectStyle>
+        <a:effectLst/>
+      </a:effectStyle>
+      <a:effectStyle>
+        <a:effectLst>
+          <a:outerShdw blurRad="57150" dist="19050" dir="5400000" algn="ctr" rotWithShape="0">
+            <a:srgbClr val="000000">
+              <a:alpha val="63000"/>
+            </a:srgbClr>
+          </a:outerShdw>
+        </a:effectLst>
+      </a:effectStyle>
+    </a:effectStyleLst>
+    <a:bgFillStyleLst>
+      <a:solidFill>
+        <a:schemeClr val="phClr"/>
+      </a:solidFill>
+      <a:solidFill>
+        <a:schemeClr val="phClr">
+          <a:tint val="95000"/>
+          <a:satMod val="170000"/>
+        </a:schemeClr>
+      </a:solidFill>
+      <a:gradFill rotWithShape="1">
+        <a:gsLst>
+          <a:gs pos="0">
+            <a:schemeClr val="phClr">
+              <a:tint val="93000"/>
+              <a:satMod val="150000"/>
+              <a:shade val="98000"/>
+              <a:lumMod val="102000"/>
+            </a:schemeClr>
+          </a:gs>
+          <a:gs pos="50000">
+            <a:schemeClr val="phClr">
+              <a:tint val="98000"/>
+              <a:satMod val="130000"/>
+              <a:shade val="90000"/>
+              <a:lumMod val="103000"/>
+            </a:schemeClr>
+          </a:gs>
+          <a:gs pos="100000">
+            <a:schemeClr val="phClr">
+              <a:shade val="63000"/>
+              <a:satMod val="120000"/>
+            </a:schemeClr>
+          </a:gs>
+        </a:gsLst>
+        <a:lin ang="5400000" scaled="0"/>
+      </a:gradFill>
+    </a:bgFillStyleLst>
+  </a:fmtScheme>
+</a:themeOverride>
 </file>
</xml_diff>

<commit_message>
Incorporated findings for wait time at different hours in the slide
</commit_message>
<xml_diff>
--- a/Hospital Analysis Overview & Findings.pptx
+++ b/Hospital Analysis Overview & Findings.pptx
@@ -5,7 +5,7 @@
     <p:sldMasterId id="2147483687" r:id="rId1"/>
   </p:sldMasterIdLst>
   <p:notesMasterIdLst>
-    <p:notesMasterId r:id="rId7"/>
+    <p:notesMasterId r:id="rId8"/>
   </p:notesMasterIdLst>
   <p:sldIdLst>
     <p:sldId id="256" r:id="rId2"/>
@@ -13,6 +13,7 @@
     <p:sldId id="258" r:id="rId4"/>
     <p:sldId id="259" r:id="rId5"/>
     <p:sldId id="260" r:id="rId6"/>
+    <p:sldId id="261" r:id="rId7"/>
   </p:sldIdLst>
   <p:sldSz cx="12192000" cy="6858000"/>
   <p:notesSz cx="6858000" cy="9144000"/>
@@ -267,7 +268,7 @@
                   <a:bodyPr/>
                   <a:lstStyle/>
                   <a:p>
-                    <a:fld id="{DB6347AD-0F14-4F5F-8695-17ECE89B9BF6}" type="CELLRANGE">
+                    <a:fld id="{C0396426-9B75-4CFF-9DF7-C629626411B8}" type="CELLRANGE">
                       <a:rPr lang="en-US" baseline="0"/>
                       <a:pPr/>
                       <a:t>[CELLRANGE]</a:t>
@@ -276,7 +277,7 @@
                       <a:rPr lang="en-US" baseline="0"/>
                       <a:t>, </a:t>
                     </a:r>
-                    <a:fld id="{4EF29741-6CD7-4841-89CD-2CC5F69EB401}" type="CATEGORYNAME">
+                    <a:fld id="{27983CA5-E09A-4710-9DF4-1A3A21ABE213}" type="CATEGORYNAME">
                       <a:rPr lang="en-US" baseline="0"/>
                       <a:pPr/>
                       <a:t>[CATEGORY NAME]</a:t>
@@ -285,7 +286,7 @@
                       <a:rPr lang="en-US" baseline="0"/>
                       <a:t>, </a:t>
                     </a:r>
-                    <a:fld id="{E4C160FC-3F25-4CBC-B279-19FD552BCE6E}" type="VALUE">
+                    <a:fld id="{F8E2522C-95D1-4111-8EA3-4CDAF6A1E73C}" type="VALUE">
                       <a:rPr lang="en-US" baseline="0"/>
                       <a:pPr/>
                       <a:t>[VALUE]</a:t>
@@ -320,7 +321,7 @@
                   <a:bodyPr/>
                   <a:lstStyle/>
                   <a:p>
-                    <a:fld id="{8F9D6933-1817-401B-8DB0-BC4C2FFD23A5}" type="CELLRANGE">
+                    <a:fld id="{75AC69FB-5E47-487A-90F5-1AD96E27070A}" type="CELLRANGE">
                       <a:rPr lang="en-US"/>
                       <a:pPr/>
                       <a:t>[CELLRANGE]</a:t>
@@ -329,7 +330,7 @@
                       <a:rPr lang="en-US" baseline="0"/>
                       <a:t>, </a:t>
                     </a:r>
-                    <a:fld id="{F84936D6-5601-437C-8CC5-57D0CD41FDC9}" type="CATEGORYNAME">
+                    <a:fld id="{B1050A1F-4864-411A-9E5F-5AF1F370408F}" type="CATEGORYNAME">
                       <a:rPr lang="en-US" baseline="0"/>
                       <a:pPr/>
                       <a:t>[CATEGORY NAME]</a:t>
@@ -338,7 +339,7 @@
                       <a:rPr lang="en-US" baseline="0"/>
                       <a:t>, </a:t>
                     </a:r>
-                    <a:fld id="{30251910-C15F-4C2F-89D9-A9D611CC9175}" type="VALUE">
+                    <a:fld id="{6828DEA3-AA46-4724-8212-EE76A015C4A4}" type="VALUE">
                       <a:rPr lang="en-US" baseline="0"/>
                       <a:pPr/>
                       <a:t>[VALUE]</a:t>
@@ -374,7 +375,7 @@
                   <a:bodyPr/>
                   <a:lstStyle/>
                   <a:p>
-                    <a:fld id="{7E5A6473-A4D1-4E31-9C4C-23CF84D94971}" type="CELLRANGE">
+                    <a:fld id="{9BFE1979-C708-42B4-8503-D884EAF2A6FD}" type="CELLRANGE">
                       <a:rPr lang="en-US"/>
                       <a:pPr/>
                       <a:t>[CELLRANGE]</a:t>
@@ -383,7 +384,7 @@
                       <a:rPr lang="en-US" baseline="0"/>
                       <a:t>, </a:t>
                     </a:r>
-                    <a:fld id="{D6AA71ED-AD3E-45A1-A309-69C89230D5DB}" type="CATEGORYNAME">
+                    <a:fld id="{A37C6904-DC41-47AC-9433-47C166012301}" type="CATEGORYNAME">
                       <a:rPr lang="en-US" baseline="0"/>
                       <a:pPr/>
                       <a:t>[CATEGORY NAME]</a:t>
@@ -392,7 +393,7 @@
                       <a:rPr lang="en-US" baseline="0"/>
                       <a:t>, </a:t>
                     </a:r>
-                    <a:fld id="{83BB55D3-0C5A-431E-8958-960E0F0CB5AB}" type="VALUE">
+                    <a:fld id="{82438DD4-815B-4C53-88E6-E95BBE0B105C}" type="VALUE">
                       <a:rPr lang="en-US" baseline="0"/>
                       <a:pPr/>
                       <a:t>[VALUE]</a:t>
@@ -428,7 +429,7 @@
                   <a:bodyPr/>
                   <a:lstStyle/>
                   <a:p>
-                    <a:fld id="{C77FAA4E-D2FD-4EA3-AAFE-80B5A59DF771}" type="CELLRANGE">
+                    <a:fld id="{953C01B5-A1DB-4D75-95EA-0E3860FC1906}" type="CELLRANGE">
                       <a:rPr lang="en-US"/>
                       <a:pPr/>
                       <a:t>[CELLRANGE]</a:t>
@@ -437,7 +438,7 @@
                       <a:rPr lang="en-US" baseline="0"/>
                       <a:t>, </a:t>
                     </a:r>
-                    <a:fld id="{F8634771-E609-4D6C-AD31-ADD3E38D91CF}" type="CATEGORYNAME">
+                    <a:fld id="{F0382CE5-E573-4EAB-A846-59AB12231B57}" type="CATEGORYNAME">
                       <a:rPr lang="en-US" baseline="0"/>
                       <a:pPr/>
                       <a:t>[CATEGORY NAME]</a:t>
@@ -446,7 +447,7 @@
                       <a:rPr lang="en-US" baseline="0"/>
                       <a:t>, </a:t>
                     </a:r>
-                    <a:fld id="{0F69DDA5-3257-4BAE-B1CC-A8072DF92625}" type="VALUE">
+                    <a:fld id="{82666E23-5475-4C9E-B15F-A77A8FE85089}" type="VALUE">
                       <a:rPr lang="en-US" baseline="0"/>
                       <a:pPr/>
                       <a:t>[VALUE]</a:t>
@@ -482,7 +483,7 @@
                   <a:bodyPr/>
                   <a:lstStyle/>
                   <a:p>
-                    <a:fld id="{B6498804-4CDE-4ECE-AB9C-8C62FFBFACAF}" type="CELLRANGE">
+                    <a:fld id="{41C8E12A-521D-4E31-90CC-4F892C0D307A}" type="CELLRANGE">
                       <a:rPr lang="en-US"/>
                       <a:pPr/>
                       <a:t>[CELLRANGE]</a:t>
@@ -491,7 +492,7 @@
                       <a:rPr lang="en-US" baseline="0"/>
                       <a:t>, </a:t>
                     </a:r>
-                    <a:fld id="{CABE19DB-00B1-41DA-BF1F-ACBC84CB2995}" type="CATEGORYNAME">
+                    <a:fld id="{5D39440B-9B62-4811-89B1-1AA7F8E36187}" type="CATEGORYNAME">
                       <a:rPr lang="en-US" baseline="0"/>
                       <a:pPr/>
                       <a:t>[CATEGORY NAME]</a:t>
@@ -500,7 +501,7 @@
                       <a:rPr lang="en-US" baseline="0"/>
                       <a:t>, </a:t>
                     </a:r>
-                    <a:fld id="{B706E869-7930-459F-90A8-448ECAB692B2}" type="VALUE">
+                    <a:fld id="{156E445A-1C0B-4002-B319-ADA41C0295A8}" type="VALUE">
                       <a:rPr lang="en-US" baseline="0"/>
                       <a:pPr/>
                       <a:t>[VALUE]</a:t>
@@ -851,7 +852,7 @@
                   <a:bodyPr/>
                   <a:lstStyle/>
                   <a:p>
-                    <a:fld id="{99405296-A20B-4468-A158-6850371ABA3F}" type="CELLRANGE">
+                    <a:fld id="{1E61A9C3-A6B4-457B-B4A8-93471995476E}" type="CELLRANGE">
                       <a:rPr lang="en-US"/>
                       <a:pPr/>
                       <a:t>[CELLRANGE]</a:t>
@@ -860,7 +861,7 @@
                       <a:rPr lang="en-US" baseline="0"/>
                       <a:t>, </a:t>
                     </a:r>
-                    <a:fld id="{5842B8C9-B950-4E33-BA62-2F84FA8B28FF}" type="VALUE">
+                    <a:fld id="{9C4E6C35-476A-438F-85AF-D76ABD7E70A0}" type="VALUE">
                       <a:rPr lang="en-US" baseline="0"/>
                       <a:pPr/>
                       <a:t>[VALUE]</a:t>
@@ -896,7 +897,7 @@
                   <a:bodyPr/>
                   <a:lstStyle/>
                   <a:p>
-                    <a:fld id="{5F889F67-4C8D-4A6E-BF62-0E230964099D}" type="CELLRANGE">
+                    <a:fld id="{E0B522CF-5A73-4BC8-A303-66A31B7D2193}" type="CELLRANGE">
                       <a:rPr lang="en-US"/>
                       <a:pPr/>
                       <a:t>[CELLRANGE]</a:t>
@@ -905,7 +906,7 @@
                       <a:rPr lang="en-US" baseline="0"/>
                       <a:t>, </a:t>
                     </a:r>
-                    <a:fld id="{3C655B39-6B6F-4BDA-AB70-BFC975F9AE3A}" type="VALUE">
+                    <a:fld id="{BF88D8C8-3A95-4CF5-8FFD-56AFD3670AC3}" type="VALUE">
                       <a:rPr lang="en-US" baseline="0"/>
                       <a:pPr/>
                       <a:t>[VALUE]</a:t>
@@ -941,7 +942,7 @@
                   <a:bodyPr/>
                   <a:lstStyle/>
                   <a:p>
-                    <a:fld id="{F3A16361-078B-46CE-93EE-53ECD8F736B0}" type="CELLRANGE">
+                    <a:fld id="{9D7768D1-FF12-4482-A875-1550B6A3FF54}" type="CELLRANGE">
                       <a:rPr lang="en-US"/>
                       <a:pPr/>
                       <a:t>[CELLRANGE]</a:t>
@@ -950,7 +951,7 @@
                       <a:rPr lang="en-US" baseline="0"/>
                       <a:t>, </a:t>
                     </a:r>
-                    <a:fld id="{A7B97F3E-57DE-4B0A-AE9E-6D1F06EE39D4}" type="VALUE">
+                    <a:fld id="{76487366-5E04-46A6-8DA5-56E21D5EDDE4}" type="VALUE">
                       <a:rPr lang="en-US" baseline="0"/>
                       <a:pPr/>
                       <a:t>[VALUE]</a:t>
@@ -986,7 +987,7 @@
                   <a:bodyPr/>
                   <a:lstStyle/>
                   <a:p>
-                    <a:fld id="{D83F8033-DD05-4830-AA2F-1B4BC24A3E9C}" type="CELLRANGE">
+                    <a:fld id="{6A11DDFF-8F1F-4475-9FC8-E4B59F77C643}" type="CELLRANGE">
                       <a:rPr lang="en-US"/>
                       <a:pPr/>
                       <a:t>[CELLRANGE]</a:t>
@@ -995,7 +996,7 @@
                       <a:rPr lang="en-US" baseline="0"/>
                       <a:t>, </a:t>
                     </a:r>
-                    <a:fld id="{5E13FA3A-A1C6-4688-8CE1-08E4C2F340BF}" type="VALUE">
+                    <a:fld id="{7805ADF1-2418-4A38-9BAB-C7375FB46226}" type="VALUE">
                       <a:rPr lang="en-US" baseline="0"/>
                       <a:pPr/>
                       <a:t>[VALUE]</a:t>
@@ -1031,7 +1032,7 @@
                   <a:bodyPr/>
                   <a:lstStyle/>
                   <a:p>
-                    <a:fld id="{AFA4D56A-0854-47FE-A625-DDC25D83A7D4}" type="CELLRANGE">
+                    <a:fld id="{4C6401C1-8F8E-4DBE-B7B5-F4DB6F011B39}" type="CELLRANGE">
                       <a:rPr lang="en-US"/>
                       <a:pPr/>
                       <a:t>[CELLRANGE]</a:t>
@@ -1040,7 +1041,7 @@
                       <a:rPr lang="en-US" baseline="0"/>
                       <a:t>, </a:t>
                     </a:r>
-                    <a:fld id="{6CD2724A-DEE2-4034-AAC8-5C5DBBD3061C}" type="VALUE">
+                    <a:fld id="{95FBA1D4-7531-4FED-A763-883C95210D1E}" type="VALUE">
                       <a:rPr lang="en-US" baseline="0"/>
                       <a:pPr/>
                       <a:t>[VALUE]</a:t>
@@ -1076,7 +1077,7 @@
                   <a:bodyPr/>
                   <a:lstStyle/>
                   <a:p>
-                    <a:fld id="{7CE26DB9-A5A7-48B5-830D-4762F341E3CB}" type="CELLRANGE">
+                    <a:fld id="{8784E69F-1EE8-49FA-BF34-4A961539B840}" type="CELLRANGE">
                       <a:rPr lang="en-US"/>
                       <a:pPr/>
                       <a:t>[CELLRANGE]</a:t>
@@ -1085,7 +1086,7 @@
                       <a:rPr lang="en-US" baseline="0"/>
                       <a:t>, </a:t>
                     </a:r>
-                    <a:fld id="{E13006EF-1BA3-40EC-9D59-9D2B033B63D8}" type="VALUE">
+                    <a:fld id="{6C398CFF-607E-406C-9C9A-B296D9AAF1D9}" type="VALUE">
                       <a:rPr lang="en-US" baseline="0"/>
                       <a:pPr/>
                       <a:t>[VALUE]</a:t>
@@ -1121,7 +1122,7 @@
                   <a:bodyPr/>
                   <a:lstStyle/>
                   <a:p>
-                    <a:fld id="{9F24EB22-0199-4271-9F63-EC3704C19534}" type="CELLRANGE">
+                    <a:fld id="{D4ED2EFA-8181-4636-94D7-01D968429A72}" type="CELLRANGE">
                       <a:rPr lang="en-US"/>
                       <a:pPr/>
                       <a:t>[CELLRANGE]</a:t>
@@ -1130,7 +1131,7 @@
                       <a:rPr lang="en-US" baseline="0"/>
                       <a:t>, </a:t>
                     </a:r>
-                    <a:fld id="{D776270E-C796-4BAF-BB8B-FAC1C9B26E6F}" type="VALUE">
+                    <a:fld id="{953EB691-428C-4FA4-83E7-26782FC18B5F}" type="VALUE">
                       <a:rPr lang="en-US" baseline="0"/>
                       <a:pPr/>
                       <a:t>[VALUE]</a:t>
@@ -1453,6 +1454,1154 @@
 </c:chartSpace>
 </file>
 
+<file path=ppt/charts/chart3.xml><?xml version="1.0" encoding="utf-8"?>
+<c:chartSpace xmlns:c="http://schemas.openxmlformats.org/drawingml/2006/chart" xmlns:a="http://schemas.openxmlformats.org/drawingml/2006/main" xmlns:r="http://schemas.openxmlformats.org/officeDocument/2006/relationships" xmlns:c16r2="http://schemas.microsoft.com/office/drawing/2015/06/chart">
+  <c:date1904 val="0"/>
+  <c:lang val="en-US"/>
+  <c:roundedCorners val="0"/>
+  <mc:AlternateContent xmlns:mc="http://schemas.openxmlformats.org/markup-compatibility/2006">
+    <mc:Choice xmlns:c14="http://schemas.microsoft.com/office/drawing/2007/8/2/chart" Requires="c14">
+      <c14:style val="102"/>
+    </mc:Choice>
+    <mc:Fallback>
+      <c:style val="2"/>
+    </mc:Fallback>
+  </mc:AlternateContent>
+  <c:clrMapOvr bg1="lt1" tx1="dk1" bg2="lt2" tx2="dk2" accent1="accent1" accent2="accent2" accent3="accent3" accent4="accent4" accent5="accent5" accent6="accent6" hlink="hlink" folHlink="folHlink"/>
+  <c:pivotSource>
+    <c:name>[hospital_data _ analysis.xlsx]Pivot table!PivotTable2</c:name>
+    <c:fmtId val="6"/>
+  </c:pivotSource>
+  <c:chart>
+    <c:autoTitleDeleted val="0"/>
+    <c:pivotFmts>
+      <c:pivotFmt>
+        <c:idx val="0"/>
+        <c:spPr>
+          <a:solidFill>
+            <a:schemeClr val="bg1">
+              <a:lumMod val="65000"/>
+            </a:schemeClr>
+          </a:solidFill>
+          <a:ln>
+            <a:solidFill>
+              <a:schemeClr val="tx1">
+                <a:lumMod val="50000"/>
+                <a:lumOff val="50000"/>
+              </a:schemeClr>
+            </a:solidFill>
+          </a:ln>
+          <a:effectLst/>
+        </c:spPr>
+        <c:marker>
+          <c:symbol val="none"/>
+        </c:marker>
+        <c:dLbl>
+          <c:idx val="0"/>
+          <c:spPr>
+            <a:noFill/>
+            <a:ln>
+              <a:noFill/>
+            </a:ln>
+            <a:effectLst/>
+          </c:spPr>
+          <c:txPr>
+            <a:bodyPr rot="0" spcFirstLastPara="1" vertOverflow="ellipsis" vert="horz" wrap="square" lIns="38100" tIns="19050" rIns="38100" bIns="19050" anchor="ctr" anchorCtr="1">
+              <a:spAutoFit/>
+            </a:bodyPr>
+            <a:lstStyle/>
+            <a:p>
+              <a:pPr>
+                <a:defRPr sz="900" b="0" i="0" u="none" strike="noStrike" kern="1200" baseline="0">
+                  <a:solidFill>
+                    <a:schemeClr val="tx1">
+                      <a:lumMod val="75000"/>
+                      <a:lumOff val="25000"/>
+                    </a:schemeClr>
+                  </a:solidFill>
+                  <a:latin typeface="+mn-lt"/>
+                  <a:ea typeface="+mn-ea"/>
+                  <a:cs typeface="+mn-cs"/>
+                </a:defRPr>
+              </a:pPr>
+              <a:endParaRPr lang="en-US"/>
+            </a:p>
+          </c:txPr>
+          <c:showLegendKey val="0"/>
+          <c:showVal val="1"/>
+          <c:showCatName val="0"/>
+          <c:showSerName val="0"/>
+          <c:showPercent val="0"/>
+          <c:showBubbleSize val="0"/>
+          <c:extLst>
+            <c:ext xmlns:c15="http://schemas.microsoft.com/office/drawing/2012/chart" uri="{CE6537A1-D6FC-4f65-9D91-7224C49458BB}"/>
+          </c:extLst>
+        </c:dLbl>
+      </c:pivotFmt>
+      <c:pivotFmt>
+        <c:idx val="1"/>
+        <c:spPr>
+          <a:solidFill>
+            <a:schemeClr val="accent1"/>
+          </a:solidFill>
+          <a:ln w="28575" cap="rnd">
+            <a:solidFill>
+              <a:schemeClr val="accent1"/>
+            </a:solidFill>
+            <a:round/>
+          </a:ln>
+          <a:effectLst/>
+        </c:spPr>
+        <c:marker>
+          <c:symbol val="none"/>
+        </c:marker>
+      </c:pivotFmt>
+      <c:pivotFmt>
+        <c:idx val="2"/>
+        <c:spPr>
+          <a:solidFill>
+            <a:schemeClr val="bg1">
+              <a:lumMod val="65000"/>
+            </a:schemeClr>
+          </a:solidFill>
+          <a:ln>
+            <a:solidFill>
+              <a:schemeClr val="tx1">
+                <a:lumMod val="50000"/>
+                <a:lumOff val="50000"/>
+              </a:schemeClr>
+            </a:solidFill>
+          </a:ln>
+          <a:effectLst/>
+        </c:spPr>
+      </c:pivotFmt>
+      <c:pivotFmt>
+        <c:idx val="3"/>
+        <c:spPr>
+          <a:solidFill>
+            <a:schemeClr val="bg1">
+              <a:lumMod val="65000"/>
+            </a:schemeClr>
+          </a:solidFill>
+          <a:ln>
+            <a:solidFill>
+              <a:schemeClr val="tx1">
+                <a:lumMod val="50000"/>
+                <a:lumOff val="50000"/>
+              </a:schemeClr>
+            </a:solidFill>
+          </a:ln>
+          <a:effectLst/>
+        </c:spPr>
+      </c:pivotFmt>
+      <c:pivotFmt>
+        <c:idx val="4"/>
+        <c:spPr>
+          <a:solidFill>
+            <a:schemeClr val="accent1"/>
+          </a:solidFill>
+          <a:ln>
+            <a:solidFill>
+              <a:schemeClr val="accent1"/>
+            </a:solidFill>
+          </a:ln>
+          <a:effectLst/>
+        </c:spPr>
+      </c:pivotFmt>
+      <c:pivotFmt>
+        <c:idx val="5"/>
+        <c:spPr>
+          <a:solidFill>
+            <a:schemeClr val="accent1"/>
+          </a:solidFill>
+          <a:ln>
+            <a:solidFill>
+              <a:schemeClr val="accent1"/>
+            </a:solidFill>
+          </a:ln>
+          <a:effectLst/>
+        </c:spPr>
+      </c:pivotFmt>
+      <c:pivotFmt>
+        <c:idx val="6"/>
+        <c:spPr>
+          <a:solidFill>
+            <a:schemeClr val="accent1"/>
+          </a:solidFill>
+          <a:ln>
+            <a:solidFill>
+              <a:schemeClr val="tx1">
+                <a:lumMod val="50000"/>
+                <a:lumOff val="50000"/>
+              </a:schemeClr>
+            </a:solidFill>
+          </a:ln>
+          <a:effectLst/>
+        </c:spPr>
+      </c:pivotFmt>
+      <c:pivotFmt>
+        <c:idx val="7"/>
+        <c:spPr>
+          <a:solidFill>
+            <a:schemeClr val="bg1">
+              <a:lumMod val="65000"/>
+            </a:schemeClr>
+          </a:solidFill>
+          <a:ln>
+            <a:solidFill>
+              <a:schemeClr val="tx1">
+                <a:lumMod val="50000"/>
+                <a:lumOff val="50000"/>
+              </a:schemeClr>
+            </a:solidFill>
+          </a:ln>
+          <a:effectLst/>
+        </c:spPr>
+        <c:marker>
+          <c:symbol val="none"/>
+        </c:marker>
+        <c:dLbl>
+          <c:idx val="0"/>
+          <c:spPr>
+            <a:noFill/>
+            <a:ln>
+              <a:noFill/>
+            </a:ln>
+            <a:effectLst/>
+          </c:spPr>
+          <c:txPr>
+            <a:bodyPr rot="0" spcFirstLastPara="1" vertOverflow="ellipsis" vert="horz" wrap="square" lIns="38100" tIns="19050" rIns="38100" bIns="19050" anchor="ctr" anchorCtr="1">
+              <a:spAutoFit/>
+            </a:bodyPr>
+            <a:lstStyle/>
+            <a:p>
+              <a:pPr>
+                <a:defRPr sz="900" b="0" i="0" u="none" strike="noStrike" kern="1200" baseline="0">
+                  <a:solidFill>
+                    <a:schemeClr val="tx1">
+                      <a:lumMod val="75000"/>
+                      <a:lumOff val="25000"/>
+                    </a:schemeClr>
+                  </a:solidFill>
+                  <a:latin typeface="+mn-lt"/>
+                  <a:ea typeface="+mn-ea"/>
+                  <a:cs typeface="+mn-cs"/>
+                </a:defRPr>
+              </a:pPr>
+              <a:endParaRPr lang="en-US"/>
+            </a:p>
+          </c:txPr>
+          <c:showLegendKey val="0"/>
+          <c:showVal val="1"/>
+          <c:showCatName val="0"/>
+          <c:showSerName val="0"/>
+          <c:showPercent val="0"/>
+          <c:showBubbleSize val="0"/>
+          <c:extLst>
+            <c:ext xmlns:c15="http://schemas.microsoft.com/office/drawing/2012/chart" uri="{CE6537A1-D6FC-4f65-9D91-7224C49458BB}"/>
+          </c:extLst>
+        </c:dLbl>
+      </c:pivotFmt>
+      <c:pivotFmt>
+        <c:idx val="8"/>
+        <c:spPr>
+          <a:solidFill>
+            <a:schemeClr val="accent1"/>
+          </a:solidFill>
+          <a:ln>
+            <a:solidFill>
+              <a:schemeClr val="tx1">
+                <a:lumMod val="50000"/>
+                <a:lumOff val="50000"/>
+              </a:schemeClr>
+            </a:solidFill>
+          </a:ln>
+          <a:effectLst/>
+        </c:spPr>
+      </c:pivotFmt>
+      <c:pivotFmt>
+        <c:idx val="9"/>
+        <c:spPr>
+          <a:solidFill>
+            <a:schemeClr val="accent1"/>
+          </a:solidFill>
+          <a:ln>
+            <a:solidFill>
+              <a:schemeClr val="accent1"/>
+            </a:solidFill>
+          </a:ln>
+          <a:effectLst/>
+        </c:spPr>
+      </c:pivotFmt>
+      <c:pivotFmt>
+        <c:idx val="10"/>
+        <c:spPr>
+          <a:solidFill>
+            <a:schemeClr val="accent1"/>
+          </a:solidFill>
+          <a:ln>
+            <a:solidFill>
+              <a:schemeClr val="accent1"/>
+            </a:solidFill>
+          </a:ln>
+          <a:effectLst/>
+        </c:spPr>
+      </c:pivotFmt>
+      <c:pivotFmt>
+        <c:idx val="11"/>
+        <c:spPr>
+          <a:solidFill>
+            <a:schemeClr val="accent1"/>
+          </a:solidFill>
+          <a:ln w="28575" cap="rnd">
+            <a:solidFill>
+              <a:schemeClr val="accent1"/>
+            </a:solidFill>
+            <a:round/>
+          </a:ln>
+          <a:effectLst/>
+        </c:spPr>
+        <c:marker>
+          <c:symbol val="none"/>
+        </c:marker>
+      </c:pivotFmt>
+      <c:pivotFmt>
+        <c:idx val="12"/>
+        <c:spPr>
+          <a:solidFill>
+            <a:schemeClr val="bg1">
+              <a:lumMod val="65000"/>
+            </a:schemeClr>
+          </a:solidFill>
+          <a:ln>
+            <a:solidFill>
+              <a:schemeClr val="tx1">
+                <a:lumMod val="50000"/>
+                <a:lumOff val="50000"/>
+              </a:schemeClr>
+            </a:solidFill>
+          </a:ln>
+          <a:effectLst/>
+        </c:spPr>
+        <c:marker>
+          <c:symbol val="none"/>
+        </c:marker>
+        <c:dLbl>
+          <c:idx val="0"/>
+          <c:spPr>
+            <a:noFill/>
+            <a:ln>
+              <a:noFill/>
+            </a:ln>
+            <a:effectLst/>
+          </c:spPr>
+          <c:txPr>
+            <a:bodyPr rot="0" spcFirstLastPara="1" vertOverflow="ellipsis" vert="horz" wrap="square" lIns="38100" tIns="19050" rIns="38100" bIns="19050" anchor="ctr" anchorCtr="1">
+              <a:spAutoFit/>
+            </a:bodyPr>
+            <a:lstStyle/>
+            <a:p>
+              <a:pPr>
+                <a:defRPr sz="900" b="0" i="0" u="none" strike="noStrike" kern="1200" baseline="0">
+                  <a:solidFill>
+                    <a:schemeClr val="tx1">
+                      <a:lumMod val="75000"/>
+                      <a:lumOff val="25000"/>
+                    </a:schemeClr>
+                  </a:solidFill>
+                  <a:latin typeface="+mn-lt"/>
+                  <a:ea typeface="+mn-ea"/>
+                  <a:cs typeface="+mn-cs"/>
+                </a:defRPr>
+              </a:pPr>
+              <a:endParaRPr lang="en-US"/>
+            </a:p>
+          </c:txPr>
+          <c:showLegendKey val="0"/>
+          <c:showVal val="1"/>
+          <c:showCatName val="0"/>
+          <c:showSerName val="0"/>
+          <c:showPercent val="0"/>
+          <c:showBubbleSize val="0"/>
+          <c:extLst>
+            <c:ext xmlns:c15="http://schemas.microsoft.com/office/drawing/2012/chart" uri="{CE6537A1-D6FC-4f65-9D91-7224C49458BB}"/>
+          </c:extLst>
+        </c:dLbl>
+      </c:pivotFmt>
+      <c:pivotFmt>
+        <c:idx val="13"/>
+        <c:spPr>
+          <a:solidFill>
+            <a:schemeClr val="accent1"/>
+          </a:solidFill>
+          <a:ln>
+            <a:solidFill>
+              <a:schemeClr val="tx1">
+                <a:lumMod val="50000"/>
+                <a:lumOff val="50000"/>
+              </a:schemeClr>
+            </a:solidFill>
+          </a:ln>
+          <a:effectLst/>
+        </c:spPr>
+      </c:pivotFmt>
+      <c:pivotFmt>
+        <c:idx val="14"/>
+        <c:spPr>
+          <a:solidFill>
+            <a:schemeClr val="accent1"/>
+          </a:solidFill>
+          <a:ln>
+            <a:solidFill>
+              <a:schemeClr val="accent1"/>
+            </a:solidFill>
+          </a:ln>
+          <a:effectLst/>
+        </c:spPr>
+      </c:pivotFmt>
+      <c:pivotFmt>
+        <c:idx val="15"/>
+        <c:spPr>
+          <a:solidFill>
+            <a:schemeClr val="accent1"/>
+          </a:solidFill>
+          <a:ln>
+            <a:solidFill>
+              <a:schemeClr val="accent1"/>
+            </a:solidFill>
+          </a:ln>
+          <a:effectLst/>
+        </c:spPr>
+      </c:pivotFmt>
+      <c:pivotFmt>
+        <c:idx val="16"/>
+        <c:spPr>
+          <a:solidFill>
+            <a:schemeClr val="accent1"/>
+          </a:solidFill>
+          <a:ln w="28575" cap="rnd">
+            <a:solidFill>
+              <a:schemeClr val="accent1"/>
+            </a:solidFill>
+            <a:round/>
+          </a:ln>
+          <a:effectLst/>
+        </c:spPr>
+        <c:marker>
+          <c:symbol val="none"/>
+        </c:marker>
+      </c:pivotFmt>
+    </c:pivotFmts>
+    <c:plotArea>
+      <c:layout/>
+      <c:barChart>
+        <c:barDir val="col"/>
+        <c:grouping val="clustered"/>
+        <c:varyColors val="0"/>
+        <c:ser>
+          <c:idx val="0"/>
+          <c:order val="0"/>
+          <c:tx>
+            <c:strRef>
+              <c:f>'Pivot table'!$H$3</c:f>
+              <c:strCache>
+                <c:ptCount val="1"/>
+                <c:pt idx="0">
+                  <c:v>Average of Wait Time in Minutes</c:v>
+                </c:pt>
+              </c:strCache>
+            </c:strRef>
+          </c:tx>
+          <c:spPr>
+            <a:solidFill>
+              <a:schemeClr val="bg1">
+                <a:lumMod val="65000"/>
+              </a:schemeClr>
+            </a:solidFill>
+            <a:ln>
+              <a:solidFill>
+                <a:schemeClr val="tx1">
+                  <a:lumMod val="50000"/>
+                  <a:lumOff val="50000"/>
+                </a:schemeClr>
+              </a:solidFill>
+            </a:ln>
+            <a:effectLst/>
+          </c:spPr>
+          <c:invertIfNegative val="0"/>
+          <c:dPt>
+            <c:idx val="0"/>
+            <c:invertIfNegative val="0"/>
+            <c:bubble3D val="0"/>
+            <c:spPr>
+              <a:solidFill>
+                <a:schemeClr val="accent1"/>
+              </a:solidFill>
+              <a:ln>
+                <a:solidFill>
+                  <a:schemeClr val="tx1">
+                    <a:lumMod val="50000"/>
+                    <a:lumOff val="50000"/>
+                  </a:schemeClr>
+                </a:solidFill>
+              </a:ln>
+              <a:effectLst/>
+            </c:spPr>
+            <c:extLst>
+              <c:ext xmlns:c16="http://schemas.microsoft.com/office/drawing/2014/chart" uri="{C3380CC4-5D6E-409C-BE32-E72D297353CC}">
+                <c16:uniqueId val="{00000001-7413-4F7E-AC51-C407298F591A}"/>
+              </c:ext>
+            </c:extLst>
+          </c:dPt>
+          <c:dPt>
+            <c:idx val="1"/>
+            <c:invertIfNegative val="0"/>
+            <c:bubble3D val="0"/>
+            <c:spPr>
+              <a:solidFill>
+                <a:schemeClr val="accent1"/>
+              </a:solidFill>
+              <a:ln>
+                <a:solidFill>
+                  <a:schemeClr val="accent1"/>
+                </a:solidFill>
+              </a:ln>
+              <a:effectLst/>
+            </c:spPr>
+            <c:extLst>
+              <c:ext xmlns:c16="http://schemas.microsoft.com/office/drawing/2014/chart" uri="{C3380CC4-5D6E-409C-BE32-E72D297353CC}">
+                <c16:uniqueId val="{00000003-7413-4F7E-AC51-C407298F591A}"/>
+              </c:ext>
+            </c:extLst>
+          </c:dPt>
+          <c:dPt>
+            <c:idx val="2"/>
+            <c:invertIfNegative val="0"/>
+            <c:bubble3D val="0"/>
+            <c:spPr>
+              <a:solidFill>
+                <a:schemeClr val="accent1"/>
+              </a:solidFill>
+              <a:ln>
+                <a:solidFill>
+                  <a:schemeClr val="accent1"/>
+                </a:solidFill>
+              </a:ln>
+              <a:effectLst/>
+            </c:spPr>
+            <c:extLst>
+              <c:ext xmlns:c16="http://schemas.microsoft.com/office/drawing/2014/chart" uri="{C3380CC4-5D6E-409C-BE32-E72D297353CC}">
+                <c16:uniqueId val="{00000005-7413-4F7E-AC51-C407298F591A}"/>
+              </c:ext>
+            </c:extLst>
+          </c:dPt>
+          <c:dLbls>
+            <c:spPr>
+              <a:noFill/>
+              <a:ln>
+                <a:noFill/>
+              </a:ln>
+              <a:effectLst/>
+            </c:spPr>
+            <c:txPr>
+              <a:bodyPr rot="0" spcFirstLastPara="1" vertOverflow="ellipsis" vert="horz" wrap="square" lIns="38100" tIns="19050" rIns="38100" bIns="19050" anchor="ctr" anchorCtr="1">
+                <a:spAutoFit/>
+              </a:bodyPr>
+              <a:lstStyle/>
+              <a:p>
+                <a:pPr>
+                  <a:defRPr sz="900" b="0" i="0" u="none" strike="noStrike" kern="1200" baseline="0">
+                    <a:solidFill>
+                      <a:schemeClr val="tx1">
+                        <a:lumMod val="75000"/>
+                        <a:lumOff val="25000"/>
+                      </a:schemeClr>
+                    </a:solidFill>
+                    <a:latin typeface="+mn-lt"/>
+                    <a:ea typeface="+mn-ea"/>
+                    <a:cs typeface="+mn-cs"/>
+                  </a:defRPr>
+                </a:pPr>
+                <a:endParaRPr lang="en-US"/>
+              </a:p>
+            </c:txPr>
+            <c:showLegendKey val="0"/>
+            <c:showVal val="1"/>
+            <c:showCatName val="0"/>
+            <c:showSerName val="0"/>
+            <c:showPercent val="0"/>
+            <c:showBubbleSize val="0"/>
+            <c:showLeaderLines val="0"/>
+            <c:extLst>
+              <c:ext xmlns:c15="http://schemas.microsoft.com/office/drawing/2012/chart" uri="{CE6537A1-D6FC-4f65-9D91-7224C49458BB}">
+                <c15:layout/>
+                <c15:showLeaderLines val="1"/>
+                <c15:leaderLines>
+                  <c:spPr>
+                    <a:ln w="9525" cap="flat" cmpd="sng" algn="ctr">
+                      <a:solidFill>
+                        <a:schemeClr val="tx1">
+                          <a:lumMod val="35000"/>
+                          <a:lumOff val="65000"/>
+                        </a:schemeClr>
+                      </a:solidFill>
+                      <a:round/>
+                    </a:ln>
+                    <a:effectLst/>
+                  </c:spPr>
+                </c15:leaderLines>
+              </c:ext>
+            </c:extLst>
+          </c:dLbls>
+          <c:cat>
+            <c:strRef>
+              <c:f>'Pivot table'!$G$4:$G$20</c:f>
+              <c:strCache>
+                <c:ptCount val="16"/>
+                <c:pt idx="0">
+                  <c:v>8</c:v>
+                </c:pt>
+                <c:pt idx="1">
+                  <c:v>9</c:v>
+                </c:pt>
+                <c:pt idx="2">
+                  <c:v>10</c:v>
+                </c:pt>
+                <c:pt idx="3">
+                  <c:v>11</c:v>
+                </c:pt>
+                <c:pt idx="4">
+                  <c:v>12</c:v>
+                </c:pt>
+                <c:pt idx="5">
+                  <c:v>13</c:v>
+                </c:pt>
+                <c:pt idx="6">
+                  <c:v>14</c:v>
+                </c:pt>
+                <c:pt idx="7">
+                  <c:v>15</c:v>
+                </c:pt>
+                <c:pt idx="8">
+                  <c:v>16</c:v>
+                </c:pt>
+                <c:pt idx="9">
+                  <c:v>17</c:v>
+                </c:pt>
+                <c:pt idx="10">
+                  <c:v>18</c:v>
+                </c:pt>
+                <c:pt idx="11">
+                  <c:v>19</c:v>
+                </c:pt>
+                <c:pt idx="12">
+                  <c:v>20</c:v>
+                </c:pt>
+                <c:pt idx="13">
+                  <c:v>21</c:v>
+                </c:pt>
+                <c:pt idx="14">
+                  <c:v>22</c:v>
+                </c:pt>
+                <c:pt idx="15">
+                  <c:v>23</c:v>
+                </c:pt>
+              </c:strCache>
+            </c:strRef>
+          </c:cat>
+          <c:val>
+            <c:numRef>
+              <c:f>'Pivot table'!$H$4:$H$20</c:f>
+              <c:numCache>
+                <c:formatCode>0</c:formatCode>
+                <c:ptCount val="16"/>
+                <c:pt idx="0">
+                  <c:v>52.561670010509168</c:v>
+                </c:pt>
+                <c:pt idx="1">
+                  <c:v>59.415592273679387</c:v>
+                </c:pt>
+                <c:pt idx="2">
+                  <c:v>52.012835144927607</c:v>
+                </c:pt>
+                <c:pt idx="3">
+                  <c:v>41.769363783020793</c:v>
+                </c:pt>
+                <c:pt idx="4">
+                  <c:v>35.032480405716967</c:v>
+                </c:pt>
+                <c:pt idx="5">
+                  <c:v>43.449882629107996</c:v>
+                </c:pt>
+                <c:pt idx="6">
+                  <c:v>42.170907590759107</c:v>
+                </c:pt>
+                <c:pt idx="7">
+                  <c:v>37.840173253925244</c:v>
+                </c:pt>
+                <c:pt idx="8">
+                  <c:v>27.752788897784885</c:v>
+                </c:pt>
+                <c:pt idx="9">
+                  <c:v>24.972374429223731</c:v>
+                </c:pt>
+                <c:pt idx="10">
+                  <c:v>37.887538461538377</c:v>
+                </c:pt>
+                <c:pt idx="11">
+                  <c:v>38.191369178786502</c:v>
+                </c:pt>
+                <c:pt idx="12">
+                  <c:v>28.333848797250877</c:v>
+                </c:pt>
+                <c:pt idx="13">
+                  <c:v>22.179300000000008</c:v>
+                </c:pt>
+                <c:pt idx="14">
+                  <c:v>16.043207282913169</c:v>
+                </c:pt>
+                <c:pt idx="15">
+                  <c:v>12.792708333333339</c:v>
+                </c:pt>
+              </c:numCache>
+            </c:numRef>
+          </c:val>
+          <c:extLst>
+            <c:ext xmlns:c16="http://schemas.microsoft.com/office/drawing/2014/chart" uri="{C3380CC4-5D6E-409C-BE32-E72D297353CC}">
+              <c16:uniqueId val="{00000006-7413-4F7E-AC51-C407298F591A}"/>
+            </c:ext>
+          </c:extLst>
+        </c:ser>
+        <c:dLbls>
+          <c:showLegendKey val="0"/>
+          <c:showVal val="1"/>
+          <c:showCatName val="0"/>
+          <c:showSerName val="0"/>
+          <c:showPercent val="0"/>
+          <c:showBubbleSize val="0"/>
+        </c:dLbls>
+        <c:gapWidth val="44"/>
+        <c:overlap val="-27"/>
+        <c:axId val="1082348448"/>
+        <c:axId val="1082328064"/>
+      </c:barChart>
+      <c:lineChart>
+        <c:grouping val="standard"/>
+        <c:varyColors val="0"/>
+        <c:ser>
+          <c:idx val="1"/>
+          <c:order val="1"/>
+          <c:tx>
+            <c:strRef>
+              <c:f>'Pivot table'!$I$3</c:f>
+              <c:strCache>
+                <c:ptCount val="1"/>
+                <c:pt idx="0">
+                  <c:v>Count of Patient ID</c:v>
+                </c:pt>
+              </c:strCache>
+            </c:strRef>
+          </c:tx>
+          <c:spPr>
+            <a:ln w="28575" cap="rnd">
+              <a:solidFill>
+                <a:schemeClr val="accent2"/>
+              </a:solidFill>
+              <a:round/>
+            </a:ln>
+            <a:effectLst/>
+          </c:spPr>
+          <c:marker>
+            <c:symbol val="none"/>
+          </c:marker>
+          <c:dLbls>
+            <c:delete val="1"/>
+          </c:dLbls>
+          <c:cat>
+            <c:strRef>
+              <c:f>'Pivot table'!$G$4:$G$20</c:f>
+              <c:strCache>
+                <c:ptCount val="16"/>
+                <c:pt idx="0">
+                  <c:v>8</c:v>
+                </c:pt>
+                <c:pt idx="1">
+                  <c:v>9</c:v>
+                </c:pt>
+                <c:pt idx="2">
+                  <c:v>10</c:v>
+                </c:pt>
+                <c:pt idx="3">
+                  <c:v>11</c:v>
+                </c:pt>
+                <c:pt idx="4">
+                  <c:v>12</c:v>
+                </c:pt>
+                <c:pt idx="5">
+                  <c:v>13</c:v>
+                </c:pt>
+                <c:pt idx="6">
+                  <c:v>14</c:v>
+                </c:pt>
+                <c:pt idx="7">
+                  <c:v>15</c:v>
+                </c:pt>
+                <c:pt idx="8">
+                  <c:v>16</c:v>
+                </c:pt>
+                <c:pt idx="9">
+                  <c:v>17</c:v>
+                </c:pt>
+                <c:pt idx="10">
+                  <c:v>18</c:v>
+                </c:pt>
+                <c:pt idx="11">
+                  <c:v>19</c:v>
+                </c:pt>
+                <c:pt idx="12">
+                  <c:v>20</c:v>
+                </c:pt>
+                <c:pt idx="13">
+                  <c:v>21</c:v>
+                </c:pt>
+                <c:pt idx="14">
+                  <c:v>22</c:v>
+                </c:pt>
+                <c:pt idx="15">
+                  <c:v>23</c:v>
+                </c:pt>
+              </c:strCache>
+            </c:strRef>
+          </c:cat>
+          <c:val>
+            <c:numRef>
+              <c:f>'Pivot table'!$I$4:$I$20</c:f>
+              <c:numCache>
+                <c:formatCode>General</c:formatCode>
+                <c:ptCount val="16"/>
+                <c:pt idx="0">
+                  <c:v>3489</c:v>
+                </c:pt>
+                <c:pt idx="1">
+                  <c:v>4297</c:v>
+                </c:pt>
+                <c:pt idx="2">
+                  <c:v>3680</c:v>
+                </c:pt>
+                <c:pt idx="3">
+                  <c:v>3306</c:v>
+                </c:pt>
+                <c:pt idx="4">
+                  <c:v>1446</c:v>
+                </c:pt>
+                <c:pt idx="5">
+                  <c:v>426</c:v>
+                </c:pt>
+                <c:pt idx="6">
+                  <c:v>3030</c:v>
+                </c:pt>
+                <c:pt idx="7">
+                  <c:v>1847</c:v>
+                </c:pt>
+                <c:pt idx="8">
+                  <c:v>1249</c:v>
+                </c:pt>
+                <c:pt idx="9">
+                  <c:v>219</c:v>
+                </c:pt>
+                <c:pt idx="10">
+                  <c:v>2600</c:v>
+                </c:pt>
+                <c:pt idx="11">
+                  <c:v>2269</c:v>
+                </c:pt>
+                <c:pt idx="12">
+                  <c:v>1358</c:v>
+                </c:pt>
+                <c:pt idx="13">
+                  <c:v>500</c:v>
+                </c:pt>
+                <c:pt idx="14">
+                  <c:v>238</c:v>
+                </c:pt>
+                <c:pt idx="15">
+                  <c:v>32</c:v>
+                </c:pt>
+              </c:numCache>
+            </c:numRef>
+          </c:val>
+          <c:smooth val="0"/>
+          <c:extLst>
+            <c:ext xmlns:c16="http://schemas.microsoft.com/office/drawing/2014/chart" uri="{C3380CC4-5D6E-409C-BE32-E72D297353CC}">
+              <c16:uniqueId val="{00000007-7413-4F7E-AC51-C407298F591A}"/>
+            </c:ext>
+          </c:extLst>
+        </c:ser>
+        <c:dLbls>
+          <c:showLegendKey val="0"/>
+          <c:showVal val="1"/>
+          <c:showCatName val="0"/>
+          <c:showSerName val="0"/>
+          <c:showPercent val="0"/>
+          <c:showBubbleSize val="0"/>
+        </c:dLbls>
+        <c:marker val="1"/>
+        <c:smooth val="0"/>
+        <c:axId val="1082347616"/>
+        <c:axId val="1082338048"/>
+      </c:lineChart>
+      <c:catAx>
+        <c:axId val="1082348448"/>
+        <c:scaling>
+          <c:orientation val="minMax"/>
+        </c:scaling>
+        <c:delete val="0"/>
+        <c:axPos val="b"/>
+        <c:numFmt formatCode="General" sourceLinked="1"/>
+        <c:majorTickMark val="none"/>
+        <c:minorTickMark val="none"/>
+        <c:tickLblPos val="nextTo"/>
+        <c:spPr>
+          <a:noFill/>
+          <a:ln w="9525" cap="flat" cmpd="sng" algn="ctr">
+            <a:solidFill>
+              <a:schemeClr val="tx1">
+                <a:lumMod val="15000"/>
+                <a:lumOff val="85000"/>
+              </a:schemeClr>
+            </a:solidFill>
+            <a:round/>
+          </a:ln>
+          <a:effectLst/>
+        </c:spPr>
+        <c:txPr>
+          <a:bodyPr rot="-60000000" spcFirstLastPara="1" vertOverflow="ellipsis" vert="horz" wrap="square" anchor="ctr" anchorCtr="1"/>
+          <a:lstStyle/>
+          <a:p>
+            <a:pPr>
+              <a:defRPr sz="900" b="0" i="0" u="none" strike="noStrike" kern="1200" baseline="0">
+                <a:solidFill>
+                  <a:schemeClr val="tx1">
+                    <a:lumMod val="65000"/>
+                    <a:lumOff val="35000"/>
+                  </a:schemeClr>
+                </a:solidFill>
+                <a:latin typeface="+mn-lt"/>
+                <a:ea typeface="+mn-ea"/>
+                <a:cs typeface="+mn-cs"/>
+              </a:defRPr>
+            </a:pPr>
+            <a:endParaRPr lang="en-US"/>
+          </a:p>
+        </c:txPr>
+        <c:crossAx val="1082328064"/>
+        <c:crosses val="autoZero"/>
+        <c:auto val="1"/>
+        <c:lblAlgn val="ctr"/>
+        <c:lblOffset val="100"/>
+        <c:noMultiLvlLbl val="0"/>
+      </c:catAx>
+      <c:valAx>
+        <c:axId val="1082328064"/>
+        <c:scaling>
+          <c:orientation val="minMax"/>
+        </c:scaling>
+        <c:delete val="0"/>
+        <c:axPos val="l"/>
+        <c:numFmt formatCode="0" sourceLinked="1"/>
+        <c:majorTickMark val="none"/>
+        <c:minorTickMark val="none"/>
+        <c:tickLblPos val="nextTo"/>
+        <c:spPr>
+          <a:noFill/>
+          <a:ln>
+            <a:noFill/>
+          </a:ln>
+          <a:effectLst/>
+        </c:spPr>
+        <c:txPr>
+          <a:bodyPr rot="-60000000" spcFirstLastPara="1" vertOverflow="ellipsis" vert="horz" wrap="square" anchor="ctr" anchorCtr="1"/>
+          <a:lstStyle/>
+          <a:p>
+            <a:pPr>
+              <a:defRPr sz="900" b="0" i="0" u="none" strike="noStrike" kern="1200" baseline="0">
+                <a:solidFill>
+                  <a:schemeClr val="tx1">
+                    <a:lumMod val="65000"/>
+                    <a:lumOff val="35000"/>
+                  </a:schemeClr>
+                </a:solidFill>
+                <a:latin typeface="+mn-lt"/>
+                <a:ea typeface="+mn-ea"/>
+                <a:cs typeface="+mn-cs"/>
+              </a:defRPr>
+            </a:pPr>
+            <a:endParaRPr lang="en-US"/>
+          </a:p>
+        </c:txPr>
+        <c:crossAx val="1082348448"/>
+        <c:crosses val="autoZero"/>
+        <c:crossBetween val="between"/>
+      </c:valAx>
+      <c:valAx>
+        <c:axId val="1082338048"/>
+        <c:scaling>
+          <c:orientation val="minMax"/>
+        </c:scaling>
+        <c:delete val="0"/>
+        <c:axPos val="r"/>
+        <c:numFmt formatCode="General" sourceLinked="1"/>
+        <c:majorTickMark val="out"/>
+        <c:minorTickMark val="none"/>
+        <c:tickLblPos val="nextTo"/>
+        <c:spPr>
+          <a:noFill/>
+          <a:ln>
+            <a:noFill/>
+          </a:ln>
+          <a:effectLst/>
+        </c:spPr>
+        <c:txPr>
+          <a:bodyPr rot="-60000000" spcFirstLastPara="1" vertOverflow="ellipsis" vert="horz" wrap="square" anchor="ctr" anchorCtr="1"/>
+          <a:lstStyle/>
+          <a:p>
+            <a:pPr>
+              <a:defRPr sz="900" b="0" i="0" u="none" strike="noStrike" kern="1200" baseline="0">
+                <a:solidFill>
+                  <a:schemeClr val="tx1">
+                    <a:lumMod val="65000"/>
+                    <a:lumOff val="35000"/>
+                  </a:schemeClr>
+                </a:solidFill>
+                <a:latin typeface="+mn-lt"/>
+                <a:ea typeface="+mn-ea"/>
+                <a:cs typeface="+mn-cs"/>
+              </a:defRPr>
+            </a:pPr>
+            <a:endParaRPr lang="en-US"/>
+          </a:p>
+        </c:txPr>
+        <c:crossAx val="1082347616"/>
+        <c:crosses val="max"/>
+        <c:crossBetween val="between"/>
+      </c:valAx>
+      <c:catAx>
+        <c:axId val="1082347616"/>
+        <c:scaling>
+          <c:orientation val="minMax"/>
+        </c:scaling>
+        <c:delete val="1"/>
+        <c:axPos val="b"/>
+        <c:numFmt formatCode="General" sourceLinked="1"/>
+        <c:majorTickMark val="out"/>
+        <c:minorTickMark val="none"/>
+        <c:tickLblPos val="nextTo"/>
+        <c:crossAx val="1082338048"/>
+        <c:crosses val="autoZero"/>
+        <c:auto val="1"/>
+        <c:lblAlgn val="ctr"/>
+        <c:lblOffset val="100"/>
+        <c:noMultiLvlLbl val="0"/>
+      </c:catAx>
+      <c:spPr>
+        <a:noFill/>
+        <a:ln>
+          <a:noFill/>
+        </a:ln>
+        <a:effectLst/>
+      </c:spPr>
+    </c:plotArea>
+    <c:legend>
+      <c:legendPos val="t"/>
+      <c:layout>
+        <c:manualLayout>
+          <c:xMode val="edge"/>
+          <c:yMode val="edge"/>
+          <c:x val="0.27597872702762083"/>
+          <c:y val="5.588822355289421E-2"/>
+          <c:w val="0.47115629862760461"/>
+          <c:h val="6.7365740959026837E-2"/>
+        </c:manualLayout>
+      </c:layout>
+      <c:overlay val="0"/>
+      <c:spPr>
+        <a:noFill/>
+        <a:ln>
+          <a:noFill/>
+        </a:ln>
+        <a:effectLst/>
+      </c:spPr>
+      <c:txPr>
+        <a:bodyPr rot="0" spcFirstLastPara="1" vertOverflow="ellipsis" vert="horz" wrap="square" anchor="ctr" anchorCtr="1"/>
+        <a:lstStyle/>
+        <a:p>
+          <a:pPr>
+            <a:defRPr sz="900" b="0" i="0" u="none" strike="noStrike" kern="1200" baseline="0">
+              <a:solidFill>
+                <a:schemeClr val="tx1">
+                  <a:lumMod val="65000"/>
+                  <a:lumOff val="35000"/>
+                </a:schemeClr>
+              </a:solidFill>
+              <a:latin typeface="+mn-lt"/>
+              <a:ea typeface="+mn-ea"/>
+              <a:cs typeface="+mn-cs"/>
+            </a:defRPr>
+          </a:pPr>
+          <a:endParaRPr lang="en-US"/>
+        </a:p>
+      </c:txPr>
+    </c:legend>
+    <c:plotVisOnly val="1"/>
+    <c:dispBlanksAs val="gap"/>
+    <c:showDLblsOverMax val="0"/>
+  </c:chart>
+  <c:spPr>
+    <a:solidFill>
+      <a:schemeClr val="bg1"/>
+    </a:solidFill>
+    <a:ln w="9525" cap="flat" cmpd="sng" algn="ctr">
+      <a:solidFill>
+        <a:schemeClr val="accent2">
+          <a:lumMod val="40000"/>
+          <a:lumOff val="60000"/>
+        </a:schemeClr>
+      </a:solidFill>
+      <a:round/>
+    </a:ln>
+    <a:effectLst/>
+  </c:spPr>
+  <c:txPr>
+    <a:bodyPr/>
+    <a:lstStyle/>
+    <a:p>
+      <a:pPr>
+        <a:defRPr/>
+      </a:pPr>
+      <a:endParaRPr lang="en-US"/>
+    </a:p>
+  </c:txPr>
+  <c:externalData r:id="rId4">
+    <c:autoUpdate val="0"/>
+  </c:externalData>
+  <c:extLst>
+    <c:ext xmlns:c14="http://schemas.microsoft.com/office/drawing/2007/8/2/chart" uri="{781A3756-C4B2-4CAC-9D66-4F8BD8637D16}">
+      <c14:pivotOptions>
+        <c14:dropZoneFilter val="1"/>
+        <c14:dropZoneCategories val="1"/>
+        <c14:dropZoneData val="1"/>
+        <c14:dropZoneSeries val="1"/>
+      </c14:pivotOptions>
+    </c:ext>
+    <c:ext xmlns:c16="http://schemas.microsoft.com/office/drawing/2014/chart" uri="{E28EC0CA-F0BB-4C9C-879D-F8772B89E7AC}">
+      <c16:pivotOptions16>
+        <c16:showExpandCollapseFieldButtons val="1"/>
+      </c16:pivotOptions16>
+    </c:ext>
+  </c:extLst>
+</c:chartSpace>
+</file>
+
 <file path=ppt/charts/colors1.xml><?xml version="1.0" encoding="utf-8"?>
 <cs:colorStyle xmlns:cs="http://schemas.microsoft.com/office/drawing/2012/chartStyle" xmlns:a="http://schemas.openxmlformats.org/drawingml/2006/main" meth="cycle" id="10">
   <a:schemeClr val="accent1"/>
@@ -1494,6 +2643,46 @@
 </file>
 
 <file path=ppt/charts/colors2.xml><?xml version="1.0" encoding="utf-8"?>
+<cs:colorStyle xmlns:cs="http://schemas.microsoft.com/office/drawing/2012/chartStyle" xmlns:a="http://schemas.openxmlformats.org/drawingml/2006/main" meth="cycle" id="10">
+  <a:schemeClr val="accent1"/>
+  <a:schemeClr val="accent2"/>
+  <a:schemeClr val="accent3"/>
+  <a:schemeClr val="accent4"/>
+  <a:schemeClr val="accent5"/>
+  <a:schemeClr val="accent6"/>
+  <cs:variation/>
+  <cs:variation>
+    <a:lumMod val="60000"/>
+  </cs:variation>
+  <cs:variation>
+    <a:lumMod val="80000"/>
+    <a:lumOff val="20000"/>
+  </cs:variation>
+  <cs:variation>
+    <a:lumMod val="80000"/>
+  </cs:variation>
+  <cs:variation>
+    <a:lumMod val="60000"/>
+    <a:lumOff val="40000"/>
+  </cs:variation>
+  <cs:variation>
+    <a:lumMod val="50000"/>
+  </cs:variation>
+  <cs:variation>
+    <a:lumMod val="70000"/>
+    <a:lumOff val="30000"/>
+  </cs:variation>
+  <cs:variation>
+    <a:lumMod val="70000"/>
+  </cs:variation>
+  <cs:variation>
+    <a:lumMod val="50000"/>
+    <a:lumOff val="50000"/>
+  </cs:variation>
+</cs:colorStyle>
+</file>
+
+<file path=ppt/charts/colors3.xml><?xml version="1.0" encoding="utf-8"?>
 <cs:colorStyle xmlns:cs="http://schemas.microsoft.com/office/drawing/2012/chartStyle" xmlns:a="http://schemas.openxmlformats.org/drawingml/2006/main" meth="cycle" id="10">
   <a:schemeClr val="accent1"/>
   <a:schemeClr val="accent2"/>
@@ -2555,6 +3744,509 @@
 </cs:chartStyle>
 </file>
 
+<file path=ppt/charts/style3.xml><?xml version="1.0" encoding="utf-8"?>
+<cs:chartStyle xmlns:cs="http://schemas.microsoft.com/office/drawing/2012/chartStyle" xmlns:a="http://schemas.openxmlformats.org/drawingml/2006/main" id="201">
+  <cs:axisTitle>
+    <cs:lnRef idx="0"/>
+    <cs:fillRef idx="0"/>
+    <cs:effectRef idx="0"/>
+    <cs:fontRef idx="minor">
+      <a:schemeClr val="tx1">
+        <a:lumMod val="65000"/>
+        <a:lumOff val="35000"/>
+      </a:schemeClr>
+    </cs:fontRef>
+    <cs:defRPr sz="1000" kern="1200"/>
+  </cs:axisTitle>
+  <cs:categoryAxis>
+    <cs:lnRef idx="0"/>
+    <cs:fillRef idx="0"/>
+    <cs:effectRef idx="0"/>
+    <cs:fontRef idx="minor">
+      <a:schemeClr val="tx1">
+        <a:lumMod val="65000"/>
+        <a:lumOff val="35000"/>
+      </a:schemeClr>
+    </cs:fontRef>
+    <cs:spPr>
+      <a:ln w="9525" cap="flat" cmpd="sng" algn="ctr">
+        <a:solidFill>
+          <a:schemeClr val="tx1">
+            <a:lumMod val="15000"/>
+            <a:lumOff val="85000"/>
+          </a:schemeClr>
+        </a:solidFill>
+        <a:round/>
+      </a:ln>
+    </cs:spPr>
+    <cs:defRPr sz="900" kern="1200"/>
+  </cs:categoryAxis>
+  <cs:chartArea mods="allowNoFillOverride allowNoLineOverride">
+    <cs:lnRef idx="0"/>
+    <cs:fillRef idx="0"/>
+    <cs:effectRef idx="0"/>
+    <cs:fontRef idx="minor">
+      <a:schemeClr val="tx1"/>
+    </cs:fontRef>
+    <cs:spPr>
+      <a:solidFill>
+        <a:schemeClr val="bg1"/>
+      </a:solidFill>
+      <a:ln w="9525" cap="flat" cmpd="sng" algn="ctr">
+        <a:solidFill>
+          <a:schemeClr val="tx1">
+            <a:lumMod val="15000"/>
+            <a:lumOff val="85000"/>
+          </a:schemeClr>
+        </a:solidFill>
+        <a:round/>
+      </a:ln>
+    </cs:spPr>
+    <cs:defRPr sz="1000" kern="1200"/>
+  </cs:chartArea>
+  <cs:dataLabel>
+    <cs:lnRef idx="0"/>
+    <cs:fillRef idx="0"/>
+    <cs:effectRef idx="0"/>
+    <cs:fontRef idx="minor">
+      <a:schemeClr val="tx1">
+        <a:lumMod val="75000"/>
+        <a:lumOff val="25000"/>
+      </a:schemeClr>
+    </cs:fontRef>
+    <cs:defRPr sz="900" kern="1200"/>
+  </cs:dataLabel>
+  <cs:dataLabelCallout>
+    <cs:lnRef idx="0"/>
+    <cs:fillRef idx="0"/>
+    <cs:effectRef idx="0"/>
+    <cs:fontRef idx="minor">
+      <a:schemeClr val="dk1">
+        <a:lumMod val="65000"/>
+        <a:lumOff val="35000"/>
+      </a:schemeClr>
+    </cs:fontRef>
+    <cs:spPr>
+      <a:solidFill>
+        <a:schemeClr val="lt1"/>
+      </a:solidFill>
+      <a:ln>
+        <a:solidFill>
+          <a:schemeClr val="dk1">
+            <a:lumMod val="25000"/>
+            <a:lumOff val="75000"/>
+          </a:schemeClr>
+        </a:solidFill>
+      </a:ln>
+    </cs:spPr>
+    <cs:defRPr sz="900" kern="1200"/>
+    <cs:bodyPr rot="0" spcFirstLastPara="1" vertOverflow="clip" horzOverflow="clip" vert="horz" wrap="square" lIns="36576" tIns="18288" rIns="36576" bIns="18288" anchor="ctr" anchorCtr="1">
+      <a:spAutoFit/>
+    </cs:bodyPr>
+  </cs:dataLabelCallout>
+  <cs:dataPoint>
+    <cs:lnRef idx="0"/>
+    <cs:fillRef idx="1">
+      <cs:styleClr val="auto"/>
+    </cs:fillRef>
+    <cs:effectRef idx="0"/>
+    <cs:fontRef idx="minor">
+      <a:schemeClr val="tx1"/>
+    </cs:fontRef>
+  </cs:dataPoint>
+  <cs:dataPoint3D>
+    <cs:lnRef idx="0"/>
+    <cs:fillRef idx="1">
+      <cs:styleClr val="auto"/>
+    </cs:fillRef>
+    <cs:effectRef idx="0"/>
+    <cs:fontRef idx="minor">
+      <a:schemeClr val="tx1"/>
+    </cs:fontRef>
+  </cs:dataPoint3D>
+  <cs:dataPointLine>
+    <cs:lnRef idx="0">
+      <cs:styleClr val="auto"/>
+    </cs:lnRef>
+    <cs:fillRef idx="1"/>
+    <cs:effectRef idx="0"/>
+    <cs:fontRef idx="minor">
+      <a:schemeClr val="tx1"/>
+    </cs:fontRef>
+    <cs:spPr>
+      <a:ln w="28575" cap="rnd">
+        <a:solidFill>
+          <a:schemeClr val="phClr"/>
+        </a:solidFill>
+        <a:round/>
+      </a:ln>
+    </cs:spPr>
+  </cs:dataPointLine>
+  <cs:dataPointMarker>
+    <cs:lnRef idx="0">
+      <cs:styleClr val="auto"/>
+    </cs:lnRef>
+    <cs:fillRef idx="1">
+      <cs:styleClr val="auto"/>
+    </cs:fillRef>
+    <cs:effectRef idx="0"/>
+    <cs:fontRef idx="minor">
+      <a:schemeClr val="tx1"/>
+    </cs:fontRef>
+    <cs:spPr>
+      <a:ln w="9525">
+        <a:solidFill>
+          <a:schemeClr val="phClr"/>
+        </a:solidFill>
+      </a:ln>
+    </cs:spPr>
+  </cs:dataPointMarker>
+  <cs:dataPointMarkerLayout symbol="circle" size="5"/>
+  <cs:dataPointWireframe>
+    <cs:lnRef idx="0">
+      <cs:styleClr val="auto"/>
+    </cs:lnRef>
+    <cs:fillRef idx="1"/>
+    <cs:effectRef idx="0"/>
+    <cs:fontRef idx="minor">
+      <a:schemeClr val="tx1"/>
+    </cs:fontRef>
+    <cs:spPr>
+      <a:ln w="9525" cap="rnd">
+        <a:solidFill>
+          <a:schemeClr val="phClr"/>
+        </a:solidFill>
+        <a:round/>
+      </a:ln>
+    </cs:spPr>
+  </cs:dataPointWireframe>
+  <cs:dataTable>
+    <cs:lnRef idx="0"/>
+    <cs:fillRef idx="0"/>
+    <cs:effectRef idx="0"/>
+    <cs:fontRef idx="minor">
+      <a:schemeClr val="tx1">
+        <a:lumMod val="65000"/>
+        <a:lumOff val="35000"/>
+      </a:schemeClr>
+    </cs:fontRef>
+    <cs:spPr>
+      <a:noFill/>
+      <a:ln w="9525" cap="flat" cmpd="sng" algn="ctr">
+        <a:solidFill>
+          <a:schemeClr val="tx1">
+            <a:lumMod val="15000"/>
+            <a:lumOff val="85000"/>
+          </a:schemeClr>
+        </a:solidFill>
+        <a:round/>
+      </a:ln>
+    </cs:spPr>
+    <cs:defRPr sz="900" kern="1200"/>
+  </cs:dataTable>
+  <cs:downBar>
+    <cs:lnRef idx="0"/>
+    <cs:fillRef idx="0"/>
+    <cs:effectRef idx="0"/>
+    <cs:fontRef idx="minor">
+      <a:schemeClr val="dk1"/>
+    </cs:fontRef>
+    <cs:spPr>
+      <a:solidFill>
+        <a:schemeClr val="dk1">
+          <a:lumMod val="65000"/>
+          <a:lumOff val="35000"/>
+        </a:schemeClr>
+      </a:solidFill>
+      <a:ln w="9525">
+        <a:solidFill>
+          <a:schemeClr val="tx1">
+            <a:lumMod val="65000"/>
+            <a:lumOff val="35000"/>
+          </a:schemeClr>
+        </a:solidFill>
+      </a:ln>
+    </cs:spPr>
+  </cs:downBar>
+  <cs:dropLine>
+    <cs:lnRef idx="0"/>
+    <cs:fillRef idx="0"/>
+    <cs:effectRef idx="0"/>
+    <cs:fontRef idx="minor">
+      <a:schemeClr val="tx1"/>
+    </cs:fontRef>
+    <cs:spPr>
+      <a:ln w="9525" cap="flat" cmpd="sng" algn="ctr">
+        <a:solidFill>
+          <a:schemeClr val="tx1">
+            <a:lumMod val="35000"/>
+            <a:lumOff val="65000"/>
+          </a:schemeClr>
+        </a:solidFill>
+        <a:round/>
+      </a:ln>
+    </cs:spPr>
+  </cs:dropLine>
+  <cs:errorBar>
+    <cs:lnRef idx="0"/>
+    <cs:fillRef idx="0"/>
+    <cs:effectRef idx="0"/>
+    <cs:fontRef idx="minor">
+      <a:schemeClr val="tx1"/>
+    </cs:fontRef>
+    <cs:spPr>
+      <a:ln w="9525" cap="flat" cmpd="sng" algn="ctr">
+        <a:solidFill>
+          <a:schemeClr val="tx1">
+            <a:lumMod val="65000"/>
+            <a:lumOff val="35000"/>
+          </a:schemeClr>
+        </a:solidFill>
+        <a:round/>
+      </a:ln>
+    </cs:spPr>
+  </cs:errorBar>
+  <cs:floor>
+    <cs:lnRef idx="0"/>
+    <cs:fillRef idx="0"/>
+    <cs:effectRef idx="0"/>
+    <cs:fontRef idx="minor">
+      <a:schemeClr val="tx1"/>
+    </cs:fontRef>
+    <cs:spPr>
+      <a:noFill/>
+      <a:ln>
+        <a:noFill/>
+      </a:ln>
+    </cs:spPr>
+  </cs:floor>
+  <cs:gridlineMajor>
+    <cs:lnRef idx="0"/>
+    <cs:fillRef idx="0"/>
+    <cs:effectRef idx="0"/>
+    <cs:fontRef idx="minor">
+      <a:schemeClr val="tx1"/>
+    </cs:fontRef>
+    <cs:spPr>
+      <a:ln w="9525" cap="flat" cmpd="sng" algn="ctr">
+        <a:solidFill>
+          <a:schemeClr val="tx1">
+            <a:lumMod val="15000"/>
+            <a:lumOff val="85000"/>
+          </a:schemeClr>
+        </a:solidFill>
+        <a:round/>
+      </a:ln>
+    </cs:spPr>
+  </cs:gridlineMajor>
+  <cs:gridlineMinor>
+    <cs:lnRef idx="0"/>
+    <cs:fillRef idx="0"/>
+    <cs:effectRef idx="0"/>
+    <cs:fontRef idx="minor">
+      <a:schemeClr val="tx1"/>
+    </cs:fontRef>
+    <cs:spPr>
+      <a:ln w="9525" cap="flat" cmpd="sng" algn="ctr">
+        <a:solidFill>
+          <a:schemeClr val="tx1">
+            <a:lumMod val="5000"/>
+            <a:lumOff val="95000"/>
+          </a:schemeClr>
+        </a:solidFill>
+        <a:round/>
+      </a:ln>
+    </cs:spPr>
+  </cs:gridlineMinor>
+  <cs:hiLoLine>
+    <cs:lnRef idx="0"/>
+    <cs:fillRef idx="0"/>
+    <cs:effectRef idx="0"/>
+    <cs:fontRef idx="minor">
+      <a:schemeClr val="tx1"/>
+    </cs:fontRef>
+    <cs:spPr>
+      <a:ln w="9525" cap="flat" cmpd="sng" algn="ctr">
+        <a:solidFill>
+          <a:schemeClr val="tx1">
+            <a:lumMod val="75000"/>
+            <a:lumOff val="25000"/>
+          </a:schemeClr>
+        </a:solidFill>
+        <a:round/>
+      </a:ln>
+    </cs:spPr>
+  </cs:hiLoLine>
+  <cs:leaderLine>
+    <cs:lnRef idx="0"/>
+    <cs:fillRef idx="0"/>
+    <cs:effectRef idx="0"/>
+    <cs:fontRef idx="minor">
+      <a:schemeClr val="tx1"/>
+    </cs:fontRef>
+    <cs:spPr>
+      <a:ln w="9525" cap="flat" cmpd="sng" algn="ctr">
+        <a:solidFill>
+          <a:schemeClr val="tx1">
+            <a:lumMod val="35000"/>
+            <a:lumOff val="65000"/>
+          </a:schemeClr>
+        </a:solidFill>
+        <a:round/>
+      </a:ln>
+    </cs:spPr>
+  </cs:leaderLine>
+  <cs:legend>
+    <cs:lnRef idx="0"/>
+    <cs:fillRef idx="0"/>
+    <cs:effectRef idx="0"/>
+    <cs:fontRef idx="minor">
+      <a:schemeClr val="tx1">
+        <a:lumMod val="65000"/>
+        <a:lumOff val="35000"/>
+      </a:schemeClr>
+    </cs:fontRef>
+    <cs:defRPr sz="900" kern="1200"/>
+  </cs:legend>
+  <cs:plotArea mods="allowNoFillOverride allowNoLineOverride">
+    <cs:lnRef idx="0"/>
+    <cs:fillRef idx="0"/>
+    <cs:effectRef idx="0"/>
+    <cs:fontRef idx="minor">
+      <a:schemeClr val="tx1"/>
+    </cs:fontRef>
+  </cs:plotArea>
+  <cs:plotArea3D mods="allowNoFillOverride allowNoLineOverride">
+    <cs:lnRef idx="0"/>
+    <cs:fillRef idx="0"/>
+    <cs:effectRef idx="0"/>
+    <cs:fontRef idx="minor">
+      <a:schemeClr val="tx1"/>
+    </cs:fontRef>
+  </cs:plotArea3D>
+  <cs:seriesAxis>
+    <cs:lnRef idx="0"/>
+    <cs:fillRef idx="0"/>
+    <cs:effectRef idx="0"/>
+    <cs:fontRef idx="minor">
+      <a:schemeClr val="tx1">
+        <a:lumMod val="65000"/>
+        <a:lumOff val="35000"/>
+      </a:schemeClr>
+    </cs:fontRef>
+    <cs:defRPr sz="900" kern="1200"/>
+  </cs:seriesAxis>
+  <cs:seriesLine>
+    <cs:lnRef idx="0"/>
+    <cs:fillRef idx="0"/>
+    <cs:effectRef idx="0"/>
+    <cs:fontRef idx="minor">
+      <a:schemeClr val="tx1"/>
+    </cs:fontRef>
+    <cs:spPr>
+      <a:ln w="9525" cap="flat" cmpd="sng" algn="ctr">
+        <a:solidFill>
+          <a:schemeClr val="tx1">
+            <a:lumMod val="35000"/>
+            <a:lumOff val="65000"/>
+          </a:schemeClr>
+        </a:solidFill>
+        <a:round/>
+      </a:ln>
+    </cs:spPr>
+  </cs:seriesLine>
+  <cs:title>
+    <cs:lnRef idx="0"/>
+    <cs:fillRef idx="0"/>
+    <cs:effectRef idx="0"/>
+    <cs:fontRef idx="minor">
+      <a:schemeClr val="tx1">
+        <a:lumMod val="65000"/>
+        <a:lumOff val="35000"/>
+      </a:schemeClr>
+    </cs:fontRef>
+    <cs:defRPr sz="1400" b="0" kern="1200" spc="0" baseline="0"/>
+  </cs:title>
+  <cs:trendline>
+    <cs:lnRef idx="0">
+      <cs:styleClr val="auto"/>
+    </cs:lnRef>
+    <cs:fillRef idx="0"/>
+    <cs:effectRef idx="0"/>
+    <cs:fontRef idx="minor">
+      <a:schemeClr val="tx1"/>
+    </cs:fontRef>
+    <cs:spPr>
+      <a:ln w="19050" cap="rnd">
+        <a:solidFill>
+          <a:schemeClr val="phClr"/>
+        </a:solidFill>
+        <a:prstDash val="sysDot"/>
+      </a:ln>
+    </cs:spPr>
+  </cs:trendline>
+  <cs:trendlineLabel>
+    <cs:lnRef idx="0"/>
+    <cs:fillRef idx="0"/>
+    <cs:effectRef idx="0"/>
+    <cs:fontRef idx="minor">
+      <a:schemeClr val="tx1">
+        <a:lumMod val="65000"/>
+        <a:lumOff val="35000"/>
+      </a:schemeClr>
+    </cs:fontRef>
+    <cs:defRPr sz="900" kern="1200"/>
+  </cs:trendlineLabel>
+  <cs:upBar>
+    <cs:lnRef idx="0"/>
+    <cs:fillRef idx="0"/>
+    <cs:effectRef idx="0"/>
+    <cs:fontRef idx="minor">
+      <a:schemeClr val="dk1"/>
+    </cs:fontRef>
+    <cs:spPr>
+      <a:solidFill>
+        <a:schemeClr val="lt1"/>
+      </a:solidFill>
+      <a:ln w="9525">
+        <a:solidFill>
+          <a:schemeClr val="tx1">
+            <a:lumMod val="15000"/>
+            <a:lumOff val="85000"/>
+          </a:schemeClr>
+        </a:solidFill>
+      </a:ln>
+    </cs:spPr>
+  </cs:upBar>
+  <cs:valueAxis>
+    <cs:lnRef idx="0"/>
+    <cs:fillRef idx="0"/>
+    <cs:effectRef idx="0"/>
+    <cs:fontRef idx="minor">
+      <a:schemeClr val="tx1">
+        <a:lumMod val="65000"/>
+        <a:lumOff val="35000"/>
+      </a:schemeClr>
+    </cs:fontRef>
+    <cs:defRPr sz="900" kern="1200"/>
+  </cs:valueAxis>
+  <cs:wall>
+    <cs:lnRef idx="0"/>
+    <cs:fillRef idx="0"/>
+    <cs:effectRef idx="0"/>
+    <cs:fontRef idx="minor">
+      <a:schemeClr val="tx1"/>
+    </cs:fontRef>
+    <cs:spPr>
+      <a:noFill/>
+      <a:ln>
+        <a:noFill/>
+      </a:ln>
+    </cs:spPr>
+  </cs:wall>
+</cs:chartStyle>
+</file>
+
 <file path=ppt/notesMasters/notesMaster1.xml><?xml version="1.0" encoding="utf-8"?>
 <p:notesMaster xmlns:a="http://schemas.openxmlformats.org/drawingml/2006/main" xmlns:r="http://schemas.openxmlformats.org/officeDocument/2006/relationships" xmlns:p="http://schemas.openxmlformats.org/presentationml/2006/main">
   <p:cSld>
@@ -7384,7 +9076,7 @@
             <a:r>
               <a:rPr lang="en-US" sz="3200" b="1" dirty="0" smtClean="0">
                 <a:solidFill>
-                  <a:srgbClr val="38688C"/>
+                  <a:srgbClr val="3A5E92"/>
                 </a:solidFill>
               </a:rPr>
               <a:t>Financial Class</a:t>
@@ -7522,6 +9214,145 @@
     <p:extLst>
       <p:ext uri="{BB962C8B-B14F-4D97-AF65-F5344CB8AC3E}">
         <p14:creationId xmlns:p14="http://schemas.microsoft.com/office/powerpoint/2010/main" val="2336312873"/>
+      </p:ext>
+    </p:extLst>
+  </p:cSld>
+  <p:clrMapOvr>
+    <a:masterClrMapping/>
+  </p:clrMapOvr>
+</p:sld>
+</file>
+
+<file path=ppt/slides/slide6.xml><?xml version="1.0" encoding="utf-8"?>
+<p:sld xmlns:a="http://schemas.openxmlformats.org/drawingml/2006/main" xmlns:r="http://schemas.openxmlformats.org/officeDocument/2006/relationships" xmlns:p="http://schemas.openxmlformats.org/presentationml/2006/main">
+  <p:cSld>
+    <p:spTree>
+      <p:nvGrpSpPr>
+        <p:cNvPr id="1" name=""/>
+        <p:cNvGrpSpPr/>
+        <p:nvPr/>
+      </p:nvGrpSpPr>
+      <p:grpSpPr>
+        <a:xfrm>
+          <a:off x="0" y="0"/>
+          <a:ext cx="0" cy="0"/>
+          <a:chOff x="0" y="0"/>
+          <a:chExt cx="0" cy="0"/>
+        </a:xfrm>
+      </p:grpSpPr>
+      <p:sp>
+        <p:nvSpPr>
+          <p:cNvPr id="2" name="Title 1"/>
+          <p:cNvSpPr>
+            <a:spLocks noGrp="1"/>
+          </p:cNvSpPr>
+          <p:nvPr>
+            <p:ph type="title"/>
+          </p:nvPr>
+        </p:nvSpPr>
+        <p:spPr/>
+        <p:txBody>
+          <a:bodyPr>
+            <a:normAutofit/>
+          </a:bodyPr>
+          <a:lstStyle/>
+          <a:p>
+            <a:r>
+              <a:rPr lang="en-US" sz="4300" b="1" dirty="0" smtClean="0"/>
+              <a:t>Are Wait Times Associated with Busy Periods?</a:t>
+            </a:r>
+            <a:endParaRPr lang="en-US" sz="4300" b="1" dirty="0"/>
+          </a:p>
+        </p:txBody>
+      </p:sp>
+      <p:graphicFrame>
+        <p:nvGraphicFramePr>
+          <p:cNvPr id="4" name="Content Placeholder 3"/>
+          <p:cNvGraphicFramePr>
+            <a:graphicFrameLocks noGrp="1"/>
+          </p:cNvGraphicFramePr>
+          <p:nvPr>
+            <p:ph idx="1"/>
+            <p:extLst>
+              <p:ext uri="{D42A27DB-BD31-4B8C-83A1-F6EECF244321}">
+                <p14:modId xmlns:p14="http://schemas.microsoft.com/office/powerpoint/2010/main" val="3990673210"/>
+              </p:ext>
+            </p:extLst>
+          </p:nvPr>
+        </p:nvGraphicFramePr>
+        <p:xfrm>
+          <a:off x="3671889" y="1846263"/>
+          <a:ext cx="7483474" cy="4022725"/>
+        </p:xfrm>
+        <a:graphic>
+          <a:graphicData uri="http://schemas.openxmlformats.org/drawingml/2006/chart">
+            <c:chart xmlns:c="http://schemas.openxmlformats.org/drawingml/2006/chart" xmlns:r="http://schemas.openxmlformats.org/officeDocument/2006/relationships" r:id="rId2"/>
+          </a:graphicData>
+        </a:graphic>
+      </p:graphicFrame>
+      <p:sp>
+        <p:nvSpPr>
+          <p:cNvPr id="7" name="TextBox 6"/>
+          <p:cNvSpPr txBox="1"/>
+          <p:nvPr/>
+        </p:nvSpPr>
+        <p:spPr>
+          <a:xfrm>
+            <a:off x="1200151" y="1846263"/>
+            <a:ext cx="1957388" cy="4308872"/>
+          </a:xfrm>
+          <a:prstGeom prst="rect">
+            <a:avLst/>
+          </a:prstGeom>
+          <a:noFill/>
+        </p:spPr>
+        <p:txBody>
+          <a:bodyPr wrap="square" rtlCol="0">
+            <a:spAutoFit/>
+          </a:bodyPr>
+          <a:lstStyle/>
+          <a:p>
+            <a:r>
+              <a:rPr lang="en-US" sz="3600" b="1" dirty="0" smtClean="0">
+                <a:solidFill>
+                  <a:srgbClr val="3A5E92"/>
+                </a:solidFill>
+              </a:rPr>
+              <a:t>Lack of Staffing</a:t>
+            </a:r>
+            <a:endParaRPr lang="en-US" sz="3600" b="1" dirty="0">
+              <a:solidFill>
+                <a:srgbClr val="3A5E92"/>
+              </a:solidFill>
+            </a:endParaRPr>
+          </a:p>
+          <a:p>
+            <a:endParaRPr lang="en-US" sz="400" b="1" dirty="0">
+              <a:solidFill>
+                <a:srgbClr val="38688C"/>
+              </a:solidFill>
+            </a:endParaRPr>
+          </a:p>
+          <a:p>
+            <a:r>
+              <a:rPr lang="en-US" dirty="0"/>
+              <a:t>From the </a:t>
+            </a:r>
+            <a:r>
+              <a:rPr lang="en-US" dirty="0" smtClean="0"/>
+              <a:t>existing data, it seems that staffing is sufficient. However, we may want to look at ensuring we have adequate staffing at the appropriate hours.</a:t>
+            </a:r>
+            <a:endParaRPr lang="en-US" b="1" dirty="0"/>
+          </a:p>
+          <a:p>
+            <a:endParaRPr lang="en-US" dirty="0"/>
+          </a:p>
+        </p:txBody>
+      </p:sp>
+    </p:spTree>
+    <p:extLst>
+      <p:ext uri="{BB962C8B-B14F-4D97-AF65-F5344CB8AC3E}">
+        <p14:creationId xmlns:p14="http://schemas.microsoft.com/office/powerpoint/2010/main" val="2233246546"/>
       </p:ext>
     </p:extLst>
   </p:cSld>
@@ -8645,4 +10476,290 @@
     </a:bgFillStyleLst>
   </a:fmtScheme>
 </a:themeOverride>
+</file>
+
+<file path=ppt/theme/themeOverride3.xml><?xml version="1.0" encoding="utf-8"?>
+<a:themeOverride xmlns:a="http://schemas.openxmlformats.org/drawingml/2006/main">
+  <a:clrScheme name="Office">
+    <a:dk1>
+      <a:sysClr val="windowText" lastClr="000000"/>
+    </a:dk1>
+    <a:lt1>
+      <a:sysClr val="window" lastClr="FFFFFF"/>
+    </a:lt1>
+    <a:dk2>
+      <a:srgbClr val="44546A"/>
+    </a:dk2>
+    <a:lt2>
+      <a:srgbClr val="E7E6E6"/>
+    </a:lt2>
+    <a:accent1>
+      <a:srgbClr val="4472C4"/>
+    </a:accent1>
+    <a:accent2>
+      <a:srgbClr val="ED7D31"/>
+    </a:accent2>
+    <a:accent3>
+      <a:srgbClr val="A5A5A5"/>
+    </a:accent3>
+    <a:accent4>
+      <a:srgbClr val="FFC000"/>
+    </a:accent4>
+    <a:accent5>
+      <a:srgbClr val="5B9BD5"/>
+    </a:accent5>
+    <a:accent6>
+      <a:srgbClr val="70AD47"/>
+    </a:accent6>
+    <a:hlink>
+      <a:srgbClr val="0563C1"/>
+    </a:hlink>
+    <a:folHlink>
+      <a:srgbClr val="954F72"/>
+    </a:folHlink>
+  </a:clrScheme>
+  <a:fontScheme name="Office">
+    <a:majorFont>
+      <a:latin typeface="Calibri Light" panose="020F0302020204030204"/>
+      <a:ea typeface=""/>
+      <a:cs typeface=""/>
+      <a:font script="Jpan" typeface="游ゴシック Light"/>
+      <a:font script="Hang" typeface="맑은 고딕"/>
+      <a:font script="Hans" typeface="等线 Light"/>
+      <a:font script="Hant" typeface="新細明體"/>
+      <a:font script="Arab" typeface="Times New Roman"/>
+      <a:font script="Hebr" typeface="Times New Roman"/>
+      <a:font script="Thai" typeface="Tahoma"/>
+      <a:font script="Ethi" typeface="Nyala"/>
+      <a:font script="Beng" typeface="Vrinda"/>
+      <a:font script="Gujr" typeface="Shruti"/>
+      <a:font script="Khmr" typeface="MoolBoran"/>
+      <a:font script="Knda" typeface="Tunga"/>
+      <a:font script="Guru" typeface="Raavi"/>
+      <a:font script="Cans" typeface="Euphemia"/>
+      <a:font script="Cher" typeface="Plantagenet Cherokee"/>
+      <a:font script="Yiii" typeface="Microsoft Yi Baiti"/>
+      <a:font script="Tibt" typeface="Microsoft Himalaya"/>
+      <a:font script="Thaa" typeface="MV Boli"/>
+      <a:font script="Deva" typeface="Mangal"/>
+      <a:font script="Telu" typeface="Gautami"/>
+      <a:font script="Taml" typeface="Latha"/>
+      <a:font script="Syrc" typeface="Estrangelo Edessa"/>
+      <a:font script="Orya" typeface="Kalinga"/>
+      <a:font script="Mlym" typeface="Kartika"/>
+      <a:font script="Laoo" typeface="DokChampa"/>
+      <a:font script="Sinh" typeface="Iskoola Pota"/>
+      <a:font script="Mong" typeface="Mongolian Baiti"/>
+      <a:font script="Viet" typeface="Times New Roman"/>
+      <a:font script="Uigh" typeface="Microsoft Uighur"/>
+      <a:font script="Geor" typeface="Sylfaen"/>
+      <a:font script="Armn" typeface="Arial"/>
+      <a:font script="Bugi" typeface="Leelawadee UI"/>
+      <a:font script="Bopo" typeface="Microsoft JhengHei"/>
+      <a:font script="Java" typeface="Javanese Text"/>
+      <a:font script="Lisu" typeface="Segoe UI"/>
+      <a:font script="Mymr" typeface="Myanmar Text"/>
+      <a:font script="Nkoo" typeface="Ebrima"/>
+      <a:font script="Olck" typeface="Nirmala UI"/>
+      <a:font script="Osma" typeface="Ebrima"/>
+      <a:font script="Phag" typeface="Phagspa"/>
+      <a:font script="Syrn" typeface="Estrangelo Edessa"/>
+      <a:font script="Syrj" typeface="Estrangelo Edessa"/>
+      <a:font script="Syre" typeface="Estrangelo Edessa"/>
+      <a:font script="Sora" typeface="Nirmala UI"/>
+      <a:font script="Tale" typeface="Microsoft Tai Le"/>
+      <a:font script="Talu" typeface="Microsoft New Tai Lue"/>
+      <a:font script="Tfng" typeface="Ebrima"/>
+    </a:majorFont>
+    <a:minorFont>
+      <a:latin typeface="Calibri" panose="020F0502020204030204"/>
+      <a:ea typeface=""/>
+      <a:cs typeface=""/>
+      <a:font script="Jpan" typeface="游ゴシック"/>
+      <a:font script="Hang" typeface="맑은 고딕"/>
+      <a:font script="Hans" typeface="等线"/>
+      <a:font script="Hant" typeface="新細明體"/>
+      <a:font script="Arab" typeface="Arial"/>
+      <a:font script="Hebr" typeface="Arial"/>
+      <a:font script="Thai" typeface="Tahoma"/>
+      <a:font script="Ethi" typeface="Nyala"/>
+      <a:font script="Beng" typeface="Vrinda"/>
+      <a:font script="Gujr" typeface="Shruti"/>
+      <a:font script="Khmr" typeface="DaunPenh"/>
+      <a:font script="Knda" typeface="Tunga"/>
+      <a:font script="Guru" typeface="Raavi"/>
+      <a:font script="Cans" typeface="Euphemia"/>
+      <a:font script="Cher" typeface="Plantagenet Cherokee"/>
+      <a:font script="Yiii" typeface="Microsoft Yi Baiti"/>
+      <a:font script="Tibt" typeface="Microsoft Himalaya"/>
+      <a:font script="Thaa" typeface="MV Boli"/>
+      <a:font script="Deva" typeface="Mangal"/>
+      <a:font script="Telu" typeface="Gautami"/>
+      <a:font script="Taml" typeface="Latha"/>
+      <a:font script="Syrc" typeface="Estrangelo Edessa"/>
+      <a:font script="Orya" typeface="Kalinga"/>
+      <a:font script="Mlym" typeface="Kartika"/>
+      <a:font script="Laoo" typeface="DokChampa"/>
+      <a:font script="Sinh" typeface="Iskoola Pota"/>
+      <a:font script="Mong" typeface="Mongolian Baiti"/>
+      <a:font script="Viet" typeface="Arial"/>
+      <a:font script="Uigh" typeface="Microsoft Uighur"/>
+      <a:font script="Geor" typeface="Sylfaen"/>
+      <a:font script="Armn" typeface="Arial"/>
+      <a:font script="Bugi" typeface="Leelawadee UI"/>
+      <a:font script="Bopo" typeface="Microsoft JhengHei"/>
+      <a:font script="Java" typeface="Javanese Text"/>
+      <a:font script="Lisu" typeface="Segoe UI"/>
+      <a:font script="Mymr" typeface="Myanmar Text"/>
+      <a:font script="Nkoo" typeface="Ebrima"/>
+      <a:font script="Olck" typeface="Nirmala UI"/>
+      <a:font script="Osma" typeface="Ebrima"/>
+      <a:font script="Phag" typeface="Phagspa"/>
+      <a:font script="Syrn" typeface="Estrangelo Edessa"/>
+      <a:font script="Syrj" typeface="Estrangelo Edessa"/>
+      <a:font script="Syre" typeface="Estrangelo Edessa"/>
+      <a:font script="Sora" typeface="Nirmala UI"/>
+      <a:font script="Tale" typeface="Microsoft Tai Le"/>
+      <a:font script="Talu" typeface="Microsoft New Tai Lue"/>
+      <a:font script="Tfng" typeface="Ebrima"/>
+    </a:minorFont>
+  </a:fontScheme>
+  <a:fmtScheme name="Office">
+    <a:fillStyleLst>
+      <a:solidFill>
+        <a:schemeClr val="phClr"/>
+      </a:solidFill>
+      <a:gradFill rotWithShape="1">
+        <a:gsLst>
+          <a:gs pos="0">
+            <a:schemeClr val="phClr">
+              <a:lumMod val="110000"/>
+              <a:satMod val="105000"/>
+              <a:tint val="67000"/>
+            </a:schemeClr>
+          </a:gs>
+          <a:gs pos="50000">
+            <a:schemeClr val="phClr">
+              <a:lumMod val="105000"/>
+              <a:satMod val="103000"/>
+              <a:tint val="73000"/>
+            </a:schemeClr>
+          </a:gs>
+          <a:gs pos="100000">
+            <a:schemeClr val="phClr">
+              <a:lumMod val="105000"/>
+              <a:satMod val="109000"/>
+              <a:tint val="81000"/>
+            </a:schemeClr>
+          </a:gs>
+        </a:gsLst>
+        <a:lin ang="5400000" scaled="0"/>
+      </a:gradFill>
+      <a:gradFill rotWithShape="1">
+        <a:gsLst>
+          <a:gs pos="0">
+            <a:schemeClr val="phClr">
+              <a:satMod val="103000"/>
+              <a:lumMod val="102000"/>
+              <a:tint val="94000"/>
+            </a:schemeClr>
+          </a:gs>
+          <a:gs pos="50000">
+            <a:schemeClr val="phClr">
+              <a:satMod val="110000"/>
+              <a:lumMod val="100000"/>
+              <a:shade val="100000"/>
+            </a:schemeClr>
+          </a:gs>
+          <a:gs pos="100000">
+            <a:schemeClr val="phClr">
+              <a:lumMod val="99000"/>
+              <a:satMod val="120000"/>
+              <a:shade val="78000"/>
+            </a:schemeClr>
+          </a:gs>
+        </a:gsLst>
+        <a:lin ang="5400000" scaled="0"/>
+      </a:gradFill>
+    </a:fillStyleLst>
+    <a:lnStyleLst>
+      <a:ln w="6350" cap="flat" cmpd="sng" algn="ctr">
+        <a:solidFill>
+          <a:schemeClr val="phClr"/>
+        </a:solidFill>
+        <a:prstDash val="solid"/>
+        <a:miter lim="800000"/>
+      </a:ln>
+      <a:ln w="12700" cap="flat" cmpd="sng" algn="ctr">
+        <a:solidFill>
+          <a:schemeClr val="phClr"/>
+        </a:solidFill>
+        <a:prstDash val="solid"/>
+        <a:miter lim="800000"/>
+      </a:ln>
+      <a:ln w="19050" cap="flat" cmpd="sng" algn="ctr">
+        <a:solidFill>
+          <a:schemeClr val="phClr"/>
+        </a:solidFill>
+        <a:prstDash val="solid"/>
+        <a:miter lim="800000"/>
+      </a:ln>
+    </a:lnStyleLst>
+    <a:effectStyleLst>
+      <a:effectStyle>
+        <a:effectLst/>
+      </a:effectStyle>
+      <a:effectStyle>
+        <a:effectLst/>
+      </a:effectStyle>
+      <a:effectStyle>
+        <a:effectLst>
+          <a:outerShdw blurRad="57150" dist="19050" dir="5400000" algn="ctr" rotWithShape="0">
+            <a:srgbClr val="000000">
+              <a:alpha val="63000"/>
+            </a:srgbClr>
+          </a:outerShdw>
+        </a:effectLst>
+      </a:effectStyle>
+    </a:effectStyleLst>
+    <a:bgFillStyleLst>
+      <a:solidFill>
+        <a:schemeClr val="phClr"/>
+      </a:solidFill>
+      <a:solidFill>
+        <a:schemeClr val="phClr">
+          <a:tint val="95000"/>
+          <a:satMod val="170000"/>
+        </a:schemeClr>
+      </a:solidFill>
+      <a:gradFill rotWithShape="1">
+        <a:gsLst>
+          <a:gs pos="0">
+            <a:schemeClr val="phClr">
+              <a:tint val="93000"/>
+              <a:satMod val="150000"/>
+              <a:shade val="98000"/>
+              <a:lumMod val="102000"/>
+            </a:schemeClr>
+          </a:gs>
+          <a:gs pos="50000">
+            <a:schemeClr val="phClr">
+              <a:tint val="98000"/>
+              <a:satMod val="130000"/>
+              <a:shade val="90000"/>
+              <a:lumMod val="103000"/>
+            </a:schemeClr>
+          </a:gs>
+          <a:gs pos="100000">
+            <a:schemeClr val="phClr">
+              <a:shade val="63000"/>
+              <a:satMod val="120000"/>
+            </a:schemeClr>
+          </a:gs>
+        </a:gsLst>
+        <a:lin ang="5400000" scaled="0"/>
+      </a:gradFill>
+    </a:bgFillStyleLst>
+  </a:fmtScheme>
+</a:themeOverride>
 </file>
</xml_diff>

<commit_message>
Added findings for where more staffing is needed
</commit_message>
<xml_diff>
--- a/Hospital Analysis Overview & Findings.pptx
+++ b/Hospital Analysis Overview & Findings.pptx
@@ -5,15 +5,16 @@
     <p:sldMasterId id="2147483687" r:id="rId1"/>
   </p:sldMasterIdLst>
   <p:notesMasterIdLst>
-    <p:notesMasterId r:id="rId8"/>
+    <p:notesMasterId r:id="rId9"/>
   </p:notesMasterIdLst>
   <p:sldIdLst>
     <p:sldId id="256" r:id="rId2"/>
-    <p:sldId id="257" r:id="rId3"/>
-    <p:sldId id="258" r:id="rId4"/>
-    <p:sldId id="259" r:id="rId5"/>
-    <p:sldId id="260" r:id="rId6"/>
-    <p:sldId id="261" r:id="rId7"/>
+    <p:sldId id="258" r:id="rId3"/>
+    <p:sldId id="259" r:id="rId4"/>
+    <p:sldId id="260" r:id="rId5"/>
+    <p:sldId id="261" r:id="rId6"/>
+    <p:sldId id="262" r:id="rId7"/>
+    <p:sldId id="263" r:id="rId8"/>
   </p:sldIdLst>
   <p:sldSz cx="12192000" cy="6858000"/>
   <p:notesSz cx="6858000" cy="9144000"/>
@@ -268,7 +269,7 @@
                   <a:bodyPr/>
                   <a:lstStyle/>
                   <a:p>
-                    <a:fld id="{C0396426-9B75-4CFF-9DF7-C629626411B8}" type="CELLRANGE">
+                    <a:fld id="{BE98F29D-8E8D-4793-8D39-4CEA87942007}" type="CELLRANGE">
                       <a:rPr lang="en-US" baseline="0"/>
                       <a:pPr/>
                       <a:t>[CELLRANGE]</a:t>
@@ -277,7 +278,7 @@
                       <a:rPr lang="en-US" baseline="0"/>
                       <a:t>, </a:t>
                     </a:r>
-                    <a:fld id="{27983CA5-E09A-4710-9DF4-1A3A21ABE213}" type="CATEGORYNAME">
+                    <a:fld id="{6480A8A0-199C-45F4-A923-58D92459909A}" type="CATEGORYNAME">
                       <a:rPr lang="en-US" baseline="0"/>
                       <a:pPr/>
                       <a:t>[CATEGORY NAME]</a:t>
@@ -286,7 +287,7 @@
                       <a:rPr lang="en-US" baseline="0"/>
                       <a:t>, </a:t>
                     </a:r>
-                    <a:fld id="{F8E2522C-95D1-4111-8EA3-4CDAF6A1E73C}" type="VALUE">
+                    <a:fld id="{A5FD555D-A554-46B3-94BD-C67E02B27380}" type="VALUE">
                       <a:rPr lang="en-US" baseline="0"/>
                       <a:pPr/>
                       <a:t>[VALUE]</a:t>
@@ -321,7 +322,7 @@
                   <a:bodyPr/>
                   <a:lstStyle/>
                   <a:p>
-                    <a:fld id="{75AC69FB-5E47-487A-90F5-1AD96E27070A}" type="CELLRANGE">
+                    <a:fld id="{4E6C6CA7-8101-43AB-A874-F65195B9F5BF}" type="CELLRANGE">
                       <a:rPr lang="en-US"/>
                       <a:pPr/>
                       <a:t>[CELLRANGE]</a:t>
@@ -330,7 +331,7 @@
                       <a:rPr lang="en-US" baseline="0"/>
                       <a:t>, </a:t>
                     </a:r>
-                    <a:fld id="{B1050A1F-4864-411A-9E5F-5AF1F370408F}" type="CATEGORYNAME">
+                    <a:fld id="{F38D93E7-7BF4-4025-9E05-531087BF0FB4}" type="CATEGORYNAME">
                       <a:rPr lang="en-US" baseline="0"/>
                       <a:pPr/>
                       <a:t>[CATEGORY NAME]</a:t>
@@ -339,7 +340,7 @@
                       <a:rPr lang="en-US" baseline="0"/>
                       <a:t>, </a:t>
                     </a:r>
-                    <a:fld id="{6828DEA3-AA46-4724-8212-EE76A015C4A4}" type="VALUE">
+                    <a:fld id="{C83C2BC3-F249-4180-AF44-35C8D273E389}" type="VALUE">
                       <a:rPr lang="en-US" baseline="0"/>
                       <a:pPr/>
                       <a:t>[VALUE]</a:t>
@@ -375,7 +376,7 @@
                   <a:bodyPr/>
                   <a:lstStyle/>
                   <a:p>
-                    <a:fld id="{9BFE1979-C708-42B4-8503-D884EAF2A6FD}" type="CELLRANGE">
+                    <a:fld id="{138317BF-E52C-4AA7-9EE6-0318BE84A1DD}" type="CELLRANGE">
                       <a:rPr lang="en-US"/>
                       <a:pPr/>
                       <a:t>[CELLRANGE]</a:t>
@@ -384,7 +385,7 @@
                       <a:rPr lang="en-US" baseline="0"/>
                       <a:t>, </a:t>
                     </a:r>
-                    <a:fld id="{A37C6904-DC41-47AC-9433-47C166012301}" type="CATEGORYNAME">
+                    <a:fld id="{37FFF467-C338-471B-9D40-F6BB89E7A433}" type="CATEGORYNAME">
                       <a:rPr lang="en-US" baseline="0"/>
                       <a:pPr/>
                       <a:t>[CATEGORY NAME]</a:t>
@@ -393,7 +394,7 @@
                       <a:rPr lang="en-US" baseline="0"/>
                       <a:t>, </a:t>
                     </a:r>
-                    <a:fld id="{82438DD4-815B-4C53-88E6-E95BBE0B105C}" type="VALUE">
+                    <a:fld id="{84C7A006-4FC3-47AA-8DF0-525B9E959F27}" type="VALUE">
                       <a:rPr lang="en-US" baseline="0"/>
                       <a:pPr/>
                       <a:t>[VALUE]</a:t>
@@ -429,7 +430,7 @@
                   <a:bodyPr/>
                   <a:lstStyle/>
                   <a:p>
-                    <a:fld id="{953C01B5-A1DB-4D75-95EA-0E3860FC1906}" type="CELLRANGE">
+                    <a:fld id="{737C15A0-F627-45BE-9E0E-C83D7195F597}" type="CELLRANGE">
                       <a:rPr lang="en-US"/>
                       <a:pPr/>
                       <a:t>[CELLRANGE]</a:t>
@@ -438,7 +439,7 @@
                       <a:rPr lang="en-US" baseline="0"/>
                       <a:t>, </a:t>
                     </a:r>
-                    <a:fld id="{F0382CE5-E573-4EAB-A846-59AB12231B57}" type="CATEGORYNAME">
+                    <a:fld id="{590AFA10-957F-4BED-BCE9-71B0144DE1E9}" type="CATEGORYNAME">
                       <a:rPr lang="en-US" baseline="0"/>
                       <a:pPr/>
                       <a:t>[CATEGORY NAME]</a:t>
@@ -447,7 +448,7 @@
                       <a:rPr lang="en-US" baseline="0"/>
                       <a:t>, </a:t>
                     </a:r>
-                    <a:fld id="{82666E23-5475-4C9E-B15F-A77A8FE85089}" type="VALUE">
+                    <a:fld id="{D322E8D9-96F6-450F-88BD-56CBCB7E9914}" type="VALUE">
                       <a:rPr lang="en-US" baseline="0"/>
                       <a:pPr/>
                       <a:t>[VALUE]</a:t>
@@ -483,7 +484,7 @@
                   <a:bodyPr/>
                   <a:lstStyle/>
                   <a:p>
-                    <a:fld id="{41C8E12A-521D-4E31-90CC-4F892C0D307A}" type="CELLRANGE">
+                    <a:fld id="{1C76D934-F1C9-40C5-A656-C0D035320B11}" type="CELLRANGE">
                       <a:rPr lang="en-US"/>
                       <a:pPr/>
                       <a:t>[CELLRANGE]</a:t>
@@ -492,7 +493,7 @@
                       <a:rPr lang="en-US" baseline="0"/>
                       <a:t>, </a:t>
                     </a:r>
-                    <a:fld id="{5D39440B-9B62-4811-89B1-1AA7F8E36187}" type="CATEGORYNAME">
+                    <a:fld id="{2A976C8B-A395-4862-AB60-A11D7BD14A54}" type="CATEGORYNAME">
                       <a:rPr lang="en-US" baseline="0"/>
                       <a:pPr/>
                       <a:t>[CATEGORY NAME]</a:t>
@@ -501,7 +502,7 @@
                       <a:rPr lang="en-US" baseline="0"/>
                       <a:t>, </a:t>
                     </a:r>
-                    <a:fld id="{156E445A-1C0B-4002-B319-ADA41C0295A8}" type="VALUE">
+                    <a:fld id="{CBCC7731-A1E3-4453-883A-578E68663564}" type="VALUE">
                       <a:rPr lang="en-US" baseline="0"/>
                       <a:pPr/>
                       <a:t>[VALUE]</a:t>
@@ -852,7 +853,7 @@
                   <a:bodyPr/>
                   <a:lstStyle/>
                   <a:p>
-                    <a:fld id="{1E61A9C3-A6B4-457B-B4A8-93471995476E}" type="CELLRANGE">
+                    <a:fld id="{D41CC8AF-37C6-46D5-B59B-7662CAB13A7B}" type="CELLRANGE">
                       <a:rPr lang="en-US"/>
                       <a:pPr/>
                       <a:t>[CELLRANGE]</a:t>
@@ -861,7 +862,7 @@
                       <a:rPr lang="en-US" baseline="0"/>
                       <a:t>, </a:t>
                     </a:r>
-                    <a:fld id="{9C4E6C35-476A-438F-85AF-D76ABD7E70A0}" type="VALUE">
+                    <a:fld id="{338B4F53-7164-4AF4-ADF7-1141DD91C3CA}" type="VALUE">
                       <a:rPr lang="en-US" baseline="0"/>
                       <a:pPr/>
                       <a:t>[VALUE]</a:t>
@@ -897,7 +898,7 @@
                   <a:bodyPr/>
                   <a:lstStyle/>
                   <a:p>
-                    <a:fld id="{E0B522CF-5A73-4BC8-A303-66A31B7D2193}" type="CELLRANGE">
+                    <a:fld id="{16C5B293-EC59-4208-BBCE-BF27754D2BAE}" type="CELLRANGE">
                       <a:rPr lang="en-US"/>
                       <a:pPr/>
                       <a:t>[CELLRANGE]</a:t>
@@ -906,7 +907,7 @@
                       <a:rPr lang="en-US" baseline="0"/>
                       <a:t>, </a:t>
                     </a:r>
-                    <a:fld id="{BF88D8C8-3A95-4CF5-8FFD-56AFD3670AC3}" type="VALUE">
+                    <a:fld id="{4943445E-EC11-4AB8-8329-C3B23B0E846C}" type="VALUE">
                       <a:rPr lang="en-US" baseline="0"/>
                       <a:pPr/>
                       <a:t>[VALUE]</a:t>
@@ -942,7 +943,7 @@
                   <a:bodyPr/>
                   <a:lstStyle/>
                   <a:p>
-                    <a:fld id="{9D7768D1-FF12-4482-A875-1550B6A3FF54}" type="CELLRANGE">
+                    <a:fld id="{9223E92D-0938-413C-A291-9754949CDF7F}" type="CELLRANGE">
                       <a:rPr lang="en-US"/>
                       <a:pPr/>
                       <a:t>[CELLRANGE]</a:t>
@@ -951,7 +952,7 @@
                       <a:rPr lang="en-US" baseline="0"/>
                       <a:t>, </a:t>
                     </a:r>
-                    <a:fld id="{76487366-5E04-46A6-8DA5-56E21D5EDDE4}" type="VALUE">
+                    <a:fld id="{B399A753-1C23-4D1B-A2E4-8AA09CF060A1}" type="VALUE">
                       <a:rPr lang="en-US" baseline="0"/>
                       <a:pPr/>
                       <a:t>[VALUE]</a:t>
@@ -987,7 +988,7 @@
                   <a:bodyPr/>
                   <a:lstStyle/>
                   <a:p>
-                    <a:fld id="{6A11DDFF-8F1F-4475-9FC8-E4B59F77C643}" type="CELLRANGE">
+                    <a:fld id="{381BE02E-937F-4D21-922F-0C0918177EE3}" type="CELLRANGE">
                       <a:rPr lang="en-US"/>
                       <a:pPr/>
                       <a:t>[CELLRANGE]</a:t>
@@ -996,7 +997,7 @@
                       <a:rPr lang="en-US" baseline="0"/>
                       <a:t>, </a:t>
                     </a:r>
-                    <a:fld id="{7805ADF1-2418-4A38-9BAB-C7375FB46226}" type="VALUE">
+                    <a:fld id="{DAB28A7B-260D-4CEA-ACDC-3895ADC8FAE2}" type="VALUE">
                       <a:rPr lang="en-US" baseline="0"/>
                       <a:pPr/>
                       <a:t>[VALUE]</a:t>
@@ -1032,7 +1033,7 @@
                   <a:bodyPr/>
                   <a:lstStyle/>
                   <a:p>
-                    <a:fld id="{4C6401C1-8F8E-4DBE-B7B5-F4DB6F011B39}" type="CELLRANGE">
+                    <a:fld id="{FEFCD5C4-6DC4-42BB-99AC-C7595ECEC4BB}" type="CELLRANGE">
                       <a:rPr lang="en-US"/>
                       <a:pPr/>
                       <a:t>[CELLRANGE]</a:t>
@@ -1041,7 +1042,7 @@
                       <a:rPr lang="en-US" baseline="0"/>
                       <a:t>, </a:t>
                     </a:r>
-                    <a:fld id="{95FBA1D4-7531-4FED-A763-883C95210D1E}" type="VALUE">
+                    <a:fld id="{44D62925-CC15-426B-B23A-EE331B6A3D71}" type="VALUE">
                       <a:rPr lang="en-US" baseline="0"/>
                       <a:pPr/>
                       <a:t>[VALUE]</a:t>
@@ -1077,7 +1078,7 @@
                   <a:bodyPr/>
                   <a:lstStyle/>
                   <a:p>
-                    <a:fld id="{8784E69F-1EE8-49FA-BF34-4A961539B840}" type="CELLRANGE">
+                    <a:fld id="{E6860B2D-E344-455D-BEDA-C6FC119A581D}" type="CELLRANGE">
                       <a:rPr lang="en-US"/>
                       <a:pPr/>
                       <a:t>[CELLRANGE]</a:t>
@@ -1086,7 +1087,7 @@
                       <a:rPr lang="en-US" baseline="0"/>
                       <a:t>, </a:t>
                     </a:r>
-                    <a:fld id="{6C398CFF-607E-406C-9C9A-B296D9AAF1D9}" type="VALUE">
+                    <a:fld id="{52524E7E-BA8D-49A4-AF62-10333C305593}" type="VALUE">
                       <a:rPr lang="en-US" baseline="0"/>
                       <a:pPr/>
                       <a:t>[VALUE]</a:t>
@@ -1122,7 +1123,7 @@
                   <a:bodyPr/>
                   <a:lstStyle/>
                   <a:p>
-                    <a:fld id="{D4ED2EFA-8181-4636-94D7-01D968429A72}" type="CELLRANGE">
+                    <a:fld id="{5E89EF51-26DA-4E96-8060-2402BB6C5AF3}" type="CELLRANGE">
                       <a:rPr lang="en-US"/>
                       <a:pPr/>
                       <a:t>[CELLRANGE]</a:t>
@@ -1131,7 +1132,7 @@
                       <a:rPr lang="en-US" baseline="0"/>
                       <a:t>, </a:t>
                     </a:r>
-                    <a:fld id="{953EB691-428C-4FA4-83E7-26782FC18B5F}" type="VALUE">
+                    <a:fld id="{508E7A1D-A94A-406A-AF16-99982C4040D8}" type="VALUE">
                       <a:rPr lang="en-US" baseline="0"/>
                       <a:pPr/>
                       <a:t>[VALUE]</a:t>
@@ -2602,6 +2603,420 @@
 </c:chartSpace>
 </file>
 
+<file path=ppt/charts/chart4.xml><?xml version="1.0" encoding="utf-8"?>
+<c:chartSpace xmlns:c="http://schemas.openxmlformats.org/drawingml/2006/chart" xmlns:a="http://schemas.openxmlformats.org/drawingml/2006/main" xmlns:r="http://schemas.openxmlformats.org/officeDocument/2006/relationships" xmlns:c16r2="http://schemas.microsoft.com/office/drawing/2015/06/chart">
+  <c:date1904 val="0"/>
+  <c:lang val="en-US"/>
+  <c:roundedCorners val="0"/>
+  <mc:AlternateContent xmlns:mc="http://schemas.openxmlformats.org/markup-compatibility/2006">
+    <mc:Choice xmlns:c14="http://schemas.microsoft.com/office/drawing/2007/8/2/chart" Requires="c14">
+      <c14:style val="102"/>
+    </mc:Choice>
+    <mc:Fallback>
+      <c:style val="2"/>
+    </mc:Fallback>
+  </mc:AlternateContent>
+  <c:clrMapOvr bg1="lt1" tx1="dk1" bg2="lt2" tx2="dk2" accent1="accent1" accent2="accent2" accent3="accent3" accent4="accent4" accent5="accent5" accent6="accent6" hlink="hlink" folHlink="folHlink"/>
+  <c:chart>
+    <c:title>
+      <c:tx>
+        <c:rich>
+          <a:bodyPr rot="0" spcFirstLastPara="1" vertOverflow="ellipsis" vert="horz" wrap="square" anchor="ctr" anchorCtr="1"/>
+          <a:lstStyle/>
+          <a:p>
+            <a:pPr>
+              <a:defRPr sz="1400" b="0" i="0" u="none" strike="noStrike" kern="1200" spc="0" baseline="0">
+                <a:solidFill>
+                  <a:schemeClr val="tx1">
+                    <a:lumMod val="65000"/>
+                    <a:lumOff val="35000"/>
+                  </a:schemeClr>
+                </a:solidFill>
+                <a:latin typeface="+mn-lt"/>
+                <a:ea typeface="+mn-ea"/>
+                <a:cs typeface="+mn-cs"/>
+              </a:defRPr>
+            </a:pPr>
+            <a:r>
+              <a:rPr lang="en-US" b="1"/>
+              <a:t>Proportion</a:t>
+            </a:r>
+            <a:r>
+              <a:rPr lang="en-US" b="1" baseline="0"/>
+              <a:t> of time spent on hospital for Processes</a:t>
+            </a:r>
+            <a:endParaRPr lang="en-US" b="1"/>
+          </a:p>
+        </c:rich>
+      </c:tx>
+      <c:layout/>
+      <c:overlay val="0"/>
+      <c:spPr>
+        <a:noFill/>
+        <a:ln>
+          <a:noFill/>
+        </a:ln>
+        <a:effectLst/>
+      </c:spPr>
+      <c:txPr>
+        <a:bodyPr rot="0" spcFirstLastPara="1" vertOverflow="ellipsis" vert="horz" wrap="square" anchor="ctr" anchorCtr="1"/>
+        <a:lstStyle/>
+        <a:p>
+          <a:pPr>
+            <a:defRPr sz="1400" b="0" i="0" u="none" strike="noStrike" kern="1200" spc="0" baseline="0">
+              <a:solidFill>
+                <a:schemeClr val="tx1">
+                  <a:lumMod val="65000"/>
+                  <a:lumOff val="35000"/>
+                </a:schemeClr>
+              </a:solidFill>
+              <a:latin typeface="+mn-lt"/>
+              <a:ea typeface="+mn-ea"/>
+              <a:cs typeface="+mn-cs"/>
+            </a:defRPr>
+          </a:pPr>
+          <a:endParaRPr lang="en-US"/>
+        </a:p>
+      </c:txPr>
+    </c:title>
+    <c:autoTitleDeleted val="0"/>
+    <c:plotArea>
+      <c:layout/>
+      <c:pieChart>
+        <c:varyColors val="1"/>
+        <c:ser>
+          <c:idx val="0"/>
+          <c:order val="0"/>
+          <c:tx>
+            <c:strRef>
+              <c:f>Visuals!$D$27</c:f>
+              <c:strCache>
+                <c:ptCount val="1"/>
+                <c:pt idx="0">
+                  <c:v>Values</c:v>
+                </c:pt>
+              </c:strCache>
+            </c:strRef>
+          </c:tx>
+          <c:dPt>
+            <c:idx val="0"/>
+            <c:bubble3D val="0"/>
+            <c:spPr>
+              <a:solidFill>
+                <a:schemeClr val="accent1"/>
+              </a:solidFill>
+              <a:ln w="19050">
+                <a:solidFill>
+                  <a:schemeClr val="lt1"/>
+                </a:solidFill>
+              </a:ln>
+              <a:effectLst/>
+            </c:spPr>
+            <c:extLst>
+              <c:ext xmlns:c16="http://schemas.microsoft.com/office/drawing/2014/chart" uri="{C3380CC4-5D6E-409C-BE32-E72D297353CC}">
+                <c16:uniqueId val="{00000001-40C9-45A7-8F0D-7B6EFA0F5FB0}"/>
+              </c:ext>
+            </c:extLst>
+          </c:dPt>
+          <c:dPt>
+            <c:idx val="1"/>
+            <c:bubble3D val="0"/>
+            <c:spPr>
+              <a:solidFill>
+                <a:schemeClr val="accent2"/>
+              </a:solidFill>
+              <a:ln w="19050">
+                <a:solidFill>
+                  <a:schemeClr val="lt1"/>
+                </a:solidFill>
+              </a:ln>
+              <a:effectLst/>
+            </c:spPr>
+            <c:extLst>
+              <c:ext xmlns:c16="http://schemas.microsoft.com/office/drawing/2014/chart" uri="{C3380CC4-5D6E-409C-BE32-E72D297353CC}">
+                <c16:uniqueId val="{00000003-40C9-45A7-8F0D-7B6EFA0F5FB0}"/>
+              </c:ext>
+            </c:extLst>
+          </c:dPt>
+          <c:dLbls>
+            <c:dLbl>
+              <c:idx val="0"/>
+              <c:layout/>
+              <c:tx>
+                <c:rich>
+                  <a:bodyPr/>
+                  <a:lstStyle/>
+                  <a:p>
+                    <a:fld id="{D983ECFF-2B60-40D2-B1EB-0EDA1FF88FF3}" type="CELLRANGE">
+                      <a:rPr lang="en-US"/>
+                      <a:pPr/>
+                      <a:t>[CELLRANGE]</a:t>
+                    </a:fld>
+                    <a:r>
+                      <a:rPr lang="en-US" baseline="0"/>
+                      <a:t>, </a:t>
+                    </a:r>
+                    <a:fld id="{38148D50-7CAC-4B35-AE68-C627DFCDC732}" type="VALUE">
+                      <a:rPr lang="en-US" baseline="0"/>
+                      <a:pPr/>
+                      <a:t>[VALUE]</a:t>
+                    </a:fld>
+                    <a:endParaRPr lang="en-US" baseline="0"/>
+                  </a:p>
+                </c:rich>
+              </c:tx>
+              <c:dLblPos val="bestFit"/>
+              <c:showLegendKey val="0"/>
+              <c:showVal val="1"/>
+              <c:showCatName val="0"/>
+              <c:showSerName val="0"/>
+              <c:showPercent val="0"/>
+              <c:showBubbleSize val="0"/>
+              <c:extLst>
+                <c:ext xmlns:c15="http://schemas.microsoft.com/office/drawing/2012/chart" uri="{CE6537A1-D6FC-4f65-9D91-7224C49458BB}">
+                  <c15:layout/>
+                  <c15:dlblFieldTable/>
+                  <c15:xForSave val="1"/>
+                  <c15:showDataLabelsRange val="1"/>
+                </c:ext>
+                <c:ext xmlns:c16="http://schemas.microsoft.com/office/drawing/2014/chart" uri="{C3380CC4-5D6E-409C-BE32-E72D297353CC}">
+                  <c16:uniqueId val="{00000001-40C9-45A7-8F0D-7B6EFA0F5FB0}"/>
+                </c:ext>
+              </c:extLst>
+            </c:dLbl>
+            <c:dLbl>
+              <c:idx val="1"/>
+              <c:layout/>
+              <c:tx>
+                <c:rich>
+                  <a:bodyPr/>
+                  <a:lstStyle/>
+                  <a:p>
+                    <a:fld id="{2C90D73E-AE39-48CC-B6C6-36EFDC7B58DF}" type="CELLRANGE">
+                      <a:rPr lang="en-US"/>
+                      <a:pPr/>
+                      <a:t>[CELLRANGE]</a:t>
+                    </a:fld>
+                    <a:r>
+                      <a:rPr lang="en-US" baseline="0"/>
+                      <a:t>, </a:t>
+                    </a:r>
+                    <a:fld id="{764A6C6E-ABCF-4019-8C53-BEDC4723B610}" type="VALUE">
+                      <a:rPr lang="en-US" baseline="0"/>
+                      <a:pPr/>
+                      <a:t>[VALUE]</a:t>
+                    </a:fld>
+                    <a:endParaRPr lang="en-US" baseline="0"/>
+                  </a:p>
+                </c:rich>
+              </c:tx>
+              <c:dLblPos val="bestFit"/>
+              <c:showLegendKey val="0"/>
+              <c:showVal val="1"/>
+              <c:showCatName val="0"/>
+              <c:showSerName val="0"/>
+              <c:showPercent val="0"/>
+              <c:showBubbleSize val="0"/>
+              <c:extLst>
+                <c:ext xmlns:c15="http://schemas.microsoft.com/office/drawing/2012/chart" uri="{CE6537A1-D6FC-4f65-9D91-7224C49458BB}">
+                  <c15:layout/>
+                  <c15:dlblFieldTable/>
+                  <c15:xForSave val="1"/>
+                  <c15:showDataLabelsRange val="1"/>
+                </c:ext>
+                <c:ext xmlns:c16="http://schemas.microsoft.com/office/drawing/2014/chart" uri="{C3380CC4-5D6E-409C-BE32-E72D297353CC}">
+                  <c16:uniqueId val="{00000003-40C9-45A7-8F0D-7B6EFA0F5FB0}"/>
+                </c:ext>
+              </c:extLst>
+            </c:dLbl>
+            <c:spPr>
+              <a:solidFill>
+                <a:schemeClr val="bg2"/>
+              </a:solidFill>
+              <a:ln>
+                <a:noFill/>
+              </a:ln>
+              <a:effectLst/>
+            </c:spPr>
+            <c:txPr>
+              <a:bodyPr rot="0" spcFirstLastPara="1" vertOverflow="ellipsis" vert="horz" wrap="square" lIns="38100" tIns="19050" rIns="38100" bIns="19050" anchor="ctr" anchorCtr="1">
+                <a:spAutoFit/>
+              </a:bodyPr>
+              <a:lstStyle/>
+              <a:p>
+                <a:pPr>
+                  <a:defRPr sz="1500" b="0" i="0" u="none" strike="noStrike" kern="1200" baseline="0">
+                    <a:solidFill>
+                      <a:schemeClr val="tx1">
+                        <a:lumMod val="75000"/>
+                        <a:lumOff val="25000"/>
+                      </a:schemeClr>
+                    </a:solidFill>
+                    <a:latin typeface="+mn-lt"/>
+                    <a:ea typeface="+mn-ea"/>
+                    <a:cs typeface="+mn-cs"/>
+                  </a:defRPr>
+                </a:pPr>
+                <a:endParaRPr lang="en-US"/>
+              </a:p>
+            </c:txPr>
+            <c:dLblPos val="bestFit"/>
+            <c:showLegendKey val="0"/>
+            <c:showVal val="1"/>
+            <c:showCatName val="0"/>
+            <c:showSerName val="0"/>
+            <c:showPercent val="0"/>
+            <c:showBubbleSize val="0"/>
+            <c:showLeaderLines val="1"/>
+            <c:leaderLines>
+              <c:spPr>
+                <a:ln w="9525" cap="flat" cmpd="sng" algn="ctr">
+                  <a:solidFill>
+                    <a:schemeClr val="tx1">
+                      <a:lumMod val="35000"/>
+                      <a:lumOff val="65000"/>
+                    </a:schemeClr>
+                  </a:solidFill>
+                  <a:round/>
+                </a:ln>
+                <a:effectLst/>
+              </c:spPr>
+            </c:leaderLines>
+            <c:extLst>
+              <c:ext xmlns:c15="http://schemas.microsoft.com/office/drawing/2012/chart" uri="{CE6537A1-D6FC-4f65-9D91-7224C49458BB}">
+                <c15:layout/>
+                <c15:showDataLabelsRange val="1"/>
+              </c:ext>
+            </c:extLst>
+          </c:dLbls>
+          <c:cat>
+            <c:strRef>
+              <c:f>Visuals!$C$28:$C$29</c:f>
+              <c:strCache>
+                <c:ptCount val="2"/>
+                <c:pt idx="0">
+                  <c:v>Average of Consultation %</c:v>
+                </c:pt>
+                <c:pt idx="1">
+                  <c:v>Average of Process %</c:v>
+                </c:pt>
+              </c:strCache>
+            </c:strRef>
+          </c:cat>
+          <c:val>
+            <c:numRef>
+              <c:f>Visuals!$D$28:$D$29</c:f>
+              <c:numCache>
+                <c:formatCode>0%</c:formatCode>
+                <c:ptCount val="2"/>
+                <c:pt idx="0">
+                  <c:v>0.88208049610677897</c:v>
+                </c:pt>
+                <c:pt idx="1">
+                  <c:v>0.11791950389322102</c:v>
+                </c:pt>
+              </c:numCache>
+            </c:numRef>
+          </c:val>
+          <c:extLst>
+            <c:ext xmlns:c15="http://schemas.microsoft.com/office/drawing/2012/chart" uri="{02D57815-91ED-43cb-92C2-25804820EDAC}">
+              <c15:datalabelsRange>
+                <c15:f>Visuals!$D$30:$D$31</c15:f>
+                <c15:dlblRangeCache>
+                  <c:ptCount val="2"/>
+                  <c:pt idx="0">
+                    <c:v>39min</c:v>
+                  </c:pt>
+                  <c:pt idx="1">
+                    <c:v>5min</c:v>
+                  </c:pt>
+                </c15:dlblRangeCache>
+              </c15:datalabelsRange>
+            </c:ext>
+            <c:ext xmlns:c16="http://schemas.microsoft.com/office/drawing/2014/chart" uri="{C3380CC4-5D6E-409C-BE32-E72D297353CC}">
+              <c16:uniqueId val="{00000004-40C9-45A7-8F0D-7B6EFA0F5FB0}"/>
+            </c:ext>
+          </c:extLst>
+        </c:ser>
+        <c:dLbls>
+          <c:dLblPos val="bestFit"/>
+          <c:showLegendKey val="0"/>
+          <c:showVal val="1"/>
+          <c:showCatName val="0"/>
+          <c:showSerName val="0"/>
+          <c:showPercent val="0"/>
+          <c:showBubbleSize val="0"/>
+          <c:showLeaderLines val="1"/>
+        </c:dLbls>
+        <c:firstSliceAng val="0"/>
+      </c:pieChart>
+      <c:spPr>
+        <a:noFill/>
+        <a:ln>
+          <a:noFill/>
+        </a:ln>
+        <a:effectLst/>
+      </c:spPr>
+    </c:plotArea>
+    <c:legend>
+      <c:legendPos val="b"/>
+      <c:layout/>
+      <c:overlay val="0"/>
+      <c:spPr>
+        <a:noFill/>
+        <a:ln>
+          <a:noFill/>
+        </a:ln>
+        <a:effectLst/>
+      </c:spPr>
+      <c:txPr>
+        <a:bodyPr rot="0" spcFirstLastPara="1" vertOverflow="ellipsis" vert="horz" wrap="square" anchor="ctr" anchorCtr="1"/>
+        <a:lstStyle/>
+        <a:p>
+          <a:pPr>
+            <a:defRPr sz="900" b="0" i="0" u="none" strike="noStrike" kern="1200" baseline="0">
+              <a:solidFill>
+                <a:schemeClr val="tx1">
+                  <a:lumMod val="65000"/>
+                  <a:lumOff val="35000"/>
+                </a:schemeClr>
+              </a:solidFill>
+              <a:latin typeface="+mn-lt"/>
+              <a:ea typeface="+mn-ea"/>
+              <a:cs typeface="+mn-cs"/>
+            </a:defRPr>
+          </a:pPr>
+          <a:endParaRPr lang="en-US"/>
+        </a:p>
+      </c:txPr>
+    </c:legend>
+    <c:plotVisOnly val="1"/>
+    <c:dispBlanksAs val="gap"/>
+    <c:showDLblsOverMax val="0"/>
+  </c:chart>
+  <c:spPr>
+    <a:noFill/>
+    <a:ln>
+      <a:noFill/>
+    </a:ln>
+    <a:effectLst/>
+  </c:spPr>
+  <c:txPr>
+    <a:bodyPr/>
+    <a:lstStyle/>
+    <a:p>
+      <a:pPr>
+        <a:defRPr/>
+      </a:pPr>
+      <a:endParaRPr lang="en-US"/>
+    </a:p>
+  </c:txPr>
+  <c:externalData r:id="rId4">
+    <c:autoUpdate val="0"/>
+  </c:externalData>
+</c:chartSpace>
+</file>
+
 <file path=ppt/charts/colors1.xml><?xml version="1.0" encoding="utf-8"?>
 <cs:colorStyle xmlns:cs="http://schemas.microsoft.com/office/drawing/2012/chartStyle" xmlns:a="http://schemas.openxmlformats.org/drawingml/2006/main" meth="cycle" id="10">
   <a:schemeClr val="accent1"/>
@@ -2683,6 +3098,46 @@
 </file>
 
 <file path=ppt/charts/colors3.xml><?xml version="1.0" encoding="utf-8"?>
+<cs:colorStyle xmlns:cs="http://schemas.microsoft.com/office/drawing/2012/chartStyle" xmlns:a="http://schemas.openxmlformats.org/drawingml/2006/main" meth="cycle" id="10">
+  <a:schemeClr val="accent1"/>
+  <a:schemeClr val="accent2"/>
+  <a:schemeClr val="accent3"/>
+  <a:schemeClr val="accent4"/>
+  <a:schemeClr val="accent5"/>
+  <a:schemeClr val="accent6"/>
+  <cs:variation/>
+  <cs:variation>
+    <a:lumMod val="60000"/>
+  </cs:variation>
+  <cs:variation>
+    <a:lumMod val="80000"/>
+    <a:lumOff val="20000"/>
+  </cs:variation>
+  <cs:variation>
+    <a:lumMod val="80000"/>
+  </cs:variation>
+  <cs:variation>
+    <a:lumMod val="60000"/>
+    <a:lumOff val="40000"/>
+  </cs:variation>
+  <cs:variation>
+    <a:lumMod val="50000"/>
+  </cs:variation>
+  <cs:variation>
+    <a:lumMod val="70000"/>
+    <a:lumOff val="30000"/>
+  </cs:variation>
+  <cs:variation>
+    <a:lumMod val="70000"/>
+  </cs:variation>
+  <cs:variation>
+    <a:lumMod val="50000"/>
+    <a:lumOff val="50000"/>
+  </cs:variation>
+</cs:colorStyle>
+</file>
+
+<file path=ppt/charts/colors4.xml><?xml version="1.0" encoding="utf-8"?>
 <cs:colorStyle xmlns:cs="http://schemas.microsoft.com/office/drawing/2012/chartStyle" xmlns:a="http://schemas.openxmlformats.org/drawingml/2006/main" meth="cycle" id="10">
   <a:schemeClr val="accent1"/>
   <a:schemeClr val="accent2"/>
@@ -4247,6 +4702,525 @@
 </cs:chartStyle>
 </file>
 
+<file path=ppt/charts/style4.xml><?xml version="1.0" encoding="utf-8"?>
+<cs:chartStyle xmlns:cs="http://schemas.microsoft.com/office/drawing/2012/chartStyle" xmlns:a="http://schemas.openxmlformats.org/drawingml/2006/main" id="251">
+  <cs:axisTitle>
+    <cs:lnRef idx="0"/>
+    <cs:fillRef idx="0"/>
+    <cs:effectRef idx="0"/>
+    <cs:fontRef idx="minor">
+      <a:schemeClr val="tx1">
+        <a:lumMod val="65000"/>
+        <a:lumOff val="35000"/>
+      </a:schemeClr>
+    </cs:fontRef>
+    <cs:defRPr sz="1000" kern="1200"/>
+  </cs:axisTitle>
+  <cs:categoryAxis>
+    <cs:lnRef idx="0"/>
+    <cs:fillRef idx="0"/>
+    <cs:effectRef idx="0"/>
+    <cs:fontRef idx="minor">
+      <a:schemeClr val="tx1">
+        <a:lumMod val="65000"/>
+        <a:lumOff val="35000"/>
+      </a:schemeClr>
+    </cs:fontRef>
+    <cs:spPr>
+      <a:ln w="9525" cap="flat" cmpd="sng" algn="ctr">
+        <a:solidFill>
+          <a:schemeClr val="tx1">
+            <a:lumMod val="15000"/>
+            <a:lumOff val="85000"/>
+          </a:schemeClr>
+        </a:solidFill>
+        <a:round/>
+      </a:ln>
+    </cs:spPr>
+    <cs:defRPr sz="900" kern="1200"/>
+  </cs:categoryAxis>
+  <cs:chartArea mods="allowNoFillOverride allowNoLineOverride">
+    <cs:lnRef idx="0"/>
+    <cs:fillRef idx="0"/>
+    <cs:effectRef idx="0"/>
+    <cs:fontRef idx="minor">
+      <a:schemeClr val="tx1"/>
+    </cs:fontRef>
+    <cs:spPr>
+      <a:solidFill>
+        <a:schemeClr val="bg1"/>
+      </a:solidFill>
+      <a:ln w="9525" cap="flat" cmpd="sng" algn="ctr">
+        <a:solidFill>
+          <a:schemeClr val="tx1">
+            <a:lumMod val="15000"/>
+            <a:lumOff val="85000"/>
+          </a:schemeClr>
+        </a:solidFill>
+        <a:round/>
+      </a:ln>
+    </cs:spPr>
+    <cs:defRPr sz="900" kern="1200"/>
+  </cs:chartArea>
+  <cs:dataLabel>
+    <cs:lnRef idx="0"/>
+    <cs:fillRef idx="0"/>
+    <cs:effectRef idx="0"/>
+    <cs:fontRef idx="minor">
+      <a:schemeClr val="tx1">
+        <a:lumMod val="75000"/>
+        <a:lumOff val="25000"/>
+      </a:schemeClr>
+    </cs:fontRef>
+    <cs:defRPr sz="900" kern="1200"/>
+  </cs:dataLabel>
+  <cs:dataLabelCallout>
+    <cs:lnRef idx="0"/>
+    <cs:fillRef idx="0"/>
+    <cs:effectRef idx="0"/>
+    <cs:fontRef idx="minor">
+      <a:schemeClr val="dk1">
+        <a:lumMod val="65000"/>
+        <a:lumOff val="35000"/>
+      </a:schemeClr>
+    </cs:fontRef>
+    <cs:spPr>
+      <a:solidFill>
+        <a:schemeClr val="lt1"/>
+      </a:solidFill>
+      <a:ln>
+        <a:solidFill>
+          <a:schemeClr val="dk1">
+            <a:lumMod val="25000"/>
+            <a:lumOff val="75000"/>
+          </a:schemeClr>
+        </a:solidFill>
+      </a:ln>
+    </cs:spPr>
+    <cs:defRPr sz="900" kern="1200"/>
+    <cs:bodyPr rot="0" spcFirstLastPara="1" vertOverflow="clip" horzOverflow="clip" vert="horz" wrap="square" lIns="36576" tIns="18288" rIns="36576" bIns="18288" anchor="ctr" anchorCtr="1">
+      <a:spAutoFit/>
+    </cs:bodyPr>
+  </cs:dataLabelCallout>
+  <cs:dataPoint>
+    <cs:lnRef idx="0"/>
+    <cs:fillRef idx="1">
+      <cs:styleClr val="auto"/>
+    </cs:fillRef>
+    <cs:effectRef idx="0"/>
+    <cs:fontRef idx="minor">
+      <a:schemeClr val="tx1"/>
+    </cs:fontRef>
+    <cs:spPr>
+      <a:ln w="19050">
+        <a:solidFill>
+          <a:schemeClr val="lt1"/>
+        </a:solidFill>
+      </a:ln>
+    </cs:spPr>
+  </cs:dataPoint>
+  <cs:dataPoint3D>
+    <cs:lnRef idx="0"/>
+    <cs:fillRef idx="1">
+      <cs:styleClr val="auto"/>
+    </cs:fillRef>
+    <cs:effectRef idx="0"/>
+    <cs:fontRef idx="minor">
+      <a:schemeClr val="tx1"/>
+    </cs:fontRef>
+    <cs:spPr>
+      <a:ln w="25400">
+        <a:solidFill>
+          <a:schemeClr val="lt1"/>
+        </a:solidFill>
+      </a:ln>
+    </cs:spPr>
+  </cs:dataPoint3D>
+  <cs:dataPointLine>
+    <cs:lnRef idx="0">
+      <cs:styleClr val="auto"/>
+    </cs:lnRef>
+    <cs:fillRef idx="0"/>
+    <cs:effectRef idx="0"/>
+    <cs:fontRef idx="minor">
+      <a:schemeClr val="tx1"/>
+    </cs:fontRef>
+    <cs:spPr>
+      <a:ln w="28575" cap="rnd">
+        <a:solidFill>
+          <a:schemeClr val="phClr"/>
+        </a:solidFill>
+        <a:round/>
+      </a:ln>
+    </cs:spPr>
+  </cs:dataPointLine>
+  <cs:dataPointMarker>
+    <cs:lnRef idx="0">
+      <cs:styleClr val="auto"/>
+    </cs:lnRef>
+    <cs:fillRef idx="1">
+      <cs:styleClr val="auto"/>
+    </cs:fillRef>
+    <cs:effectRef idx="0"/>
+    <cs:fontRef idx="minor">
+      <a:schemeClr val="tx1"/>
+    </cs:fontRef>
+    <cs:spPr>
+      <a:ln w="9525">
+        <a:solidFill>
+          <a:schemeClr val="phClr"/>
+        </a:solidFill>
+      </a:ln>
+    </cs:spPr>
+  </cs:dataPointMarker>
+  <cs:dataPointMarkerLayout symbol="circle" size="5"/>
+  <cs:dataPointWireframe>
+    <cs:lnRef idx="0">
+      <cs:styleClr val="auto"/>
+    </cs:lnRef>
+    <cs:fillRef idx="0"/>
+    <cs:effectRef idx="0"/>
+    <cs:fontRef idx="minor">
+      <a:schemeClr val="tx1"/>
+    </cs:fontRef>
+    <cs:spPr>
+      <a:ln w="9525" cap="rnd">
+        <a:solidFill>
+          <a:schemeClr val="phClr"/>
+        </a:solidFill>
+        <a:round/>
+      </a:ln>
+    </cs:spPr>
+  </cs:dataPointWireframe>
+  <cs:dataTable>
+    <cs:lnRef idx="0"/>
+    <cs:fillRef idx="0"/>
+    <cs:effectRef idx="0"/>
+    <cs:fontRef idx="minor">
+      <a:schemeClr val="tx1">
+        <a:lumMod val="65000"/>
+        <a:lumOff val="35000"/>
+      </a:schemeClr>
+    </cs:fontRef>
+    <cs:spPr>
+      <a:noFill/>
+      <a:ln w="9525" cap="flat" cmpd="sng" algn="ctr">
+        <a:solidFill>
+          <a:schemeClr val="tx1">
+            <a:lumMod val="15000"/>
+            <a:lumOff val="85000"/>
+          </a:schemeClr>
+        </a:solidFill>
+        <a:round/>
+      </a:ln>
+    </cs:spPr>
+    <cs:defRPr sz="900" kern="1200"/>
+  </cs:dataTable>
+  <cs:downBar>
+    <cs:lnRef idx="0"/>
+    <cs:fillRef idx="0"/>
+    <cs:effectRef idx="0"/>
+    <cs:fontRef idx="minor">
+      <a:schemeClr val="tx1"/>
+    </cs:fontRef>
+    <cs:spPr>
+      <a:solidFill>
+        <a:schemeClr val="dk1">
+          <a:lumMod val="75000"/>
+          <a:lumOff val="25000"/>
+        </a:schemeClr>
+      </a:solidFill>
+      <a:ln w="9525" cap="flat" cmpd="sng" algn="ctr">
+        <a:solidFill>
+          <a:schemeClr val="tx1">
+            <a:lumMod val="65000"/>
+            <a:lumOff val="35000"/>
+          </a:schemeClr>
+        </a:solidFill>
+        <a:round/>
+      </a:ln>
+    </cs:spPr>
+  </cs:downBar>
+  <cs:dropLine>
+    <cs:lnRef idx="0"/>
+    <cs:fillRef idx="0"/>
+    <cs:effectRef idx="0"/>
+    <cs:fontRef idx="minor">
+      <a:schemeClr val="tx1"/>
+    </cs:fontRef>
+    <cs:spPr>
+      <a:ln w="9525" cap="flat" cmpd="sng" algn="ctr">
+        <a:solidFill>
+          <a:schemeClr val="tx1">
+            <a:lumMod val="35000"/>
+            <a:lumOff val="65000"/>
+          </a:schemeClr>
+        </a:solidFill>
+        <a:round/>
+      </a:ln>
+    </cs:spPr>
+  </cs:dropLine>
+  <cs:errorBar>
+    <cs:lnRef idx="0"/>
+    <cs:fillRef idx="0"/>
+    <cs:effectRef idx="0"/>
+    <cs:fontRef idx="minor">
+      <a:schemeClr val="tx1"/>
+    </cs:fontRef>
+    <cs:spPr>
+      <a:ln w="9525" cap="flat" cmpd="sng" algn="ctr">
+        <a:solidFill>
+          <a:schemeClr val="tx1">
+            <a:lumMod val="65000"/>
+            <a:lumOff val="35000"/>
+          </a:schemeClr>
+        </a:solidFill>
+        <a:round/>
+      </a:ln>
+    </cs:spPr>
+  </cs:errorBar>
+  <cs:floor>
+    <cs:lnRef idx="0"/>
+    <cs:fillRef idx="0"/>
+    <cs:effectRef idx="0"/>
+    <cs:fontRef idx="minor">
+      <a:schemeClr val="tx1"/>
+    </cs:fontRef>
+    <cs:spPr>
+      <a:noFill/>
+      <a:ln>
+        <a:noFill/>
+      </a:ln>
+    </cs:spPr>
+  </cs:floor>
+  <cs:gridlineMajor>
+    <cs:lnRef idx="0"/>
+    <cs:fillRef idx="0"/>
+    <cs:effectRef idx="0"/>
+    <cs:fontRef idx="minor">
+      <a:schemeClr val="tx1"/>
+    </cs:fontRef>
+    <cs:spPr>
+      <a:ln w="9525" cap="flat" cmpd="sng" algn="ctr">
+        <a:solidFill>
+          <a:schemeClr val="tx1">
+            <a:lumMod val="15000"/>
+            <a:lumOff val="85000"/>
+          </a:schemeClr>
+        </a:solidFill>
+        <a:round/>
+      </a:ln>
+    </cs:spPr>
+  </cs:gridlineMajor>
+  <cs:gridlineMinor>
+    <cs:lnRef idx="0"/>
+    <cs:fillRef idx="0"/>
+    <cs:effectRef idx="0"/>
+    <cs:fontRef idx="minor">
+      <a:schemeClr val="tx1"/>
+    </cs:fontRef>
+    <cs:spPr>
+      <a:ln w="9525" cap="flat" cmpd="sng" algn="ctr">
+        <a:solidFill>
+          <a:schemeClr val="tx1">
+            <a:lumMod val="5000"/>
+            <a:lumOff val="95000"/>
+          </a:schemeClr>
+        </a:solidFill>
+        <a:round/>
+      </a:ln>
+    </cs:spPr>
+  </cs:gridlineMinor>
+  <cs:hiLoLine>
+    <cs:lnRef idx="0"/>
+    <cs:fillRef idx="0"/>
+    <cs:effectRef idx="0"/>
+    <cs:fontRef idx="minor">
+      <a:schemeClr val="tx1"/>
+    </cs:fontRef>
+    <cs:spPr>
+      <a:ln w="9525" cap="flat" cmpd="sng" algn="ctr">
+        <a:solidFill>
+          <a:schemeClr val="tx1">
+            <a:lumMod val="50000"/>
+            <a:lumOff val="50000"/>
+          </a:schemeClr>
+        </a:solidFill>
+        <a:round/>
+      </a:ln>
+    </cs:spPr>
+  </cs:hiLoLine>
+  <cs:leaderLine>
+    <cs:lnRef idx="0"/>
+    <cs:fillRef idx="0"/>
+    <cs:effectRef idx="0"/>
+    <cs:fontRef idx="minor">
+      <a:schemeClr val="tx1"/>
+    </cs:fontRef>
+    <cs:spPr>
+      <a:ln w="9525" cap="flat" cmpd="sng" algn="ctr">
+        <a:solidFill>
+          <a:schemeClr val="tx1">
+            <a:lumMod val="35000"/>
+            <a:lumOff val="65000"/>
+          </a:schemeClr>
+        </a:solidFill>
+        <a:round/>
+      </a:ln>
+    </cs:spPr>
+  </cs:leaderLine>
+  <cs:legend>
+    <cs:lnRef idx="0"/>
+    <cs:fillRef idx="0"/>
+    <cs:effectRef idx="0"/>
+    <cs:fontRef idx="minor">
+      <a:schemeClr val="tx1">
+        <a:lumMod val="65000"/>
+        <a:lumOff val="35000"/>
+      </a:schemeClr>
+    </cs:fontRef>
+    <cs:defRPr sz="900" kern="1200"/>
+  </cs:legend>
+  <cs:plotArea mods="allowNoFillOverride allowNoLineOverride">
+    <cs:lnRef idx="0"/>
+    <cs:fillRef idx="0"/>
+    <cs:effectRef idx="0"/>
+    <cs:fontRef idx="minor">
+      <a:schemeClr val="tx1"/>
+    </cs:fontRef>
+  </cs:plotArea>
+  <cs:plotArea3D mods="allowNoFillOverride allowNoLineOverride">
+    <cs:lnRef idx="0"/>
+    <cs:fillRef idx="0"/>
+    <cs:effectRef idx="0"/>
+    <cs:fontRef idx="minor">
+      <a:schemeClr val="tx1"/>
+    </cs:fontRef>
+  </cs:plotArea3D>
+  <cs:seriesAxis>
+    <cs:lnRef idx="0"/>
+    <cs:fillRef idx="0"/>
+    <cs:effectRef idx="0"/>
+    <cs:fontRef idx="minor">
+      <a:schemeClr val="tx1">
+        <a:lumMod val="65000"/>
+        <a:lumOff val="35000"/>
+      </a:schemeClr>
+    </cs:fontRef>
+    <cs:defRPr sz="900" kern="1200"/>
+  </cs:seriesAxis>
+  <cs:seriesLine>
+    <cs:lnRef idx="0"/>
+    <cs:fillRef idx="0"/>
+    <cs:effectRef idx="0"/>
+    <cs:fontRef idx="minor">
+      <a:schemeClr val="tx1"/>
+    </cs:fontRef>
+    <cs:spPr>
+      <a:ln w="9525" cap="flat" cmpd="sng" algn="ctr">
+        <a:solidFill>
+          <a:schemeClr val="tx1">
+            <a:lumMod val="35000"/>
+            <a:lumOff val="65000"/>
+          </a:schemeClr>
+        </a:solidFill>
+        <a:round/>
+      </a:ln>
+    </cs:spPr>
+  </cs:seriesLine>
+  <cs:title>
+    <cs:lnRef idx="0"/>
+    <cs:fillRef idx="0"/>
+    <cs:effectRef idx="0"/>
+    <cs:fontRef idx="minor">
+      <a:schemeClr val="tx1">
+        <a:lumMod val="65000"/>
+        <a:lumOff val="35000"/>
+      </a:schemeClr>
+    </cs:fontRef>
+    <cs:defRPr sz="1400" b="0" kern="1200" spc="0" baseline="0"/>
+  </cs:title>
+  <cs:trendline>
+    <cs:lnRef idx="0">
+      <cs:styleClr val="auto"/>
+    </cs:lnRef>
+    <cs:fillRef idx="0"/>
+    <cs:effectRef idx="0"/>
+    <cs:fontRef idx="minor">
+      <a:schemeClr val="tx1"/>
+    </cs:fontRef>
+    <cs:spPr>
+      <a:ln w="19050" cap="rnd">
+        <a:solidFill>
+          <a:schemeClr val="phClr"/>
+        </a:solidFill>
+        <a:prstDash val="sysDot"/>
+      </a:ln>
+    </cs:spPr>
+  </cs:trendline>
+  <cs:trendlineLabel>
+    <cs:lnRef idx="0"/>
+    <cs:fillRef idx="0"/>
+    <cs:effectRef idx="0"/>
+    <cs:fontRef idx="minor">
+      <a:schemeClr val="tx1">
+        <a:lumMod val="65000"/>
+        <a:lumOff val="35000"/>
+      </a:schemeClr>
+    </cs:fontRef>
+    <cs:defRPr sz="900" kern="1200"/>
+  </cs:trendlineLabel>
+  <cs:upBar>
+    <cs:lnRef idx="0"/>
+    <cs:fillRef idx="0"/>
+    <cs:effectRef idx="0"/>
+    <cs:fontRef idx="minor">
+      <a:schemeClr val="tx1"/>
+    </cs:fontRef>
+    <cs:spPr>
+      <a:solidFill>
+        <a:schemeClr val="lt1"/>
+      </a:solidFill>
+      <a:ln w="9525" cap="flat" cmpd="sng" algn="ctr">
+        <a:solidFill>
+          <a:schemeClr val="tx1">
+            <a:lumMod val="65000"/>
+            <a:lumOff val="35000"/>
+          </a:schemeClr>
+        </a:solidFill>
+        <a:round/>
+      </a:ln>
+    </cs:spPr>
+  </cs:upBar>
+  <cs:valueAxis>
+    <cs:lnRef idx="0"/>
+    <cs:fillRef idx="0"/>
+    <cs:effectRef idx="0"/>
+    <cs:fontRef idx="minor">
+      <a:schemeClr val="tx1">
+        <a:lumMod val="65000"/>
+        <a:lumOff val="35000"/>
+      </a:schemeClr>
+    </cs:fontRef>
+    <cs:defRPr sz="900" kern="1200"/>
+  </cs:valueAxis>
+  <cs:wall>
+    <cs:lnRef idx="0"/>
+    <cs:fillRef idx="0"/>
+    <cs:effectRef idx="0"/>
+    <cs:fontRef idx="minor">
+      <a:schemeClr val="tx1"/>
+    </cs:fontRef>
+    <cs:spPr>
+      <a:noFill/>
+      <a:ln>
+        <a:noFill/>
+      </a:ln>
+    </cs:spPr>
+  </cs:wall>
+</cs:chartStyle>
+</file>
+
 <file path=ppt/notesMasters/notesMaster1.xml><?xml version="1.0" encoding="utf-8"?>
 <p:notesMaster xmlns:a="http://schemas.openxmlformats.org/drawingml/2006/main" xmlns:r="http://schemas.openxmlformats.org/officeDocument/2006/relationships" xmlns:p="http://schemas.openxmlformats.org/presentationml/2006/main">
   <p:cSld>
@@ -4662,7 +5636,7 @@
           <a:p>
             <a:fld id="{9C75A850-D01F-4609-A459-FE408FB5BF3B}" type="slidenum">
               <a:rPr lang="en-US" smtClean="0"/>
-              <a:t>5</a:t>
+              <a:t>4</a:t>
             </a:fld>
             <a:endParaRPr lang="en-US"/>
           </a:p>
@@ -8658,7 +9632,7 @@
           <a:p>
             <a:r>
               <a:rPr lang="en-US" b="1" dirty="0" smtClean="0"/>
-              <a:t>Insights Development</a:t>
+              <a:t>Tools for Analysis</a:t>
             </a:r>
             <a:endParaRPr lang="en-US" b="1" dirty="0"/>
           </a:p>
@@ -8676,116 +9650,134 @@
         </p:nvSpPr>
         <p:spPr/>
         <p:txBody>
-          <a:bodyPr/>
+          <a:bodyPr>
+            <a:normAutofit/>
+          </a:bodyPr>
           <a:lstStyle/>
           <a:p>
             <a:r>
-              <a:rPr lang="en-US" b="1" dirty="0" smtClean="0"/>
-              <a:t>How to develop insights? </a:t>
-            </a:r>
-          </a:p>
-          <a:p>
-            <a:r>
-              <a:rPr lang="en-US" b="1" dirty="0" smtClean="0"/>
-              <a:t>1. What are the business goals?</a:t>
-            </a:r>
-          </a:p>
-          <a:p>
-            <a:pPr marL="382588" lvl="1" indent="-211138">
+              <a:rPr lang="en-US" sz="2800" b="1" dirty="0" smtClean="0"/>
+              <a:t>EXCEL</a:t>
+            </a:r>
+          </a:p>
+          <a:p>
+            <a:pPr marL="400050" indent="-171450">
+              <a:spcBef>
+                <a:spcPts val="600"/>
+              </a:spcBef>
               <a:buFont typeface="Arial" panose="020B0604020202020204" pitchFamily="34" charset="0"/>
               <a:buChar char="•"/>
             </a:pPr>
             <a:r>
               <a:rPr lang="en-US" dirty="0" smtClean="0"/>
-              <a:t>Make money/Limit long wait times</a:t>
-            </a:r>
-          </a:p>
-          <a:p>
-            <a:pPr marL="201168" lvl="1" indent="0">
-              <a:buNone/>
-            </a:pPr>
-            <a:endParaRPr lang="en-US" sz="600" dirty="0" smtClean="0"/>
-          </a:p>
-          <a:p>
-            <a:pPr marL="57150" lvl="1" indent="0">
-              <a:buNone/>
-            </a:pPr>
-            <a:r>
-              <a:rPr lang="en-US" sz="2000" b="1" dirty="0" smtClean="0"/>
-              <a:t> 2. What is our metric of success or failure?</a:t>
-            </a:r>
-          </a:p>
-          <a:p>
-            <a:pPr marL="457200" lvl="1" indent="-285750">
+              <a:t>Pivot Tables</a:t>
+            </a:r>
+          </a:p>
+          <a:p>
+            <a:pPr marL="400050" indent="-171450">
+              <a:spcBef>
+                <a:spcPts val="600"/>
+              </a:spcBef>
               <a:buFont typeface="Arial" panose="020B0604020202020204" pitchFamily="34" charset="0"/>
               <a:buChar char="•"/>
             </a:pPr>
             <a:r>
-              <a:rPr lang="en-US" dirty="0"/>
-              <a:t>w</a:t>
-            </a:r>
-            <a:r>
               <a:rPr lang="en-US" dirty="0" smtClean="0"/>
-              <a:t>ait times</a:t>
-            </a:r>
-          </a:p>
-          <a:p>
-            <a:pPr marL="171450" lvl="1" indent="0">
-              <a:buNone/>
-            </a:pPr>
-            <a:endParaRPr lang="en-US" sz="200" dirty="0"/>
-          </a:p>
-          <a:p>
-            <a:pPr marL="114300" lvl="1" indent="0">
-              <a:buNone/>
-            </a:pPr>
-            <a:r>
-              <a:rPr lang="en-US" sz="2000" b="1" dirty="0" smtClean="0"/>
-              <a:t>3. What are the trends? (positive or negative)</a:t>
-            </a:r>
-          </a:p>
-          <a:p>
-            <a:pPr marL="457200" lvl="1" indent="-285750">
+              <a:t>IF conditional</a:t>
+            </a:r>
+          </a:p>
+          <a:p>
+            <a:pPr marL="400050" indent="-171450">
+              <a:spcBef>
+                <a:spcPts val="600"/>
+              </a:spcBef>
               <a:buFont typeface="Arial" panose="020B0604020202020204" pitchFamily="34" charset="0"/>
               <a:buChar char="•"/>
             </a:pPr>
             <a:r>
               <a:rPr lang="en-US" dirty="0" smtClean="0"/>
-              <a:t>Times of the day when wait times increase</a:t>
-            </a:r>
-          </a:p>
-          <a:p>
-            <a:pPr marL="457200" lvl="1" indent="-285750">
+              <a:t>Conditional Formatting</a:t>
+            </a:r>
+          </a:p>
+          <a:p>
+            <a:pPr marL="400050" indent="-171450">
+              <a:spcBef>
+                <a:spcPts val="600"/>
+              </a:spcBef>
               <a:buFont typeface="Arial" panose="020B0604020202020204" pitchFamily="34" charset="0"/>
               <a:buChar char="•"/>
             </a:pPr>
             <a:r>
               <a:rPr lang="en-US" dirty="0" smtClean="0"/>
-              <a:t>Days of week when wait times increase</a:t>
-            </a:r>
-          </a:p>
-          <a:p>
-            <a:pPr marL="171450" lvl="1" indent="0">
+              <a:t>Time conversions</a:t>
+            </a:r>
+          </a:p>
+          <a:p>
+            <a:pPr marL="400050" indent="-171450">
+              <a:spcBef>
+                <a:spcPts val="600"/>
+              </a:spcBef>
+              <a:buFont typeface="Arial" panose="020B0604020202020204" pitchFamily="34" charset="0"/>
+              <a:buChar char="•"/>
+            </a:pPr>
+            <a:r>
+              <a:rPr lang="en-US" dirty="0" smtClean="0"/>
+              <a:t>New Dimensions</a:t>
+            </a:r>
+          </a:p>
+          <a:p>
+            <a:pPr marL="400050" indent="-171450">
+              <a:spcBef>
+                <a:spcPts val="600"/>
+              </a:spcBef>
+              <a:buFont typeface="Arial" panose="020B0604020202020204" pitchFamily="34" charset="0"/>
+              <a:buChar char="•"/>
+            </a:pPr>
+            <a:r>
+              <a:rPr lang="en-US" dirty="0" smtClean="0"/>
+              <a:t>Functions: TEXT, DAYOFWEEK</a:t>
+            </a:r>
+          </a:p>
+          <a:p>
+            <a:pPr marL="228600" indent="0">
+              <a:spcBef>
+                <a:spcPts val="600"/>
+              </a:spcBef>
               <a:buNone/>
             </a:pPr>
-            <a:endParaRPr lang="en-US" sz="100" dirty="0" smtClean="0"/>
-          </a:p>
-          <a:p>
-            <a:pPr marL="114300" lvl="1" indent="0">
+            <a:endParaRPr lang="en-US" sz="100" dirty="0"/>
+          </a:p>
+          <a:p>
+            <a:pPr marL="57150" indent="0">
+              <a:spcBef>
+                <a:spcPts val="600"/>
+              </a:spcBef>
               <a:buNone/>
             </a:pPr>
             <a:r>
-              <a:rPr lang="en-US" sz="2000" b="1" dirty="0" smtClean="0"/>
-              <a:t>4. How can we fix the trends?</a:t>
-            </a:r>
-            <a:endParaRPr lang="en-US" sz="2000" dirty="0" smtClean="0"/>
+              <a:rPr lang="en-US" sz="2800" b="1" dirty="0" smtClean="0"/>
+              <a:t>Data Story (Beginning, Middle and End)</a:t>
+            </a:r>
+          </a:p>
+          <a:p>
+            <a:pPr marL="400050" indent="-171450">
+              <a:spcBef>
+                <a:spcPts val="600"/>
+              </a:spcBef>
+              <a:buFont typeface="Arial" panose="020B0604020202020204" pitchFamily="34" charset="0"/>
+              <a:buChar char="•"/>
+            </a:pPr>
+            <a:r>
+              <a:rPr lang="en-US" dirty="0" smtClean="0"/>
+              <a:t>Power Point</a:t>
+            </a:r>
           </a:p>
         </p:txBody>
       </p:sp>
     </p:spTree>
     <p:extLst>
       <p:ext uri="{BB962C8B-B14F-4D97-AF65-F5344CB8AC3E}">
-        <p14:creationId xmlns:p14="http://schemas.microsoft.com/office/powerpoint/2010/main" val="2941660429"/>
+        <p14:creationId xmlns:p14="http://schemas.microsoft.com/office/powerpoint/2010/main" val="3044716093"/>
       </p:ext>
     </p:extLst>
   </p:cSld>
@@ -8824,157 +9816,111 @@
         </p:nvSpPr>
         <p:spPr/>
         <p:txBody>
-          <a:bodyPr/>
-          <a:lstStyle/>
-          <a:p>
-            <a:r>
-              <a:rPr lang="en-US" b="1" dirty="0" smtClean="0"/>
-              <a:t>Tools for Analysis</a:t>
-            </a:r>
-            <a:endParaRPr lang="en-US" b="1" dirty="0"/>
-          </a:p>
-        </p:txBody>
-      </p:sp>
-      <p:sp>
-        <p:nvSpPr>
-          <p:cNvPr id="3" name="Content Placeholder 2"/>
-          <p:cNvSpPr>
-            <a:spLocks noGrp="1"/>
-          </p:cNvSpPr>
-          <p:nvPr>
-            <p:ph idx="1"/>
-          </p:nvPr>
-        </p:nvSpPr>
-        <p:spPr/>
-        <p:txBody>
           <a:bodyPr>
             <a:normAutofit/>
           </a:bodyPr>
           <a:lstStyle/>
           <a:p>
             <a:r>
-              <a:rPr lang="en-US" sz="2800" b="1" dirty="0" smtClean="0"/>
-              <a:t>EXCEL</a:t>
-            </a:r>
-          </a:p>
-          <a:p>
-            <a:pPr marL="400050" indent="-171450">
-              <a:spcBef>
-                <a:spcPts val="600"/>
-              </a:spcBef>
-              <a:buFont typeface="Arial" panose="020B0604020202020204" pitchFamily="34" charset="0"/>
-              <a:buChar char="•"/>
-            </a:pPr>
-            <a:r>
-              <a:rPr lang="en-US" dirty="0" smtClean="0"/>
-              <a:t>Pivot Tables</a:t>
-            </a:r>
-          </a:p>
-          <a:p>
-            <a:pPr marL="400050" indent="-171450">
-              <a:spcBef>
-                <a:spcPts val="600"/>
-              </a:spcBef>
-              <a:buFont typeface="Arial" panose="020B0604020202020204" pitchFamily="34" charset="0"/>
-              <a:buChar char="•"/>
-            </a:pPr>
-            <a:r>
-              <a:rPr lang="en-US" dirty="0" smtClean="0"/>
-              <a:t>IF conditional</a:t>
-            </a:r>
-          </a:p>
-          <a:p>
-            <a:pPr marL="400050" indent="-171450">
-              <a:spcBef>
-                <a:spcPts val="600"/>
-              </a:spcBef>
-              <a:buFont typeface="Arial" panose="020B0604020202020204" pitchFamily="34" charset="0"/>
-              <a:buChar char="•"/>
-            </a:pPr>
-            <a:r>
-              <a:rPr lang="en-US" dirty="0" smtClean="0"/>
-              <a:t>Conditional Formatting</a:t>
-            </a:r>
-          </a:p>
-          <a:p>
-            <a:pPr marL="400050" indent="-171450">
-              <a:spcBef>
-                <a:spcPts val="600"/>
-              </a:spcBef>
-              <a:buFont typeface="Arial" panose="020B0604020202020204" pitchFamily="34" charset="0"/>
-              <a:buChar char="•"/>
-            </a:pPr>
-            <a:r>
-              <a:rPr lang="en-US" dirty="0" smtClean="0"/>
-              <a:t>Time conversions</a:t>
-            </a:r>
-          </a:p>
-          <a:p>
-            <a:pPr marL="400050" indent="-171450">
-              <a:spcBef>
-                <a:spcPts val="600"/>
-              </a:spcBef>
-              <a:buFont typeface="Arial" panose="020B0604020202020204" pitchFamily="34" charset="0"/>
-              <a:buChar char="•"/>
-            </a:pPr>
-            <a:r>
-              <a:rPr lang="en-US" dirty="0" smtClean="0"/>
-              <a:t>New Dimensions</a:t>
-            </a:r>
-          </a:p>
-          <a:p>
-            <a:pPr marL="400050" indent="-171450">
-              <a:spcBef>
-                <a:spcPts val="600"/>
-              </a:spcBef>
-              <a:buFont typeface="Arial" panose="020B0604020202020204" pitchFamily="34" charset="0"/>
-              <a:buChar char="•"/>
-            </a:pPr>
-            <a:r>
-              <a:rPr lang="en-US" dirty="0" smtClean="0"/>
-              <a:t>Functions: TEXT, DAYOFWEEK</a:t>
-            </a:r>
-          </a:p>
-          <a:p>
-            <a:pPr marL="228600" indent="0">
-              <a:spcBef>
-                <a:spcPts val="600"/>
-              </a:spcBef>
-              <a:buNone/>
-            </a:pPr>
-            <a:endParaRPr lang="en-US" sz="100" dirty="0"/>
-          </a:p>
-          <a:p>
-            <a:pPr marL="57150" indent="0">
-              <a:spcBef>
-                <a:spcPts val="600"/>
-              </a:spcBef>
-              <a:buNone/>
-            </a:pPr>
-            <a:r>
-              <a:rPr lang="en-US" sz="2800" b="1" dirty="0" smtClean="0"/>
-              <a:t>Data Story (Beginning, Middle and End)</a:t>
-            </a:r>
-          </a:p>
-          <a:p>
-            <a:pPr marL="400050" indent="-171450">
-              <a:spcBef>
-                <a:spcPts val="600"/>
-              </a:spcBef>
-              <a:buFont typeface="Arial" panose="020B0604020202020204" pitchFamily="34" charset="0"/>
-              <a:buChar char="•"/>
-            </a:pPr>
-            <a:r>
-              <a:rPr lang="en-US" dirty="0" smtClean="0"/>
-              <a:t>Power Point</a:t>
-            </a:r>
+              <a:rPr lang="en-US" sz="4000" b="1" dirty="0" smtClean="0"/>
+              <a:t>Who is waiting the </a:t>
+            </a:r>
+            <a:r>
+              <a:rPr lang="en-US" sz="4000" b="1" dirty="0" smtClean="0"/>
+              <a:t>Longest?</a:t>
+            </a:r>
+            <a:endParaRPr lang="en-US" sz="4000" b="1" dirty="0"/>
+          </a:p>
+        </p:txBody>
+      </p:sp>
+      <p:graphicFrame>
+        <p:nvGraphicFramePr>
+          <p:cNvPr id="7" name="Content Placeholder 6"/>
+          <p:cNvGraphicFramePr>
+            <a:graphicFrameLocks noGrp="1"/>
+          </p:cNvGraphicFramePr>
+          <p:nvPr>
+            <p:ph idx="1"/>
+            <p:extLst>
+              <p:ext uri="{D42A27DB-BD31-4B8C-83A1-F6EECF244321}">
+                <p14:modId xmlns:p14="http://schemas.microsoft.com/office/powerpoint/2010/main" val="17225122"/>
+              </p:ext>
+            </p:extLst>
+          </p:nvPr>
+        </p:nvGraphicFramePr>
+        <p:xfrm>
+          <a:off x="1304450" y="1810544"/>
+          <a:ext cx="5389244" cy="4147344"/>
+        </p:xfrm>
+        <a:graphic>
+          <a:graphicData uri="http://schemas.openxmlformats.org/drawingml/2006/chart">
+            <c:chart xmlns:c="http://schemas.openxmlformats.org/drawingml/2006/chart" xmlns:r="http://schemas.openxmlformats.org/officeDocument/2006/relationships" r:id="rId2"/>
+          </a:graphicData>
+        </a:graphic>
+      </p:graphicFrame>
+      <p:sp>
+        <p:nvSpPr>
+          <p:cNvPr id="8" name="TextBox 7"/>
+          <p:cNvSpPr txBox="1"/>
+          <p:nvPr/>
+        </p:nvSpPr>
+        <p:spPr>
+          <a:xfrm>
+            <a:off x="7458074" y="2357437"/>
+            <a:ext cx="3028951" cy="2800767"/>
+          </a:xfrm>
+          <a:prstGeom prst="rect">
+            <a:avLst/>
+          </a:prstGeom>
+          <a:noFill/>
+          <a:ln w="38100">
+            <a:solidFill>
+              <a:srgbClr val="EF9D39"/>
+            </a:solidFill>
+          </a:ln>
+        </p:spPr>
+        <p:txBody>
+          <a:bodyPr wrap="square" rtlCol="0">
+            <a:spAutoFit/>
+          </a:bodyPr>
+          <a:lstStyle/>
+          <a:p>
+            <a:r>
+              <a:rPr lang="en-US" sz="3200" b="1" dirty="0" smtClean="0">
+                <a:solidFill>
+                  <a:srgbClr val="3A5E92"/>
+                </a:solidFill>
+              </a:rPr>
+              <a:t>Financial Class</a:t>
+            </a:r>
+          </a:p>
+          <a:p>
+            <a:endParaRPr lang="en-US" sz="1400" b="1" dirty="0" smtClean="0">
+              <a:solidFill>
+                <a:srgbClr val="38688C"/>
+              </a:solidFill>
+            </a:endParaRPr>
+          </a:p>
+          <a:p>
+            <a:r>
+              <a:rPr lang="en-US" sz="1600" dirty="0" smtClean="0"/>
+              <a:t>From the analysis, Financial Class does not significantly change the  wait times. Although it seems Medicare takes the longest time to process. We do not have enough patients to conclude that this is a major factor.</a:t>
+            </a:r>
+            <a:endParaRPr lang="en-US" sz="1600" b="1" dirty="0"/>
+          </a:p>
+          <a:p>
+            <a:endParaRPr lang="en-US" b="1" dirty="0">
+              <a:solidFill>
+                <a:srgbClr val="38688C"/>
+              </a:solidFill>
+            </a:endParaRPr>
           </a:p>
         </p:txBody>
       </p:sp>
     </p:spTree>
     <p:extLst>
       <p:ext uri="{BB962C8B-B14F-4D97-AF65-F5344CB8AC3E}">
-        <p14:creationId xmlns:p14="http://schemas.microsoft.com/office/powerpoint/2010/main" val="3044716093"/>
+        <p14:creationId xmlns:p14="http://schemas.microsoft.com/office/powerpoint/2010/main" val="2660886464"/>
       </p:ext>
     </p:extLst>
   </p:cSld>
@@ -9020,141 +9966,11 @@
           <a:p>
             <a:r>
               <a:rPr lang="en-US" sz="4000" b="1" dirty="0" smtClean="0"/>
-              <a:t>Who is waiting the Longest</a:t>
-            </a:r>
-            <a:endParaRPr lang="en-US" sz="4000" b="1" dirty="0"/>
-          </a:p>
-        </p:txBody>
-      </p:sp>
-      <p:graphicFrame>
-        <p:nvGraphicFramePr>
-          <p:cNvPr id="7" name="Content Placeholder 6"/>
-          <p:cNvGraphicFramePr>
-            <a:graphicFrameLocks noGrp="1"/>
-          </p:cNvGraphicFramePr>
-          <p:nvPr>
-            <p:ph idx="1"/>
-            <p:extLst>
-              <p:ext uri="{D42A27DB-BD31-4B8C-83A1-F6EECF244321}">
-                <p14:modId xmlns:p14="http://schemas.microsoft.com/office/powerpoint/2010/main" val="17225122"/>
-              </p:ext>
-            </p:extLst>
-          </p:nvPr>
-        </p:nvGraphicFramePr>
-        <p:xfrm>
-          <a:off x="1304450" y="1810544"/>
-          <a:ext cx="5389244" cy="4147344"/>
-        </p:xfrm>
-        <a:graphic>
-          <a:graphicData uri="http://schemas.openxmlformats.org/drawingml/2006/chart">
-            <c:chart xmlns:c="http://schemas.openxmlformats.org/drawingml/2006/chart" xmlns:r="http://schemas.openxmlformats.org/officeDocument/2006/relationships" r:id="rId2"/>
-          </a:graphicData>
-        </a:graphic>
-      </p:graphicFrame>
-      <p:sp>
-        <p:nvSpPr>
-          <p:cNvPr id="8" name="TextBox 7"/>
-          <p:cNvSpPr txBox="1"/>
-          <p:nvPr/>
-        </p:nvSpPr>
-        <p:spPr>
-          <a:xfrm>
-            <a:off x="7458074" y="2357437"/>
-            <a:ext cx="3028951" cy="2800767"/>
-          </a:xfrm>
-          <a:prstGeom prst="rect">
-            <a:avLst/>
-          </a:prstGeom>
-          <a:noFill/>
-        </p:spPr>
-        <p:txBody>
-          <a:bodyPr wrap="square" rtlCol="0">
-            <a:spAutoFit/>
-          </a:bodyPr>
-          <a:lstStyle/>
-          <a:p>
-            <a:r>
-              <a:rPr lang="en-US" sz="3200" b="1" dirty="0" smtClean="0">
-                <a:solidFill>
-                  <a:srgbClr val="3A5E92"/>
-                </a:solidFill>
-              </a:rPr>
-              <a:t>Financial Class</a:t>
-            </a:r>
-          </a:p>
-          <a:p>
-            <a:endParaRPr lang="en-US" sz="1400" b="1" dirty="0" smtClean="0">
-              <a:solidFill>
-                <a:srgbClr val="38688C"/>
-              </a:solidFill>
-            </a:endParaRPr>
-          </a:p>
-          <a:p>
-            <a:r>
-              <a:rPr lang="en-US" sz="1600" dirty="0" smtClean="0"/>
-              <a:t>From the analysis, Financial Class does not significantly change the  wait times. Although it seems Medicare takes the longest time to process. We do not have enough patients to conclude that this is a major factor.</a:t>
-            </a:r>
-            <a:endParaRPr lang="en-US" sz="1600" b="1" dirty="0"/>
-          </a:p>
-          <a:p>
-            <a:endParaRPr lang="en-US" b="1" dirty="0">
-              <a:solidFill>
-                <a:srgbClr val="38688C"/>
-              </a:solidFill>
-            </a:endParaRPr>
-          </a:p>
-        </p:txBody>
-      </p:sp>
-    </p:spTree>
-    <p:extLst>
-      <p:ext uri="{BB962C8B-B14F-4D97-AF65-F5344CB8AC3E}">
-        <p14:creationId xmlns:p14="http://schemas.microsoft.com/office/powerpoint/2010/main" val="2660886464"/>
-      </p:ext>
-    </p:extLst>
-  </p:cSld>
-  <p:clrMapOvr>
-    <a:masterClrMapping/>
-  </p:clrMapOvr>
-</p:sld>
-</file>
-
-<file path=ppt/slides/slide5.xml><?xml version="1.0" encoding="utf-8"?>
-<p:sld xmlns:a="http://schemas.openxmlformats.org/drawingml/2006/main" xmlns:r="http://schemas.openxmlformats.org/officeDocument/2006/relationships" xmlns:p="http://schemas.openxmlformats.org/presentationml/2006/main">
-  <p:cSld>
-    <p:spTree>
-      <p:nvGrpSpPr>
-        <p:cNvPr id="1" name=""/>
-        <p:cNvGrpSpPr/>
-        <p:nvPr/>
-      </p:nvGrpSpPr>
-      <p:grpSpPr>
-        <a:xfrm>
-          <a:off x="0" y="0"/>
-          <a:ext cx="0" cy="0"/>
-          <a:chOff x="0" y="0"/>
-          <a:chExt cx="0" cy="0"/>
-        </a:xfrm>
-      </p:grpSpPr>
-      <p:sp>
-        <p:nvSpPr>
-          <p:cNvPr id="2" name="Title 1"/>
-          <p:cNvSpPr>
-            <a:spLocks noGrp="1"/>
-          </p:cNvSpPr>
-          <p:nvPr>
-            <p:ph type="title"/>
-          </p:nvPr>
-        </p:nvSpPr>
-        <p:spPr/>
-        <p:txBody>
-          <a:bodyPr>
-            <a:normAutofit/>
-          </a:bodyPr>
-          <a:lstStyle/>
-          <a:p>
+              <a:t>What Days of Week are </a:t>
+            </a:r>
             <a:r>
               <a:rPr lang="en-US" sz="4000" b="1" dirty="0" smtClean="0"/>
-              <a:t>What Days of Week are Affected</a:t>
+              <a:t>Affected?</a:t>
             </a:r>
             <a:endParaRPr lang="en-US" sz="4000" b="1" dirty="0"/>
           </a:p>
@@ -9223,7 +10039,7 @@
 </p:sld>
 </file>
 
-<file path=ppt/slides/slide6.xml><?xml version="1.0" encoding="utf-8"?>
+<file path=ppt/slides/slide5.xml><?xml version="1.0" encoding="utf-8"?>
 <p:sld xmlns:a="http://schemas.openxmlformats.org/drawingml/2006/main" xmlns:r="http://schemas.openxmlformats.org/officeDocument/2006/relationships" xmlns:p="http://schemas.openxmlformats.org/presentationml/2006/main">
   <p:cSld>
     <p:spTree>
@@ -9305,6 +10121,11 @@
             <a:avLst/>
           </a:prstGeom>
           <a:noFill/>
+          <a:ln w="38100">
+            <a:solidFill>
+              <a:srgbClr val="EF9D39"/>
+            </a:solidFill>
+          </a:ln>
         </p:spPr>
         <p:txBody>
           <a:bodyPr wrap="square" rtlCol="0">
@@ -9353,6 +10174,333 @@
     <p:extLst>
       <p:ext uri="{BB962C8B-B14F-4D97-AF65-F5344CB8AC3E}">
         <p14:creationId xmlns:p14="http://schemas.microsoft.com/office/powerpoint/2010/main" val="2233246546"/>
+      </p:ext>
+    </p:extLst>
+  </p:cSld>
+  <p:clrMapOvr>
+    <a:masterClrMapping/>
+  </p:clrMapOvr>
+</p:sld>
+</file>
+
+<file path=ppt/slides/slide6.xml><?xml version="1.0" encoding="utf-8"?>
+<p:sld xmlns:a="http://schemas.openxmlformats.org/drawingml/2006/main" xmlns:r="http://schemas.openxmlformats.org/officeDocument/2006/relationships" xmlns:p="http://schemas.openxmlformats.org/presentationml/2006/main">
+  <p:cSld>
+    <p:spTree>
+      <p:nvGrpSpPr>
+        <p:cNvPr id="1" name=""/>
+        <p:cNvGrpSpPr/>
+        <p:nvPr/>
+      </p:nvGrpSpPr>
+      <p:grpSpPr>
+        <a:xfrm>
+          <a:off x="0" y="0"/>
+          <a:ext cx="0" cy="0"/>
+          <a:chOff x="0" y="0"/>
+          <a:chExt cx="0" cy="0"/>
+        </a:xfrm>
+      </p:grpSpPr>
+      <p:sp>
+        <p:nvSpPr>
+          <p:cNvPr id="2" name="Title 1"/>
+          <p:cNvSpPr>
+            <a:spLocks noGrp="1"/>
+          </p:cNvSpPr>
+          <p:nvPr>
+            <p:ph type="title"/>
+          </p:nvPr>
+        </p:nvSpPr>
+        <p:spPr/>
+        <p:txBody>
+          <a:bodyPr/>
+          <a:lstStyle/>
+          <a:p>
+            <a:r>
+              <a:rPr lang="en-US" b="1" dirty="0" smtClean="0"/>
+              <a:t>Where do We Need Staff?</a:t>
+            </a:r>
+            <a:endParaRPr lang="en-US" b="1" dirty="0"/>
+          </a:p>
+        </p:txBody>
+      </p:sp>
+      <p:graphicFrame>
+        <p:nvGraphicFramePr>
+          <p:cNvPr id="4" name="Content Placeholder 3"/>
+          <p:cNvGraphicFramePr>
+            <a:graphicFrameLocks noGrp="1"/>
+          </p:cNvGraphicFramePr>
+          <p:nvPr>
+            <p:ph idx="1"/>
+            <p:extLst>
+              <p:ext uri="{D42A27DB-BD31-4B8C-83A1-F6EECF244321}">
+                <p14:modId xmlns:p14="http://schemas.microsoft.com/office/powerpoint/2010/main" val="4254831626"/>
+              </p:ext>
+            </p:extLst>
+          </p:nvPr>
+        </p:nvGraphicFramePr>
+        <p:xfrm>
+          <a:off x="4907756" y="1846263"/>
+          <a:ext cx="6247606" cy="4022725"/>
+        </p:xfrm>
+        <a:graphic>
+          <a:graphicData uri="http://schemas.openxmlformats.org/drawingml/2006/chart">
+            <c:chart xmlns:c="http://schemas.openxmlformats.org/drawingml/2006/chart" xmlns:r="http://schemas.openxmlformats.org/officeDocument/2006/relationships" r:id="rId2"/>
+          </a:graphicData>
+        </a:graphic>
+      </p:graphicFrame>
+      <p:sp>
+        <p:nvSpPr>
+          <p:cNvPr id="5" name="TextBox 4"/>
+          <p:cNvSpPr txBox="1"/>
+          <p:nvPr/>
+        </p:nvSpPr>
+        <p:spPr>
+          <a:xfrm>
+            <a:off x="1278732" y="2624935"/>
+            <a:ext cx="3707605" cy="2369880"/>
+          </a:xfrm>
+          <a:prstGeom prst="rect">
+            <a:avLst/>
+          </a:prstGeom>
+          <a:noFill/>
+          <a:ln w="57150">
+            <a:solidFill>
+              <a:srgbClr val="EF9D39"/>
+            </a:solidFill>
+          </a:ln>
+        </p:spPr>
+        <p:txBody>
+          <a:bodyPr wrap="square" rtlCol="0">
+            <a:spAutoFit/>
+          </a:bodyPr>
+          <a:lstStyle/>
+          <a:p>
+            <a:r>
+              <a:rPr lang="en-US" sz="3600" b="1" dirty="0" smtClean="0">
+                <a:solidFill>
+                  <a:srgbClr val="3A5E92"/>
+                </a:solidFill>
+              </a:rPr>
+              <a:t>Staff Breakdown:</a:t>
+            </a:r>
+            <a:endParaRPr lang="en-US" sz="3600" b="1" dirty="0">
+              <a:solidFill>
+                <a:srgbClr val="3A5E92"/>
+              </a:solidFill>
+            </a:endParaRPr>
+          </a:p>
+          <a:p>
+            <a:endParaRPr lang="en-US" sz="400" b="1" dirty="0">
+              <a:solidFill>
+                <a:srgbClr val="38688C"/>
+              </a:solidFill>
+            </a:endParaRPr>
+          </a:p>
+          <a:p>
+            <a:r>
+              <a:rPr lang="en-US" dirty="0" smtClean="0"/>
+              <a:t>We should focus our efforts on the medical staff because we are assuming the time to wait to see the doctor is limited by the number of doctors.</a:t>
+            </a:r>
+            <a:endParaRPr lang="en-US" b="1" dirty="0"/>
+          </a:p>
+          <a:p>
+            <a:endParaRPr lang="en-US" dirty="0"/>
+          </a:p>
+        </p:txBody>
+      </p:sp>
+    </p:spTree>
+    <p:extLst>
+      <p:ext uri="{BB962C8B-B14F-4D97-AF65-F5344CB8AC3E}">
+        <p14:creationId xmlns:p14="http://schemas.microsoft.com/office/powerpoint/2010/main" val="2115488971"/>
+      </p:ext>
+    </p:extLst>
+  </p:cSld>
+  <p:clrMapOvr>
+    <a:masterClrMapping/>
+  </p:clrMapOvr>
+</p:sld>
+</file>
+
+<file path=ppt/slides/slide7.xml><?xml version="1.0" encoding="utf-8"?>
+<p:sld xmlns:a="http://schemas.openxmlformats.org/drawingml/2006/main" xmlns:r="http://schemas.openxmlformats.org/officeDocument/2006/relationships" xmlns:p="http://schemas.openxmlformats.org/presentationml/2006/main">
+  <p:cSld>
+    <p:spTree>
+      <p:nvGrpSpPr>
+        <p:cNvPr id="1" name=""/>
+        <p:cNvGrpSpPr/>
+        <p:nvPr/>
+      </p:nvGrpSpPr>
+      <p:grpSpPr>
+        <a:xfrm>
+          <a:off x="0" y="0"/>
+          <a:ext cx="0" cy="0"/>
+          <a:chOff x="0" y="0"/>
+          <a:chExt cx="0" cy="0"/>
+        </a:xfrm>
+      </p:grpSpPr>
+      <p:sp>
+        <p:nvSpPr>
+          <p:cNvPr id="2" name="Title 1"/>
+          <p:cNvSpPr>
+            <a:spLocks noGrp="1"/>
+          </p:cNvSpPr>
+          <p:nvPr>
+            <p:ph type="title"/>
+          </p:nvPr>
+        </p:nvSpPr>
+        <p:spPr/>
+        <p:txBody>
+          <a:bodyPr/>
+          <a:lstStyle/>
+          <a:p>
+            <a:r>
+              <a:rPr lang="en-US" b="1" dirty="0" smtClean="0"/>
+              <a:t>Tools for Analysis</a:t>
+            </a:r>
+            <a:endParaRPr lang="en-US" b="1" dirty="0"/>
+          </a:p>
+        </p:txBody>
+      </p:sp>
+      <p:sp>
+        <p:nvSpPr>
+          <p:cNvPr id="3" name="Content Placeholder 2"/>
+          <p:cNvSpPr>
+            <a:spLocks noGrp="1"/>
+          </p:cNvSpPr>
+          <p:nvPr>
+            <p:ph idx="1"/>
+          </p:nvPr>
+        </p:nvSpPr>
+        <p:spPr/>
+        <p:txBody>
+          <a:bodyPr>
+            <a:normAutofit/>
+          </a:bodyPr>
+          <a:lstStyle/>
+          <a:p>
+            <a:r>
+              <a:rPr lang="en-US" sz="2800" b="1" dirty="0" smtClean="0"/>
+              <a:t>EXCEL</a:t>
+            </a:r>
+          </a:p>
+          <a:p>
+            <a:pPr marL="400050" indent="-171450">
+              <a:spcBef>
+                <a:spcPts val="600"/>
+              </a:spcBef>
+              <a:buFont typeface="Arial" panose="020B0604020202020204" pitchFamily="34" charset="0"/>
+              <a:buChar char="•"/>
+            </a:pPr>
+            <a:r>
+              <a:rPr lang="en-US" dirty="0" smtClean="0"/>
+              <a:t>Pivot Tables</a:t>
+            </a:r>
+          </a:p>
+          <a:p>
+            <a:pPr marL="400050" indent="-171450">
+              <a:spcBef>
+                <a:spcPts val="600"/>
+              </a:spcBef>
+              <a:buFont typeface="Arial" panose="020B0604020202020204" pitchFamily="34" charset="0"/>
+              <a:buChar char="•"/>
+            </a:pPr>
+            <a:r>
+              <a:rPr lang="en-US" dirty="0" smtClean="0"/>
+              <a:t>IF conditional</a:t>
+            </a:r>
+          </a:p>
+          <a:p>
+            <a:pPr marL="400050" indent="-171450">
+              <a:spcBef>
+                <a:spcPts val="600"/>
+              </a:spcBef>
+              <a:buFont typeface="Arial" panose="020B0604020202020204" pitchFamily="34" charset="0"/>
+              <a:buChar char="•"/>
+            </a:pPr>
+            <a:r>
+              <a:rPr lang="en-US" dirty="0" smtClean="0"/>
+              <a:t>Conditional Formatting</a:t>
+            </a:r>
+          </a:p>
+          <a:p>
+            <a:pPr marL="400050" indent="-171450">
+              <a:spcBef>
+                <a:spcPts val="600"/>
+              </a:spcBef>
+              <a:buFont typeface="Arial" panose="020B0604020202020204" pitchFamily="34" charset="0"/>
+              <a:buChar char="•"/>
+            </a:pPr>
+            <a:r>
+              <a:rPr lang="en-US" dirty="0" smtClean="0"/>
+              <a:t>Time conversions</a:t>
+            </a:r>
+          </a:p>
+          <a:p>
+            <a:pPr marL="400050" indent="-171450">
+              <a:spcBef>
+                <a:spcPts val="600"/>
+              </a:spcBef>
+              <a:buFont typeface="Arial" panose="020B0604020202020204" pitchFamily="34" charset="0"/>
+              <a:buChar char="•"/>
+            </a:pPr>
+            <a:r>
+              <a:rPr lang="en-US" dirty="0" smtClean="0"/>
+              <a:t>New Dimensions</a:t>
+            </a:r>
+          </a:p>
+          <a:p>
+            <a:pPr marL="400050" indent="-171450">
+              <a:spcBef>
+                <a:spcPts val="600"/>
+              </a:spcBef>
+              <a:buFont typeface="Arial" panose="020B0604020202020204" pitchFamily="34" charset="0"/>
+              <a:buChar char="•"/>
+            </a:pPr>
+            <a:r>
+              <a:rPr lang="en-US" dirty="0" smtClean="0"/>
+              <a:t>Functions: TEXT, DAYOFWEEK</a:t>
+            </a:r>
+          </a:p>
+          <a:p>
+            <a:pPr marL="228600" indent="0">
+              <a:spcBef>
+                <a:spcPts val="600"/>
+              </a:spcBef>
+              <a:buNone/>
+            </a:pPr>
+            <a:endParaRPr lang="en-US" sz="100" dirty="0"/>
+          </a:p>
+          <a:p>
+            <a:pPr marL="57150" indent="0">
+              <a:spcBef>
+                <a:spcPts val="600"/>
+              </a:spcBef>
+              <a:buNone/>
+            </a:pPr>
+            <a:r>
+              <a:rPr lang="en-US" sz="2800" b="1" dirty="0" smtClean="0"/>
+              <a:t>Data Story (Beginning, Middle and End)</a:t>
+            </a:r>
+          </a:p>
+          <a:p>
+            <a:pPr marL="400050" indent="-171450">
+              <a:spcBef>
+                <a:spcPts val="600"/>
+              </a:spcBef>
+              <a:buFont typeface="Arial" panose="020B0604020202020204" pitchFamily="34" charset="0"/>
+              <a:buChar char="•"/>
+            </a:pPr>
+            <a:r>
+              <a:rPr lang="en-US" dirty="0" smtClean="0"/>
+              <a:t>Power Point</a:t>
+            </a:r>
+          </a:p>
+        </p:txBody>
+      </p:sp>
+    </p:spTree>
+    <p:extLst>
+      <p:ext uri="{BB962C8B-B14F-4D97-AF65-F5344CB8AC3E}">
+        <p14:creationId xmlns:p14="http://schemas.microsoft.com/office/powerpoint/2010/main" val="3183246179"/>
       </p:ext>
     </p:extLst>
   </p:cSld>
@@ -10762,4 +11910,290 @@
     </a:bgFillStyleLst>
   </a:fmtScheme>
 </a:themeOverride>
+</file>
+
+<file path=ppt/theme/themeOverride4.xml><?xml version="1.0" encoding="utf-8"?>
+<a:themeOverride xmlns:a="http://schemas.openxmlformats.org/drawingml/2006/main">
+  <a:clrScheme name="Office">
+    <a:dk1>
+      <a:sysClr val="windowText" lastClr="000000"/>
+    </a:dk1>
+    <a:lt1>
+      <a:sysClr val="window" lastClr="FFFFFF"/>
+    </a:lt1>
+    <a:dk2>
+      <a:srgbClr val="44546A"/>
+    </a:dk2>
+    <a:lt2>
+      <a:srgbClr val="E7E6E6"/>
+    </a:lt2>
+    <a:accent1>
+      <a:srgbClr val="4472C4"/>
+    </a:accent1>
+    <a:accent2>
+      <a:srgbClr val="ED7D31"/>
+    </a:accent2>
+    <a:accent3>
+      <a:srgbClr val="A5A5A5"/>
+    </a:accent3>
+    <a:accent4>
+      <a:srgbClr val="FFC000"/>
+    </a:accent4>
+    <a:accent5>
+      <a:srgbClr val="5B9BD5"/>
+    </a:accent5>
+    <a:accent6>
+      <a:srgbClr val="70AD47"/>
+    </a:accent6>
+    <a:hlink>
+      <a:srgbClr val="0563C1"/>
+    </a:hlink>
+    <a:folHlink>
+      <a:srgbClr val="954F72"/>
+    </a:folHlink>
+  </a:clrScheme>
+  <a:fontScheme name="Office">
+    <a:majorFont>
+      <a:latin typeface="Calibri Light" panose="020F0302020204030204"/>
+      <a:ea typeface=""/>
+      <a:cs typeface=""/>
+      <a:font script="Jpan" typeface="游ゴシック Light"/>
+      <a:font script="Hang" typeface="맑은 고딕"/>
+      <a:font script="Hans" typeface="等线 Light"/>
+      <a:font script="Hant" typeface="新細明體"/>
+      <a:font script="Arab" typeface="Times New Roman"/>
+      <a:font script="Hebr" typeface="Times New Roman"/>
+      <a:font script="Thai" typeface="Tahoma"/>
+      <a:font script="Ethi" typeface="Nyala"/>
+      <a:font script="Beng" typeface="Vrinda"/>
+      <a:font script="Gujr" typeface="Shruti"/>
+      <a:font script="Khmr" typeface="MoolBoran"/>
+      <a:font script="Knda" typeface="Tunga"/>
+      <a:font script="Guru" typeface="Raavi"/>
+      <a:font script="Cans" typeface="Euphemia"/>
+      <a:font script="Cher" typeface="Plantagenet Cherokee"/>
+      <a:font script="Yiii" typeface="Microsoft Yi Baiti"/>
+      <a:font script="Tibt" typeface="Microsoft Himalaya"/>
+      <a:font script="Thaa" typeface="MV Boli"/>
+      <a:font script="Deva" typeface="Mangal"/>
+      <a:font script="Telu" typeface="Gautami"/>
+      <a:font script="Taml" typeface="Latha"/>
+      <a:font script="Syrc" typeface="Estrangelo Edessa"/>
+      <a:font script="Orya" typeface="Kalinga"/>
+      <a:font script="Mlym" typeface="Kartika"/>
+      <a:font script="Laoo" typeface="DokChampa"/>
+      <a:font script="Sinh" typeface="Iskoola Pota"/>
+      <a:font script="Mong" typeface="Mongolian Baiti"/>
+      <a:font script="Viet" typeface="Times New Roman"/>
+      <a:font script="Uigh" typeface="Microsoft Uighur"/>
+      <a:font script="Geor" typeface="Sylfaen"/>
+      <a:font script="Armn" typeface="Arial"/>
+      <a:font script="Bugi" typeface="Leelawadee UI"/>
+      <a:font script="Bopo" typeface="Microsoft JhengHei"/>
+      <a:font script="Java" typeface="Javanese Text"/>
+      <a:font script="Lisu" typeface="Segoe UI"/>
+      <a:font script="Mymr" typeface="Myanmar Text"/>
+      <a:font script="Nkoo" typeface="Ebrima"/>
+      <a:font script="Olck" typeface="Nirmala UI"/>
+      <a:font script="Osma" typeface="Ebrima"/>
+      <a:font script="Phag" typeface="Phagspa"/>
+      <a:font script="Syrn" typeface="Estrangelo Edessa"/>
+      <a:font script="Syrj" typeface="Estrangelo Edessa"/>
+      <a:font script="Syre" typeface="Estrangelo Edessa"/>
+      <a:font script="Sora" typeface="Nirmala UI"/>
+      <a:font script="Tale" typeface="Microsoft Tai Le"/>
+      <a:font script="Talu" typeface="Microsoft New Tai Lue"/>
+      <a:font script="Tfng" typeface="Ebrima"/>
+    </a:majorFont>
+    <a:minorFont>
+      <a:latin typeface="Calibri" panose="020F0502020204030204"/>
+      <a:ea typeface=""/>
+      <a:cs typeface=""/>
+      <a:font script="Jpan" typeface="游ゴシック"/>
+      <a:font script="Hang" typeface="맑은 고딕"/>
+      <a:font script="Hans" typeface="等线"/>
+      <a:font script="Hant" typeface="新細明體"/>
+      <a:font script="Arab" typeface="Arial"/>
+      <a:font script="Hebr" typeface="Arial"/>
+      <a:font script="Thai" typeface="Tahoma"/>
+      <a:font script="Ethi" typeface="Nyala"/>
+      <a:font script="Beng" typeface="Vrinda"/>
+      <a:font script="Gujr" typeface="Shruti"/>
+      <a:font script="Khmr" typeface="DaunPenh"/>
+      <a:font script="Knda" typeface="Tunga"/>
+      <a:font script="Guru" typeface="Raavi"/>
+      <a:font script="Cans" typeface="Euphemia"/>
+      <a:font script="Cher" typeface="Plantagenet Cherokee"/>
+      <a:font script="Yiii" typeface="Microsoft Yi Baiti"/>
+      <a:font script="Tibt" typeface="Microsoft Himalaya"/>
+      <a:font script="Thaa" typeface="MV Boli"/>
+      <a:font script="Deva" typeface="Mangal"/>
+      <a:font script="Telu" typeface="Gautami"/>
+      <a:font script="Taml" typeface="Latha"/>
+      <a:font script="Syrc" typeface="Estrangelo Edessa"/>
+      <a:font script="Orya" typeface="Kalinga"/>
+      <a:font script="Mlym" typeface="Kartika"/>
+      <a:font script="Laoo" typeface="DokChampa"/>
+      <a:font script="Sinh" typeface="Iskoola Pota"/>
+      <a:font script="Mong" typeface="Mongolian Baiti"/>
+      <a:font script="Viet" typeface="Arial"/>
+      <a:font script="Uigh" typeface="Microsoft Uighur"/>
+      <a:font script="Geor" typeface="Sylfaen"/>
+      <a:font script="Armn" typeface="Arial"/>
+      <a:font script="Bugi" typeface="Leelawadee UI"/>
+      <a:font script="Bopo" typeface="Microsoft JhengHei"/>
+      <a:font script="Java" typeface="Javanese Text"/>
+      <a:font script="Lisu" typeface="Segoe UI"/>
+      <a:font script="Mymr" typeface="Myanmar Text"/>
+      <a:font script="Nkoo" typeface="Ebrima"/>
+      <a:font script="Olck" typeface="Nirmala UI"/>
+      <a:font script="Osma" typeface="Ebrima"/>
+      <a:font script="Phag" typeface="Phagspa"/>
+      <a:font script="Syrn" typeface="Estrangelo Edessa"/>
+      <a:font script="Syrj" typeface="Estrangelo Edessa"/>
+      <a:font script="Syre" typeface="Estrangelo Edessa"/>
+      <a:font script="Sora" typeface="Nirmala UI"/>
+      <a:font script="Tale" typeface="Microsoft Tai Le"/>
+      <a:font script="Talu" typeface="Microsoft New Tai Lue"/>
+      <a:font script="Tfng" typeface="Ebrima"/>
+    </a:minorFont>
+  </a:fontScheme>
+  <a:fmtScheme name="Office">
+    <a:fillStyleLst>
+      <a:solidFill>
+        <a:schemeClr val="phClr"/>
+      </a:solidFill>
+      <a:gradFill rotWithShape="1">
+        <a:gsLst>
+          <a:gs pos="0">
+            <a:schemeClr val="phClr">
+              <a:lumMod val="110000"/>
+              <a:satMod val="105000"/>
+              <a:tint val="67000"/>
+            </a:schemeClr>
+          </a:gs>
+          <a:gs pos="50000">
+            <a:schemeClr val="phClr">
+              <a:lumMod val="105000"/>
+              <a:satMod val="103000"/>
+              <a:tint val="73000"/>
+            </a:schemeClr>
+          </a:gs>
+          <a:gs pos="100000">
+            <a:schemeClr val="phClr">
+              <a:lumMod val="105000"/>
+              <a:satMod val="109000"/>
+              <a:tint val="81000"/>
+            </a:schemeClr>
+          </a:gs>
+        </a:gsLst>
+        <a:lin ang="5400000" scaled="0"/>
+      </a:gradFill>
+      <a:gradFill rotWithShape="1">
+        <a:gsLst>
+          <a:gs pos="0">
+            <a:schemeClr val="phClr">
+              <a:satMod val="103000"/>
+              <a:lumMod val="102000"/>
+              <a:tint val="94000"/>
+            </a:schemeClr>
+          </a:gs>
+          <a:gs pos="50000">
+            <a:schemeClr val="phClr">
+              <a:satMod val="110000"/>
+              <a:lumMod val="100000"/>
+              <a:shade val="100000"/>
+            </a:schemeClr>
+          </a:gs>
+          <a:gs pos="100000">
+            <a:schemeClr val="phClr">
+              <a:lumMod val="99000"/>
+              <a:satMod val="120000"/>
+              <a:shade val="78000"/>
+            </a:schemeClr>
+          </a:gs>
+        </a:gsLst>
+        <a:lin ang="5400000" scaled="0"/>
+      </a:gradFill>
+    </a:fillStyleLst>
+    <a:lnStyleLst>
+      <a:ln w="6350" cap="flat" cmpd="sng" algn="ctr">
+        <a:solidFill>
+          <a:schemeClr val="phClr"/>
+        </a:solidFill>
+        <a:prstDash val="solid"/>
+        <a:miter lim="800000"/>
+      </a:ln>
+      <a:ln w="12700" cap="flat" cmpd="sng" algn="ctr">
+        <a:solidFill>
+          <a:schemeClr val="phClr"/>
+        </a:solidFill>
+        <a:prstDash val="solid"/>
+        <a:miter lim="800000"/>
+      </a:ln>
+      <a:ln w="19050" cap="flat" cmpd="sng" algn="ctr">
+        <a:solidFill>
+          <a:schemeClr val="phClr"/>
+        </a:solidFill>
+        <a:prstDash val="solid"/>
+        <a:miter lim="800000"/>
+      </a:ln>
+    </a:lnStyleLst>
+    <a:effectStyleLst>
+      <a:effectStyle>
+        <a:effectLst/>
+      </a:effectStyle>
+      <a:effectStyle>
+        <a:effectLst/>
+      </a:effectStyle>
+      <a:effectStyle>
+        <a:effectLst>
+          <a:outerShdw blurRad="57150" dist="19050" dir="5400000" algn="ctr" rotWithShape="0">
+            <a:srgbClr val="000000">
+              <a:alpha val="63000"/>
+            </a:srgbClr>
+          </a:outerShdw>
+        </a:effectLst>
+      </a:effectStyle>
+    </a:effectStyleLst>
+    <a:bgFillStyleLst>
+      <a:solidFill>
+        <a:schemeClr val="phClr"/>
+      </a:solidFill>
+      <a:solidFill>
+        <a:schemeClr val="phClr">
+          <a:tint val="95000"/>
+          <a:satMod val="170000"/>
+        </a:schemeClr>
+      </a:solidFill>
+      <a:gradFill rotWithShape="1">
+        <a:gsLst>
+          <a:gs pos="0">
+            <a:schemeClr val="phClr">
+              <a:tint val="93000"/>
+              <a:satMod val="150000"/>
+              <a:shade val="98000"/>
+              <a:lumMod val="102000"/>
+            </a:schemeClr>
+          </a:gs>
+          <a:gs pos="50000">
+            <a:schemeClr val="phClr">
+              <a:tint val="98000"/>
+              <a:satMod val="130000"/>
+              <a:shade val="90000"/>
+              <a:lumMod val="103000"/>
+            </a:schemeClr>
+          </a:gs>
+          <a:gs pos="100000">
+            <a:schemeClr val="phClr">
+              <a:shade val="63000"/>
+              <a:satMod val="120000"/>
+            </a:schemeClr>
+          </a:gs>
+        </a:gsLst>
+        <a:lin ang="5400000" scaled="0"/>
+      </a:gradFill>
+    </a:bgFillStyleLst>
+  </a:fmtScheme>
+</a:themeOverride>
 </file>
</xml_diff>

<commit_message>
Wrapped up the project with summary of findings in the presentation slide.
</commit_message>
<xml_diff>
--- a/Hospital Analysis Overview & Findings.pptx
+++ b/Hospital Analysis Overview & Findings.pptx
@@ -269,7 +269,7 @@
                   <a:bodyPr/>
                   <a:lstStyle/>
                   <a:p>
-                    <a:fld id="{BE98F29D-8E8D-4793-8D39-4CEA87942007}" type="CELLRANGE">
+                    <a:fld id="{5E92879F-C7C3-4DDA-81BF-FDC588F66D22}" type="CELLRANGE">
                       <a:rPr lang="en-US" baseline="0"/>
                       <a:pPr/>
                       <a:t>[CELLRANGE]</a:t>
@@ -278,7 +278,7 @@
                       <a:rPr lang="en-US" baseline="0"/>
                       <a:t>, </a:t>
                     </a:r>
-                    <a:fld id="{6480A8A0-199C-45F4-A923-58D92459909A}" type="CATEGORYNAME">
+                    <a:fld id="{A693AB49-74F5-4B61-8020-63C50B03CCF4}" type="CATEGORYNAME">
                       <a:rPr lang="en-US" baseline="0"/>
                       <a:pPr/>
                       <a:t>[CATEGORY NAME]</a:t>
@@ -287,7 +287,7 @@
                       <a:rPr lang="en-US" baseline="0"/>
                       <a:t>, </a:t>
                     </a:r>
-                    <a:fld id="{A5FD555D-A554-46B3-94BD-C67E02B27380}" type="VALUE">
+                    <a:fld id="{78BC0589-A93B-4902-BE18-D465CBE2E9DC}" type="VALUE">
                       <a:rPr lang="en-US" baseline="0"/>
                       <a:pPr/>
                       <a:t>[VALUE]</a:t>
@@ -305,7 +305,6 @@
               <c:showBubbleSize val="0"/>
               <c:extLst>
                 <c:ext xmlns:c15="http://schemas.microsoft.com/office/drawing/2012/chart" uri="{CE6537A1-D6FC-4f65-9D91-7224C49458BB}">
-                  <c15:layout/>
                   <c15:dlblFieldTable/>
                   <c15:showDataLabelsRange val="1"/>
                 </c:ext>
@@ -316,13 +315,12 @@
             </c:dLbl>
             <c:dLbl>
               <c:idx val="1"/>
-              <c:layout/>
               <c:tx>
                 <c:rich>
                   <a:bodyPr/>
                   <a:lstStyle/>
                   <a:p>
-                    <a:fld id="{4E6C6CA7-8101-43AB-A874-F65195B9F5BF}" type="CELLRANGE">
+                    <a:fld id="{9FB9B3F2-65A3-49A4-ADE2-1119A024E721}" type="CELLRANGE">
                       <a:rPr lang="en-US"/>
                       <a:pPr/>
                       <a:t>[CELLRANGE]</a:t>
@@ -331,7 +329,7 @@
                       <a:rPr lang="en-US" baseline="0"/>
                       <a:t>, </a:t>
                     </a:r>
-                    <a:fld id="{F38D93E7-7BF4-4025-9E05-531087BF0FB4}" type="CATEGORYNAME">
+                    <a:fld id="{DB49C493-A166-4564-88D7-FF812D29B86F}" type="CATEGORYNAME">
                       <a:rPr lang="en-US" baseline="0"/>
                       <a:pPr/>
                       <a:t>[CATEGORY NAME]</a:t>
@@ -340,7 +338,7 @@
                       <a:rPr lang="en-US" baseline="0"/>
                       <a:t>, </a:t>
                     </a:r>
-                    <a:fld id="{C83C2BC3-F249-4180-AF44-35C8D273E389}" type="VALUE">
+                    <a:fld id="{05953652-C2E6-4E59-877B-4B2A06BDF75D}" type="VALUE">
                       <a:rPr lang="en-US" baseline="0"/>
                       <a:pPr/>
                       <a:t>[VALUE]</a:t>
@@ -358,7 +356,6 @@
               <c:showBubbleSize val="0"/>
               <c:extLst>
                 <c:ext xmlns:c15="http://schemas.microsoft.com/office/drawing/2012/chart" uri="{CE6537A1-D6FC-4f65-9D91-7224C49458BB}">
-                  <c15:layout/>
                   <c15:dlblFieldTable/>
                   <c15:xForSave val="1"/>
                   <c15:showDataLabelsRange val="1"/>
@@ -370,13 +367,12 @@
             </c:dLbl>
             <c:dLbl>
               <c:idx val="2"/>
-              <c:layout/>
               <c:tx>
                 <c:rich>
                   <a:bodyPr/>
                   <a:lstStyle/>
                   <a:p>
-                    <a:fld id="{138317BF-E52C-4AA7-9EE6-0318BE84A1DD}" type="CELLRANGE">
+                    <a:fld id="{502549E2-C2CC-49E2-8C3C-E14436574F1C}" type="CELLRANGE">
                       <a:rPr lang="en-US"/>
                       <a:pPr/>
                       <a:t>[CELLRANGE]</a:t>
@@ -385,7 +381,7 @@
                       <a:rPr lang="en-US" baseline="0"/>
                       <a:t>, </a:t>
                     </a:r>
-                    <a:fld id="{37FFF467-C338-471B-9D40-F6BB89E7A433}" type="CATEGORYNAME">
+                    <a:fld id="{997EBDCE-C8B6-4305-B9FB-B7002AE870F9}" type="CATEGORYNAME">
                       <a:rPr lang="en-US" baseline="0"/>
                       <a:pPr/>
                       <a:t>[CATEGORY NAME]</a:t>
@@ -394,7 +390,7 @@
                       <a:rPr lang="en-US" baseline="0"/>
                       <a:t>, </a:t>
                     </a:r>
-                    <a:fld id="{84C7A006-4FC3-47AA-8DF0-525B9E959F27}" type="VALUE">
+                    <a:fld id="{D683D8D3-F753-42EC-83FC-72B14B0E6CA4}" type="VALUE">
                       <a:rPr lang="en-US" baseline="0"/>
                       <a:pPr/>
                       <a:t>[VALUE]</a:t>
@@ -412,7 +408,6 @@
               <c:showBubbleSize val="0"/>
               <c:extLst>
                 <c:ext xmlns:c15="http://schemas.microsoft.com/office/drawing/2012/chart" uri="{CE6537A1-D6FC-4f65-9D91-7224C49458BB}">
-                  <c15:layout/>
                   <c15:dlblFieldTable/>
                   <c15:xForSave val="1"/>
                   <c15:showDataLabelsRange val="1"/>
@@ -424,13 +419,12 @@
             </c:dLbl>
             <c:dLbl>
               <c:idx val="3"/>
-              <c:layout/>
               <c:tx>
                 <c:rich>
                   <a:bodyPr/>
                   <a:lstStyle/>
                   <a:p>
-                    <a:fld id="{737C15A0-F627-45BE-9E0E-C83D7195F597}" type="CELLRANGE">
+                    <a:fld id="{05AF4B3A-4A7E-4269-A305-F57702C92920}" type="CELLRANGE">
                       <a:rPr lang="en-US"/>
                       <a:pPr/>
                       <a:t>[CELLRANGE]</a:t>
@@ -439,7 +433,7 @@
                       <a:rPr lang="en-US" baseline="0"/>
                       <a:t>, </a:t>
                     </a:r>
-                    <a:fld id="{590AFA10-957F-4BED-BCE9-71B0144DE1E9}" type="CATEGORYNAME">
+                    <a:fld id="{C9BD1A82-7B8C-4B4A-A2D9-13C3FE1FC22B}" type="CATEGORYNAME">
                       <a:rPr lang="en-US" baseline="0"/>
                       <a:pPr/>
                       <a:t>[CATEGORY NAME]</a:t>
@@ -448,7 +442,7 @@
                       <a:rPr lang="en-US" baseline="0"/>
                       <a:t>, </a:t>
                     </a:r>
-                    <a:fld id="{D322E8D9-96F6-450F-88BD-56CBCB7E9914}" type="VALUE">
+                    <a:fld id="{032249BD-5748-48BD-B587-BDFF0F8DA414}" type="VALUE">
                       <a:rPr lang="en-US" baseline="0"/>
                       <a:pPr/>
                       <a:t>[VALUE]</a:t>
@@ -466,7 +460,6 @@
               <c:showBubbleSize val="0"/>
               <c:extLst>
                 <c:ext xmlns:c15="http://schemas.microsoft.com/office/drawing/2012/chart" uri="{CE6537A1-D6FC-4f65-9D91-7224C49458BB}">
-                  <c15:layout/>
                   <c15:dlblFieldTable/>
                   <c15:xForSave val="1"/>
                   <c15:showDataLabelsRange val="1"/>
@@ -478,13 +471,12 @@
             </c:dLbl>
             <c:dLbl>
               <c:idx val="4"/>
-              <c:layout/>
               <c:tx>
                 <c:rich>
                   <a:bodyPr/>
                   <a:lstStyle/>
                   <a:p>
-                    <a:fld id="{1C76D934-F1C9-40C5-A656-C0D035320B11}" type="CELLRANGE">
+                    <a:fld id="{E40DBB2C-6EA0-482D-A1D2-4813DF2A961D}" type="CELLRANGE">
                       <a:rPr lang="en-US"/>
                       <a:pPr/>
                       <a:t>[CELLRANGE]</a:t>
@@ -493,7 +485,7 @@
                       <a:rPr lang="en-US" baseline="0"/>
                       <a:t>, </a:t>
                     </a:r>
-                    <a:fld id="{2A976C8B-A395-4862-AB60-A11D7BD14A54}" type="CATEGORYNAME">
+                    <a:fld id="{7FE55805-F60E-49E9-A395-B99008B09C74}" type="CATEGORYNAME">
                       <a:rPr lang="en-US" baseline="0"/>
                       <a:pPr/>
                       <a:t>[CATEGORY NAME]</a:t>
@@ -502,7 +494,7 @@
                       <a:rPr lang="en-US" baseline="0"/>
                       <a:t>, </a:t>
                     </a:r>
-                    <a:fld id="{CBCC7731-A1E3-4453-883A-578E68663564}" type="VALUE">
+                    <a:fld id="{30951F71-A66E-498B-AB4B-672FB7FE5561}" type="VALUE">
                       <a:rPr lang="en-US" baseline="0"/>
                       <a:pPr/>
                       <a:t>[VALUE]</a:t>
@@ -520,7 +512,6 @@
               <c:showBubbleSize val="0"/>
               <c:extLst>
                 <c:ext xmlns:c15="http://schemas.microsoft.com/office/drawing/2012/chart" uri="{CE6537A1-D6FC-4f65-9D91-7224C49458BB}">
-                  <c15:layout/>
                   <c15:dlblFieldTable/>
                   <c15:xForSave val="1"/>
                   <c15:showDataLabelsRange val="1"/>
@@ -582,7 +573,6 @@
             </c:leaderLines>
             <c:extLst>
               <c:ext xmlns:c15="http://schemas.microsoft.com/office/drawing/2012/chart" uri="{CE6537A1-D6FC-4f65-9D91-7224C49458BB}">
-                <c15:layout/>
                 <c15:showDataLabelsRange val="1"/>
               </c:ext>
             </c:extLst>
@@ -685,7 +675,6 @@
     </c:plotArea>
     <c:legend>
       <c:legendPos val="b"/>
-      <c:layout/>
       <c:overlay val="0"/>
       <c:spPr>
         <a:noFill/>
@@ -783,7 +772,6 @@
           </a:p>
         </c:rich>
       </c:tx>
-      <c:layout/>
       <c:overlay val="0"/>
       <c:spPr>
         <a:noFill/>
@@ -847,13 +835,12 @@
           <c:dLbls>
             <c:dLbl>
               <c:idx val="0"/>
-              <c:layout/>
               <c:tx>
                 <c:rich>
                   <a:bodyPr/>
                   <a:lstStyle/>
                   <a:p>
-                    <a:fld id="{D41CC8AF-37C6-46D5-B59B-7662CAB13A7B}" type="CELLRANGE">
+                    <a:fld id="{55F0F966-F07A-4E1A-BA59-82772D778BC4}" type="CELLRANGE">
                       <a:rPr lang="en-US"/>
                       <a:pPr/>
                       <a:t>[CELLRANGE]</a:t>
@@ -862,7 +849,7 @@
                       <a:rPr lang="en-US" baseline="0"/>
                       <a:t>, </a:t>
                     </a:r>
-                    <a:fld id="{338B4F53-7164-4AF4-ADF7-1141DD91C3CA}" type="VALUE">
+                    <a:fld id="{66EC45B9-B31E-48CD-B26F-4D4F799B696A}" type="VALUE">
                       <a:rPr lang="en-US" baseline="0"/>
                       <a:pPr/>
                       <a:t>[VALUE]</a:t>
@@ -880,7 +867,6 @@
               <c:showBubbleSize val="0"/>
               <c:extLst>
                 <c:ext xmlns:c15="http://schemas.microsoft.com/office/drawing/2012/chart" uri="{CE6537A1-D6FC-4f65-9D91-7224C49458BB}">
-                  <c15:layout/>
                   <c15:dlblFieldTable/>
                   <c15:xForSave val="1"/>
                   <c15:showDataLabelsRange val="1"/>
@@ -892,13 +878,12 @@
             </c:dLbl>
             <c:dLbl>
               <c:idx val="1"/>
-              <c:layout/>
               <c:tx>
                 <c:rich>
                   <a:bodyPr/>
                   <a:lstStyle/>
                   <a:p>
-                    <a:fld id="{16C5B293-EC59-4208-BBCE-BF27754D2BAE}" type="CELLRANGE">
+                    <a:fld id="{8B596B82-6926-4B21-95B1-1A07492B546A}" type="CELLRANGE">
                       <a:rPr lang="en-US"/>
                       <a:pPr/>
                       <a:t>[CELLRANGE]</a:t>
@@ -907,7 +892,7 @@
                       <a:rPr lang="en-US" baseline="0"/>
                       <a:t>, </a:t>
                     </a:r>
-                    <a:fld id="{4943445E-EC11-4AB8-8329-C3B23B0E846C}" type="VALUE">
+                    <a:fld id="{CEAA340A-C7A8-48D8-AC5F-F98B56914816}" type="VALUE">
                       <a:rPr lang="en-US" baseline="0"/>
                       <a:pPr/>
                       <a:t>[VALUE]</a:t>
@@ -925,7 +910,6 @@
               <c:showBubbleSize val="0"/>
               <c:extLst>
                 <c:ext xmlns:c15="http://schemas.microsoft.com/office/drawing/2012/chart" uri="{CE6537A1-D6FC-4f65-9D91-7224C49458BB}">
-                  <c15:layout/>
                   <c15:dlblFieldTable/>
                   <c15:xForSave val="1"/>
                   <c15:showDataLabelsRange val="1"/>
@@ -937,13 +921,12 @@
             </c:dLbl>
             <c:dLbl>
               <c:idx val="2"/>
-              <c:layout/>
               <c:tx>
                 <c:rich>
                   <a:bodyPr/>
                   <a:lstStyle/>
                   <a:p>
-                    <a:fld id="{9223E92D-0938-413C-A291-9754949CDF7F}" type="CELLRANGE">
+                    <a:fld id="{5A3BC8AF-6EB5-4FD9-8F63-56F3818C946E}" type="CELLRANGE">
                       <a:rPr lang="en-US"/>
                       <a:pPr/>
                       <a:t>[CELLRANGE]</a:t>
@@ -952,7 +935,7 @@
                       <a:rPr lang="en-US" baseline="0"/>
                       <a:t>, </a:t>
                     </a:r>
-                    <a:fld id="{B399A753-1C23-4D1B-A2E4-8AA09CF060A1}" type="VALUE">
+                    <a:fld id="{86A8C33E-FCD6-4694-B387-EBE4A28AED05}" type="VALUE">
                       <a:rPr lang="en-US" baseline="0"/>
                       <a:pPr/>
                       <a:t>[VALUE]</a:t>
@@ -970,7 +953,6 @@
               <c:showBubbleSize val="0"/>
               <c:extLst>
                 <c:ext xmlns:c15="http://schemas.microsoft.com/office/drawing/2012/chart" uri="{CE6537A1-D6FC-4f65-9D91-7224C49458BB}">
-                  <c15:layout/>
                   <c15:dlblFieldTable/>
                   <c15:xForSave val="1"/>
                   <c15:showDataLabelsRange val="1"/>
@@ -982,13 +964,12 @@
             </c:dLbl>
             <c:dLbl>
               <c:idx val="3"/>
-              <c:layout/>
               <c:tx>
                 <c:rich>
                   <a:bodyPr/>
                   <a:lstStyle/>
                   <a:p>
-                    <a:fld id="{381BE02E-937F-4D21-922F-0C0918177EE3}" type="CELLRANGE">
+                    <a:fld id="{EAE0228A-D0BA-49EB-A786-4D3A78080838}" type="CELLRANGE">
                       <a:rPr lang="en-US"/>
                       <a:pPr/>
                       <a:t>[CELLRANGE]</a:t>
@@ -997,7 +978,7 @@
                       <a:rPr lang="en-US" baseline="0"/>
                       <a:t>, </a:t>
                     </a:r>
-                    <a:fld id="{DAB28A7B-260D-4CEA-ACDC-3895ADC8FAE2}" type="VALUE">
+                    <a:fld id="{E92F2C1D-815D-4C95-82BC-AA9E59C8378D}" type="VALUE">
                       <a:rPr lang="en-US" baseline="0"/>
                       <a:pPr/>
                       <a:t>[VALUE]</a:t>
@@ -1015,7 +996,6 @@
               <c:showBubbleSize val="0"/>
               <c:extLst>
                 <c:ext xmlns:c15="http://schemas.microsoft.com/office/drawing/2012/chart" uri="{CE6537A1-D6FC-4f65-9D91-7224C49458BB}">
-                  <c15:layout/>
                   <c15:dlblFieldTable/>
                   <c15:xForSave val="1"/>
                   <c15:showDataLabelsRange val="1"/>
@@ -1027,13 +1007,12 @@
             </c:dLbl>
             <c:dLbl>
               <c:idx val="4"/>
-              <c:layout/>
               <c:tx>
                 <c:rich>
                   <a:bodyPr/>
                   <a:lstStyle/>
                   <a:p>
-                    <a:fld id="{FEFCD5C4-6DC4-42BB-99AC-C7595ECEC4BB}" type="CELLRANGE">
+                    <a:fld id="{27FED87D-8691-4185-B47F-2CF309ED2C9B}" type="CELLRANGE">
                       <a:rPr lang="en-US"/>
                       <a:pPr/>
                       <a:t>[CELLRANGE]</a:t>
@@ -1042,7 +1021,7 @@
                       <a:rPr lang="en-US" baseline="0"/>
                       <a:t>, </a:t>
                     </a:r>
-                    <a:fld id="{44D62925-CC15-426B-B23A-EE331B6A3D71}" type="VALUE">
+                    <a:fld id="{364FD9B3-19F9-4F30-9C9B-7681651DDD0F}" type="VALUE">
                       <a:rPr lang="en-US" baseline="0"/>
                       <a:pPr/>
                       <a:t>[VALUE]</a:t>
@@ -1060,7 +1039,6 @@
               <c:showBubbleSize val="0"/>
               <c:extLst>
                 <c:ext xmlns:c15="http://schemas.microsoft.com/office/drawing/2012/chart" uri="{CE6537A1-D6FC-4f65-9D91-7224C49458BB}">
-                  <c15:layout/>
                   <c15:dlblFieldTable/>
                   <c15:xForSave val="1"/>
                   <c15:showDataLabelsRange val="1"/>
@@ -1072,13 +1050,12 @@
             </c:dLbl>
             <c:dLbl>
               <c:idx val="5"/>
-              <c:layout/>
               <c:tx>
                 <c:rich>
                   <a:bodyPr/>
                   <a:lstStyle/>
                   <a:p>
-                    <a:fld id="{E6860B2D-E344-455D-BEDA-C6FC119A581D}" type="CELLRANGE">
+                    <a:fld id="{551F119B-9138-4E3E-9FA0-BC7DCBF415C0}" type="CELLRANGE">
                       <a:rPr lang="en-US"/>
                       <a:pPr/>
                       <a:t>[CELLRANGE]</a:t>
@@ -1087,7 +1064,7 @@
                       <a:rPr lang="en-US" baseline="0"/>
                       <a:t>, </a:t>
                     </a:r>
-                    <a:fld id="{52524E7E-BA8D-49A4-AF62-10333C305593}" type="VALUE">
+                    <a:fld id="{8185A819-008B-44CB-AC0E-EC1DFACF9118}" type="VALUE">
                       <a:rPr lang="en-US" baseline="0"/>
                       <a:pPr/>
                       <a:t>[VALUE]</a:t>
@@ -1105,7 +1082,6 @@
               <c:showBubbleSize val="0"/>
               <c:extLst>
                 <c:ext xmlns:c15="http://schemas.microsoft.com/office/drawing/2012/chart" uri="{CE6537A1-D6FC-4f65-9D91-7224C49458BB}">
-                  <c15:layout/>
                   <c15:dlblFieldTable/>
                   <c15:xForSave val="1"/>
                   <c15:showDataLabelsRange val="1"/>
@@ -1117,13 +1093,12 @@
             </c:dLbl>
             <c:dLbl>
               <c:idx val="6"/>
-              <c:layout/>
               <c:tx>
                 <c:rich>
                   <a:bodyPr/>
                   <a:lstStyle/>
                   <a:p>
-                    <a:fld id="{5E89EF51-26DA-4E96-8060-2402BB6C5AF3}" type="CELLRANGE">
+                    <a:fld id="{0B2609FD-9790-4602-867B-BF775DCE9375}" type="CELLRANGE">
                       <a:rPr lang="en-US"/>
                       <a:pPr/>
                       <a:t>[CELLRANGE]</a:t>
@@ -1132,7 +1107,7 @@
                       <a:rPr lang="en-US" baseline="0"/>
                       <a:t>, </a:t>
                     </a:r>
-                    <a:fld id="{508E7A1D-A94A-406A-AF16-99982C4040D8}" type="VALUE">
+                    <a:fld id="{A0B98715-A13F-4B7D-939A-1F6BEE752F94}" type="VALUE">
                       <a:rPr lang="en-US" baseline="0"/>
                       <a:pPr/>
                       <a:t>[VALUE]</a:t>
@@ -1150,7 +1125,6 @@
               <c:showBubbleSize val="0"/>
               <c:extLst>
                 <c:ext xmlns:c15="http://schemas.microsoft.com/office/drawing/2012/chart" uri="{CE6537A1-D6FC-4f65-9D91-7224C49458BB}">
-                  <c15:layout/>
                   <c15:dlblFieldTable/>
                   <c15:xForSave val="1"/>
                   <c15:showDataLabelsRange val="1"/>
@@ -1199,7 +1173,6 @@
             <c:showLeaderLines val="0"/>
             <c:extLst>
               <c:ext xmlns:c15="http://schemas.microsoft.com/office/drawing/2012/chart" uri="{CE6537A1-D6FC-4f65-9D91-7224C49458BB}">
-                <c15:layout/>
                 <c15:showDataLabelsRange val="1"/>
                 <c15:showLeaderLines val="1"/>
                 <c15:leaderLines>
@@ -2035,7 +2008,6 @@
             <c:showLeaderLines val="0"/>
             <c:extLst>
               <c:ext xmlns:c15="http://schemas.microsoft.com/office/drawing/2012/chart" uri="{CE6537A1-D6FC-4f65-9D91-7224C49458BB}">
-                <c15:layout/>
                 <c15:showLeaderLines val="1"/>
                 <c15:leaderLines>
                   <c:spPr>
@@ -2649,7 +2621,6 @@
           </a:p>
         </c:rich>
       </c:tx>
-      <c:layout/>
       <c:overlay val="0"/>
       <c:spPr>
         <a:noFill/>
@@ -2741,13 +2712,12 @@
           <c:dLbls>
             <c:dLbl>
               <c:idx val="0"/>
-              <c:layout/>
               <c:tx>
                 <c:rich>
                   <a:bodyPr/>
                   <a:lstStyle/>
                   <a:p>
-                    <a:fld id="{D983ECFF-2B60-40D2-B1EB-0EDA1FF88FF3}" type="CELLRANGE">
+                    <a:fld id="{EF2D201C-CA0D-4779-B3DF-591A8F830F64}" type="CELLRANGE">
                       <a:rPr lang="en-US"/>
                       <a:pPr/>
                       <a:t>[CELLRANGE]</a:t>
@@ -2756,7 +2726,7 @@
                       <a:rPr lang="en-US" baseline="0"/>
                       <a:t>, </a:t>
                     </a:r>
-                    <a:fld id="{38148D50-7CAC-4B35-AE68-C627DFCDC732}" type="VALUE">
+                    <a:fld id="{64FBB868-E45D-4FAD-8DA2-126E261C4FE2}" type="VALUE">
                       <a:rPr lang="en-US" baseline="0"/>
                       <a:pPr/>
                       <a:t>[VALUE]</a:t>
@@ -2774,7 +2744,6 @@
               <c:showBubbleSize val="0"/>
               <c:extLst>
                 <c:ext xmlns:c15="http://schemas.microsoft.com/office/drawing/2012/chart" uri="{CE6537A1-D6FC-4f65-9D91-7224C49458BB}">
-                  <c15:layout/>
                   <c15:dlblFieldTable/>
                   <c15:xForSave val="1"/>
                   <c15:showDataLabelsRange val="1"/>
@@ -2786,13 +2755,12 @@
             </c:dLbl>
             <c:dLbl>
               <c:idx val="1"/>
-              <c:layout/>
               <c:tx>
                 <c:rich>
                   <a:bodyPr/>
                   <a:lstStyle/>
                   <a:p>
-                    <a:fld id="{2C90D73E-AE39-48CC-B6C6-36EFDC7B58DF}" type="CELLRANGE">
+                    <a:fld id="{16C6E15E-0B82-4E62-8121-00D895FC5498}" type="CELLRANGE">
                       <a:rPr lang="en-US"/>
                       <a:pPr/>
                       <a:t>[CELLRANGE]</a:t>
@@ -2801,7 +2769,7 @@
                       <a:rPr lang="en-US" baseline="0"/>
                       <a:t>, </a:t>
                     </a:r>
-                    <a:fld id="{764A6C6E-ABCF-4019-8C53-BEDC4723B610}" type="VALUE">
+                    <a:fld id="{19750769-92DE-49B2-BD7F-2A27B405CF43}" type="VALUE">
                       <a:rPr lang="en-US" baseline="0"/>
                       <a:pPr/>
                       <a:t>[VALUE]</a:t>
@@ -2819,7 +2787,6 @@
               <c:showBubbleSize val="0"/>
               <c:extLst>
                 <c:ext xmlns:c15="http://schemas.microsoft.com/office/drawing/2012/chart" uri="{CE6537A1-D6FC-4f65-9D91-7224C49458BB}">
-                  <c15:layout/>
                   <c15:dlblFieldTable/>
                   <c15:xForSave val="1"/>
                   <c15:showDataLabelsRange val="1"/>
@@ -2884,7 +2851,6 @@
             </c:leaderLines>
             <c:extLst>
               <c:ext xmlns:c15="http://schemas.microsoft.com/office/drawing/2012/chart" uri="{CE6537A1-D6FC-4f65-9D91-7224C49458BB}">
-                <c15:layout/>
                 <c15:showDataLabelsRange val="1"/>
               </c:ext>
             </c:extLst>
@@ -2960,7 +2926,6 @@
     </c:plotArea>
     <c:legend>
       <c:legendPos val="b"/>
-      <c:layout/>
       <c:overlay val="0"/>
       <c:spPr>
         <a:noFill/>
@@ -9823,11 +9788,7 @@
           <a:p>
             <a:r>
               <a:rPr lang="en-US" sz="4000" b="1" dirty="0" smtClean="0"/>
-              <a:t>Who is waiting the </a:t>
-            </a:r>
-            <a:r>
-              <a:rPr lang="en-US" sz="4000" b="1" dirty="0" smtClean="0"/>
-              <a:t>Longest?</a:t>
+              <a:t>Who is waiting the Longest?</a:t>
             </a:r>
             <a:endParaRPr lang="en-US" sz="4000" b="1" dirty="0"/>
           </a:p>
@@ -9966,11 +9927,7 @@
           <a:p>
             <a:r>
               <a:rPr lang="en-US" sz="4000" b="1" dirty="0" smtClean="0"/>
-              <a:t>What Days of Week are </a:t>
-            </a:r>
-            <a:r>
-              <a:rPr lang="en-US" sz="4000" b="1" dirty="0" smtClean="0"/>
-              <a:t>Affected?</a:t>
+              <a:t>What Days of Week are Affected?</a:t>
             </a:r>
             <a:endParaRPr lang="en-US" sz="4000" b="1" dirty="0"/>
           </a:p>
@@ -10350,14 +10307,16 @@
         </p:nvSpPr>
         <p:spPr/>
         <p:txBody>
-          <a:bodyPr/>
+          <a:bodyPr>
+            <a:normAutofit/>
+          </a:bodyPr>
           <a:lstStyle/>
           <a:p>
             <a:r>
-              <a:rPr lang="en-US" b="1" dirty="0" smtClean="0"/>
-              <a:t>Tools for Analysis</a:t>
-            </a:r>
-            <a:endParaRPr lang="en-US" b="1" dirty="0"/>
+              <a:rPr lang="en-US" sz="4400" b="1" dirty="0" smtClean="0"/>
+              <a:t>Summary</a:t>
+            </a:r>
+            <a:endParaRPr lang="en-US" sz="4400" b="1" dirty="0"/>
           </a:p>
         </p:txBody>
       </p:sp>
@@ -10379,8 +10338,41 @@
           <a:lstStyle/>
           <a:p>
             <a:r>
-              <a:rPr lang="en-US" sz="2800" b="1" dirty="0" smtClean="0"/>
-              <a:t>EXCEL</a:t>
+              <a:rPr lang="en-US" sz="2600" dirty="0" smtClean="0">
+                <a:solidFill>
+                  <a:schemeClr val="tx1"/>
+                </a:solidFill>
+              </a:rPr>
+              <a:t>Based on the analysis, there may be a possibility to add more medical staff during the morning rush period.</a:t>
+            </a:r>
+          </a:p>
+          <a:p>
+            <a:pPr marL="228600" indent="0">
+              <a:spcBef>
+                <a:spcPts val="600"/>
+              </a:spcBef>
+              <a:buNone/>
+            </a:pPr>
+            <a:endParaRPr lang="en-US" sz="100" dirty="0">
+              <a:solidFill>
+                <a:schemeClr val="tx1"/>
+              </a:solidFill>
+            </a:endParaRPr>
+          </a:p>
+          <a:p>
+            <a:pPr marL="57150" indent="0">
+              <a:spcBef>
+                <a:spcPts val="600"/>
+              </a:spcBef>
+              <a:buNone/>
+            </a:pPr>
+            <a:r>
+              <a:rPr lang="en-US" sz="2800" b="1" dirty="0" smtClean="0">
+                <a:solidFill>
+                  <a:schemeClr val="tx1"/>
+                </a:solidFill>
+              </a:rPr>
+              <a:t>Other Actions</a:t>
             </a:r>
           </a:p>
           <a:p>
@@ -10392,8 +10384,12 @@
               <a:buChar char="•"/>
             </a:pPr>
             <a:r>
-              <a:rPr lang="en-US" dirty="0" smtClean="0"/>
-              <a:t>Pivot Tables</a:t>
+              <a:rPr lang="en-US" sz="2400" dirty="0" smtClean="0">
+                <a:solidFill>
+                  <a:schemeClr val="tx1"/>
+                </a:solidFill>
+              </a:rPr>
+              <a:t>Determine if it makes financial sense to have additional medical staffing during morning hours.</a:t>
             </a:r>
           </a:p>
           <a:p>
@@ -10405,95 +10401,18 @@
               <a:buChar char="•"/>
             </a:pPr>
             <a:r>
-              <a:rPr lang="en-US" dirty="0" smtClean="0"/>
-              <a:t>IF conditional</a:t>
-            </a:r>
-          </a:p>
-          <a:p>
-            <a:pPr marL="400050" indent="-171450">
-              <a:spcBef>
-                <a:spcPts val="600"/>
-              </a:spcBef>
-              <a:buFont typeface="Arial" panose="020B0604020202020204" pitchFamily="34" charset="0"/>
-              <a:buChar char="•"/>
-            </a:pPr>
-            <a:r>
-              <a:rPr lang="en-US" dirty="0" smtClean="0"/>
-              <a:t>Conditional Formatting</a:t>
-            </a:r>
-          </a:p>
-          <a:p>
-            <a:pPr marL="400050" indent="-171450">
-              <a:spcBef>
-                <a:spcPts val="600"/>
-              </a:spcBef>
-              <a:buFont typeface="Arial" panose="020B0604020202020204" pitchFamily="34" charset="0"/>
-              <a:buChar char="•"/>
-            </a:pPr>
-            <a:r>
-              <a:rPr lang="en-US" dirty="0" smtClean="0"/>
-              <a:t>Time conversions</a:t>
-            </a:r>
-          </a:p>
-          <a:p>
-            <a:pPr marL="400050" indent="-171450">
-              <a:spcBef>
-                <a:spcPts val="600"/>
-              </a:spcBef>
-              <a:buFont typeface="Arial" panose="020B0604020202020204" pitchFamily="34" charset="0"/>
-              <a:buChar char="•"/>
-            </a:pPr>
-            <a:r>
-              <a:rPr lang="en-US" dirty="0" smtClean="0"/>
-              <a:t>New Dimensions</a:t>
-            </a:r>
-          </a:p>
-          <a:p>
-            <a:pPr marL="400050" indent="-171450">
-              <a:spcBef>
-                <a:spcPts val="600"/>
-              </a:spcBef>
-              <a:buFont typeface="Arial" panose="020B0604020202020204" pitchFamily="34" charset="0"/>
-              <a:buChar char="•"/>
-            </a:pPr>
-            <a:r>
-              <a:rPr lang="en-US" dirty="0" smtClean="0"/>
-              <a:t>Functions: TEXT, DAYOFWEEK</a:t>
-            </a:r>
-          </a:p>
-          <a:p>
-            <a:pPr marL="228600" indent="0">
-              <a:spcBef>
-                <a:spcPts val="600"/>
-              </a:spcBef>
-              <a:buNone/>
-            </a:pPr>
-            <a:endParaRPr lang="en-US" sz="100" dirty="0"/>
-          </a:p>
-          <a:p>
-            <a:pPr marL="57150" indent="0">
-              <a:spcBef>
-                <a:spcPts val="600"/>
-              </a:spcBef>
-              <a:buNone/>
-            </a:pPr>
-            <a:r>
-              <a:rPr lang="en-US" sz="2800" b="1" dirty="0" smtClean="0"/>
-              <a:t>Data Story (Beginning, Middle and End)</a:t>
-            </a:r>
-          </a:p>
-          <a:p>
-            <a:pPr marL="400050" indent="-171450">
-              <a:spcBef>
-                <a:spcPts val="600"/>
-              </a:spcBef>
-              <a:buFont typeface="Arial" panose="020B0604020202020204" pitchFamily="34" charset="0"/>
-              <a:buChar char="•"/>
-            </a:pPr>
-            <a:r>
-              <a:rPr lang="en-US" dirty="0" smtClean="0"/>
-              <a:t>Power Point</a:t>
-            </a:r>
+              <a:rPr lang="en-US" sz="2400" dirty="0" smtClean="0">
+                <a:solidFill>
+                  <a:schemeClr val="tx1"/>
+                </a:solidFill>
+              </a:rPr>
+              <a:t>Determine if the pre and post consultation times are trending positively or negatively.</a:t>
+            </a:r>
+            <a:endParaRPr lang="en-US" sz="2400" dirty="0" smtClean="0">
+              <a:solidFill>
+                <a:schemeClr val="tx1"/>
+              </a:solidFill>
+            </a:endParaRPr>
           </a:p>
         </p:txBody>
       </p:sp>

</xml_diff>

<commit_message>
Added screenshots for project components and finishing touches to slides
</commit_message>
<xml_diff>
--- a/Hospital Analysis Overview & Findings.pptx
+++ b/Hospital Analysis Overview & Findings.pptx
@@ -269,7 +269,7 @@
                   <a:bodyPr/>
                   <a:lstStyle/>
                   <a:p>
-                    <a:fld id="{5E92879F-C7C3-4DDA-81BF-FDC588F66D22}" type="CELLRANGE">
+                    <a:fld id="{51DEB6BF-F40A-459F-8C28-CDC4B88D24AC}" type="CELLRANGE">
                       <a:rPr lang="en-US" baseline="0"/>
                       <a:pPr/>
                       <a:t>[CELLRANGE]</a:t>
@@ -278,7 +278,7 @@
                       <a:rPr lang="en-US" baseline="0"/>
                       <a:t>, </a:t>
                     </a:r>
-                    <a:fld id="{A693AB49-74F5-4B61-8020-63C50B03CCF4}" type="CATEGORYNAME">
+                    <a:fld id="{540049F8-4F83-4C95-BF7E-D1874732D6B2}" type="CATEGORYNAME">
                       <a:rPr lang="en-US" baseline="0"/>
                       <a:pPr/>
                       <a:t>[CATEGORY NAME]</a:t>
@@ -287,7 +287,7 @@
                       <a:rPr lang="en-US" baseline="0"/>
                       <a:t>, </a:t>
                     </a:r>
-                    <a:fld id="{78BC0589-A93B-4902-BE18-D465CBE2E9DC}" type="VALUE">
+                    <a:fld id="{2137184F-1DE1-4C29-BB94-25103747DB1D}" type="VALUE">
                       <a:rPr lang="en-US" baseline="0"/>
                       <a:pPr/>
                       <a:t>[VALUE]</a:t>
@@ -305,6 +305,7 @@
               <c:showBubbleSize val="0"/>
               <c:extLst>
                 <c:ext xmlns:c15="http://schemas.microsoft.com/office/drawing/2012/chart" uri="{CE6537A1-D6FC-4f65-9D91-7224C49458BB}">
+                  <c15:layout/>
                   <c15:dlblFieldTable/>
                   <c15:showDataLabelsRange val="1"/>
                 </c:ext>
@@ -315,12 +316,13 @@
             </c:dLbl>
             <c:dLbl>
               <c:idx val="1"/>
+              <c:layout/>
               <c:tx>
                 <c:rich>
                   <a:bodyPr/>
                   <a:lstStyle/>
                   <a:p>
-                    <a:fld id="{9FB9B3F2-65A3-49A4-ADE2-1119A024E721}" type="CELLRANGE">
+                    <a:fld id="{8E0DB93D-5857-4023-9A25-5E16B6DF3547}" type="CELLRANGE">
                       <a:rPr lang="en-US"/>
                       <a:pPr/>
                       <a:t>[CELLRANGE]</a:t>
@@ -329,7 +331,7 @@
                       <a:rPr lang="en-US" baseline="0"/>
                       <a:t>, </a:t>
                     </a:r>
-                    <a:fld id="{DB49C493-A166-4564-88D7-FF812D29B86F}" type="CATEGORYNAME">
+                    <a:fld id="{46D464F2-FDD6-45EF-9C19-7F7886558AFE}" type="CATEGORYNAME">
                       <a:rPr lang="en-US" baseline="0"/>
                       <a:pPr/>
                       <a:t>[CATEGORY NAME]</a:t>
@@ -338,7 +340,7 @@
                       <a:rPr lang="en-US" baseline="0"/>
                       <a:t>, </a:t>
                     </a:r>
-                    <a:fld id="{05953652-C2E6-4E59-877B-4B2A06BDF75D}" type="VALUE">
+                    <a:fld id="{350C25BC-8A13-4177-A3F7-4C2EBE7E5EB5}" type="VALUE">
                       <a:rPr lang="en-US" baseline="0"/>
                       <a:pPr/>
                       <a:t>[VALUE]</a:t>
@@ -356,6 +358,7 @@
               <c:showBubbleSize val="0"/>
               <c:extLst>
                 <c:ext xmlns:c15="http://schemas.microsoft.com/office/drawing/2012/chart" uri="{CE6537A1-D6FC-4f65-9D91-7224C49458BB}">
+                  <c15:layout/>
                   <c15:dlblFieldTable/>
                   <c15:xForSave val="1"/>
                   <c15:showDataLabelsRange val="1"/>
@@ -367,12 +370,13 @@
             </c:dLbl>
             <c:dLbl>
               <c:idx val="2"/>
+              <c:layout/>
               <c:tx>
                 <c:rich>
                   <a:bodyPr/>
                   <a:lstStyle/>
                   <a:p>
-                    <a:fld id="{502549E2-C2CC-49E2-8C3C-E14436574F1C}" type="CELLRANGE">
+                    <a:fld id="{E0995B5B-AB08-423B-8E41-4A4583F01FA6}" type="CELLRANGE">
                       <a:rPr lang="en-US"/>
                       <a:pPr/>
                       <a:t>[CELLRANGE]</a:t>
@@ -381,7 +385,7 @@
                       <a:rPr lang="en-US" baseline="0"/>
                       <a:t>, </a:t>
                     </a:r>
-                    <a:fld id="{997EBDCE-C8B6-4305-B9FB-B7002AE870F9}" type="CATEGORYNAME">
+                    <a:fld id="{C8F553B4-2EE1-4E99-8B00-F56F378B07A6}" type="CATEGORYNAME">
                       <a:rPr lang="en-US" baseline="0"/>
                       <a:pPr/>
                       <a:t>[CATEGORY NAME]</a:t>
@@ -390,7 +394,7 @@
                       <a:rPr lang="en-US" baseline="0"/>
                       <a:t>, </a:t>
                     </a:r>
-                    <a:fld id="{D683D8D3-F753-42EC-83FC-72B14B0E6CA4}" type="VALUE">
+                    <a:fld id="{78A2DE7D-93C9-434E-A1C1-87E988601C73}" type="VALUE">
                       <a:rPr lang="en-US" baseline="0"/>
                       <a:pPr/>
                       <a:t>[VALUE]</a:t>
@@ -408,6 +412,7 @@
               <c:showBubbleSize val="0"/>
               <c:extLst>
                 <c:ext xmlns:c15="http://schemas.microsoft.com/office/drawing/2012/chart" uri="{CE6537A1-D6FC-4f65-9D91-7224C49458BB}">
+                  <c15:layout/>
                   <c15:dlblFieldTable/>
                   <c15:xForSave val="1"/>
                   <c15:showDataLabelsRange val="1"/>
@@ -419,12 +424,13 @@
             </c:dLbl>
             <c:dLbl>
               <c:idx val="3"/>
+              <c:layout/>
               <c:tx>
                 <c:rich>
                   <a:bodyPr/>
                   <a:lstStyle/>
                   <a:p>
-                    <a:fld id="{05AF4B3A-4A7E-4269-A305-F57702C92920}" type="CELLRANGE">
+                    <a:fld id="{7EBCCAE7-78A3-4717-814A-BC048B136B4C}" type="CELLRANGE">
                       <a:rPr lang="en-US"/>
                       <a:pPr/>
                       <a:t>[CELLRANGE]</a:t>
@@ -433,7 +439,7 @@
                       <a:rPr lang="en-US" baseline="0"/>
                       <a:t>, </a:t>
                     </a:r>
-                    <a:fld id="{C9BD1A82-7B8C-4B4A-A2D9-13C3FE1FC22B}" type="CATEGORYNAME">
+                    <a:fld id="{B543CFEF-81A0-4DC5-8D7D-61F18C8BAF6E}" type="CATEGORYNAME">
                       <a:rPr lang="en-US" baseline="0"/>
                       <a:pPr/>
                       <a:t>[CATEGORY NAME]</a:t>
@@ -442,7 +448,7 @@
                       <a:rPr lang="en-US" baseline="0"/>
                       <a:t>, </a:t>
                     </a:r>
-                    <a:fld id="{032249BD-5748-48BD-B587-BDFF0F8DA414}" type="VALUE">
+                    <a:fld id="{D19B4F63-8FAB-4510-9895-DCCE6F6BB683}" type="VALUE">
                       <a:rPr lang="en-US" baseline="0"/>
                       <a:pPr/>
                       <a:t>[VALUE]</a:t>
@@ -460,6 +466,7 @@
               <c:showBubbleSize val="0"/>
               <c:extLst>
                 <c:ext xmlns:c15="http://schemas.microsoft.com/office/drawing/2012/chart" uri="{CE6537A1-D6FC-4f65-9D91-7224C49458BB}">
+                  <c15:layout/>
                   <c15:dlblFieldTable/>
                   <c15:xForSave val="1"/>
                   <c15:showDataLabelsRange val="1"/>
@@ -471,12 +478,13 @@
             </c:dLbl>
             <c:dLbl>
               <c:idx val="4"/>
+              <c:layout/>
               <c:tx>
                 <c:rich>
                   <a:bodyPr/>
                   <a:lstStyle/>
                   <a:p>
-                    <a:fld id="{E40DBB2C-6EA0-482D-A1D2-4813DF2A961D}" type="CELLRANGE">
+                    <a:fld id="{140AF64B-7640-4A0A-A4F7-4F40C58C3F66}" type="CELLRANGE">
                       <a:rPr lang="en-US"/>
                       <a:pPr/>
                       <a:t>[CELLRANGE]</a:t>
@@ -485,7 +493,7 @@
                       <a:rPr lang="en-US" baseline="0"/>
                       <a:t>, </a:t>
                     </a:r>
-                    <a:fld id="{7FE55805-F60E-49E9-A395-B99008B09C74}" type="CATEGORYNAME">
+                    <a:fld id="{07219DDA-AD3A-4683-ABF9-944B58EC7504}" type="CATEGORYNAME">
                       <a:rPr lang="en-US" baseline="0"/>
                       <a:pPr/>
                       <a:t>[CATEGORY NAME]</a:t>
@@ -494,7 +502,7 @@
                       <a:rPr lang="en-US" baseline="0"/>
                       <a:t>, </a:t>
                     </a:r>
-                    <a:fld id="{30951F71-A66E-498B-AB4B-672FB7FE5561}" type="VALUE">
+                    <a:fld id="{6B321341-4B4A-4E7F-97D5-D5D568AB66EC}" type="VALUE">
                       <a:rPr lang="en-US" baseline="0"/>
                       <a:pPr/>
                       <a:t>[VALUE]</a:t>
@@ -512,6 +520,7 @@
               <c:showBubbleSize val="0"/>
               <c:extLst>
                 <c:ext xmlns:c15="http://schemas.microsoft.com/office/drawing/2012/chart" uri="{CE6537A1-D6FC-4f65-9D91-7224C49458BB}">
+                  <c15:layout/>
                   <c15:dlblFieldTable/>
                   <c15:xForSave val="1"/>
                   <c15:showDataLabelsRange val="1"/>
@@ -573,6 +582,7 @@
             </c:leaderLines>
             <c:extLst>
               <c:ext xmlns:c15="http://schemas.microsoft.com/office/drawing/2012/chart" uri="{CE6537A1-D6FC-4f65-9D91-7224C49458BB}">
+                <c15:layout/>
                 <c15:showDataLabelsRange val="1"/>
               </c:ext>
             </c:extLst>
@@ -675,6 +685,7 @@
     </c:plotArea>
     <c:legend>
       <c:legendPos val="b"/>
+      <c:layout/>
       <c:overlay val="0"/>
       <c:spPr>
         <a:noFill/>
@@ -840,7 +851,7 @@
                   <a:bodyPr/>
                   <a:lstStyle/>
                   <a:p>
-                    <a:fld id="{55F0F966-F07A-4E1A-BA59-82772D778BC4}" type="CELLRANGE">
+                    <a:fld id="{88B82770-29A3-425A-8D78-74E9A5901BE2}" type="CELLRANGE">
                       <a:rPr lang="en-US"/>
                       <a:pPr/>
                       <a:t>[CELLRANGE]</a:t>
@@ -849,7 +860,7 @@
                       <a:rPr lang="en-US" baseline="0"/>
                       <a:t>, </a:t>
                     </a:r>
-                    <a:fld id="{66EC45B9-B31E-48CD-B26F-4D4F799B696A}" type="VALUE">
+                    <a:fld id="{4C187787-BB32-4612-B370-8D28AEC36272}" type="VALUE">
                       <a:rPr lang="en-US" baseline="0"/>
                       <a:pPr/>
                       <a:t>[VALUE]</a:t>
@@ -883,7 +894,7 @@
                   <a:bodyPr/>
                   <a:lstStyle/>
                   <a:p>
-                    <a:fld id="{8B596B82-6926-4B21-95B1-1A07492B546A}" type="CELLRANGE">
+                    <a:fld id="{70562BED-CF36-4D36-B2D2-8B96A7266FCC}" type="CELLRANGE">
                       <a:rPr lang="en-US"/>
                       <a:pPr/>
                       <a:t>[CELLRANGE]</a:t>
@@ -892,7 +903,7 @@
                       <a:rPr lang="en-US" baseline="0"/>
                       <a:t>, </a:t>
                     </a:r>
-                    <a:fld id="{CEAA340A-C7A8-48D8-AC5F-F98B56914816}" type="VALUE">
+                    <a:fld id="{C60BCB25-A125-48B1-A1D2-0F5084446D23}" type="VALUE">
                       <a:rPr lang="en-US" baseline="0"/>
                       <a:pPr/>
                       <a:t>[VALUE]</a:t>
@@ -926,7 +937,7 @@
                   <a:bodyPr/>
                   <a:lstStyle/>
                   <a:p>
-                    <a:fld id="{5A3BC8AF-6EB5-4FD9-8F63-56F3818C946E}" type="CELLRANGE">
+                    <a:fld id="{D7B87490-6228-49DB-95A7-068A5D493236}" type="CELLRANGE">
                       <a:rPr lang="en-US"/>
                       <a:pPr/>
                       <a:t>[CELLRANGE]</a:t>
@@ -935,7 +946,7 @@
                       <a:rPr lang="en-US" baseline="0"/>
                       <a:t>, </a:t>
                     </a:r>
-                    <a:fld id="{86A8C33E-FCD6-4694-B387-EBE4A28AED05}" type="VALUE">
+                    <a:fld id="{8183C266-702C-4639-8843-B6254ADDA9FA}" type="VALUE">
                       <a:rPr lang="en-US" baseline="0"/>
                       <a:pPr/>
                       <a:t>[VALUE]</a:t>
@@ -969,7 +980,7 @@
                   <a:bodyPr/>
                   <a:lstStyle/>
                   <a:p>
-                    <a:fld id="{EAE0228A-D0BA-49EB-A786-4D3A78080838}" type="CELLRANGE">
+                    <a:fld id="{EC47E8BC-FAE0-478B-AEA6-6FA31A1BAAB0}" type="CELLRANGE">
                       <a:rPr lang="en-US"/>
                       <a:pPr/>
                       <a:t>[CELLRANGE]</a:t>
@@ -978,7 +989,7 @@
                       <a:rPr lang="en-US" baseline="0"/>
                       <a:t>, </a:t>
                     </a:r>
-                    <a:fld id="{E92F2C1D-815D-4C95-82BC-AA9E59C8378D}" type="VALUE">
+                    <a:fld id="{D2605D5F-2D16-4111-ACB0-AEB9C879AC38}" type="VALUE">
                       <a:rPr lang="en-US" baseline="0"/>
                       <a:pPr/>
                       <a:t>[VALUE]</a:t>
@@ -1012,7 +1023,7 @@
                   <a:bodyPr/>
                   <a:lstStyle/>
                   <a:p>
-                    <a:fld id="{27FED87D-8691-4185-B47F-2CF309ED2C9B}" type="CELLRANGE">
+                    <a:fld id="{7FF20169-114B-4548-88A3-C8400B7EA44E}" type="CELLRANGE">
                       <a:rPr lang="en-US"/>
                       <a:pPr/>
                       <a:t>[CELLRANGE]</a:t>
@@ -1021,7 +1032,7 @@
                       <a:rPr lang="en-US" baseline="0"/>
                       <a:t>, </a:t>
                     </a:r>
-                    <a:fld id="{364FD9B3-19F9-4F30-9C9B-7681651DDD0F}" type="VALUE">
+                    <a:fld id="{250AFA76-B058-4DA8-98DF-8305B109B77C}" type="VALUE">
                       <a:rPr lang="en-US" baseline="0"/>
                       <a:pPr/>
                       <a:t>[VALUE]</a:t>
@@ -1055,7 +1066,7 @@
                   <a:bodyPr/>
                   <a:lstStyle/>
                   <a:p>
-                    <a:fld id="{551F119B-9138-4E3E-9FA0-BC7DCBF415C0}" type="CELLRANGE">
+                    <a:fld id="{CABDC546-D199-4B2A-8762-AFBA1E071AE7}" type="CELLRANGE">
                       <a:rPr lang="en-US"/>
                       <a:pPr/>
                       <a:t>[CELLRANGE]</a:t>
@@ -1064,7 +1075,7 @@
                       <a:rPr lang="en-US" baseline="0"/>
                       <a:t>, </a:t>
                     </a:r>
-                    <a:fld id="{8185A819-008B-44CB-AC0E-EC1DFACF9118}" type="VALUE">
+                    <a:fld id="{BDF5419B-5AC7-45D3-9AB7-EA2ED082262C}" type="VALUE">
                       <a:rPr lang="en-US" baseline="0"/>
                       <a:pPr/>
                       <a:t>[VALUE]</a:t>
@@ -1098,7 +1109,7 @@
                   <a:bodyPr/>
                   <a:lstStyle/>
                   <a:p>
-                    <a:fld id="{0B2609FD-9790-4602-867B-BF775DCE9375}" type="CELLRANGE">
+                    <a:fld id="{B17D22E9-78A9-4B99-B537-1580F5A00D34}" type="CELLRANGE">
                       <a:rPr lang="en-US"/>
                       <a:pPr/>
                       <a:t>[CELLRANGE]</a:t>
@@ -1107,7 +1118,7 @@
                       <a:rPr lang="en-US" baseline="0"/>
                       <a:t>, </a:t>
                     </a:r>
-                    <a:fld id="{A0B98715-A13F-4B7D-939A-1F6BEE752F94}" type="VALUE">
+                    <a:fld id="{4710120B-6F5C-4180-898A-48D55D05C437}" type="VALUE">
                       <a:rPr lang="en-US" baseline="0"/>
                       <a:pPr/>
                       <a:t>[VALUE]</a:t>
@@ -2717,7 +2728,7 @@
                   <a:bodyPr/>
                   <a:lstStyle/>
                   <a:p>
-                    <a:fld id="{EF2D201C-CA0D-4779-B3DF-591A8F830F64}" type="CELLRANGE">
+                    <a:fld id="{1B7FE334-07D2-4D91-BA48-CE64F5C63C88}" type="CELLRANGE">
                       <a:rPr lang="en-US"/>
                       <a:pPr/>
                       <a:t>[CELLRANGE]</a:t>
@@ -2726,7 +2737,7 @@
                       <a:rPr lang="en-US" baseline="0"/>
                       <a:t>, </a:t>
                     </a:r>
-                    <a:fld id="{64FBB868-E45D-4FAD-8DA2-126E261C4FE2}" type="VALUE">
+                    <a:fld id="{506C6310-505A-4A64-8938-5B2FE1F2C777}" type="VALUE">
                       <a:rPr lang="en-US" baseline="0"/>
                       <a:pPr/>
                       <a:t>[VALUE]</a:t>
@@ -2760,7 +2771,7 @@
                   <a:bodyPr/>
                   <a:lstStyle/>
                   <a:p>
-                    <a:fld id="{16C6E15E-0B82-4E62-8121-00D895FC5498}" type="CELLRANGE">
+                    <a:fld id="{E7050358-5D7B-4C67-B6E5-1E9B5288E980}" type="CELLRANGE">
                       <a:rPr lang="en-US"/>
                       <a:pPr/>
                       <a:t>[CELLRANGE]</a:t>
@@ -2769,7 +2780,7 @@
                       <a:rPr lang="en-US" baseline="0"/>
                       <a:t>, </a:t>
                     </a:r>
-                    <a:fld id="{19750769-92DE-49B2-BD7F-2A27B405CF43}" type="VALUE">
+                    <a:fld id="{20E982C8-2734-4D4A-8C48-BDCC773A5D02}" type="VALUE">
                       <a:rPr lang="en-US" baseline="0"/>
                       <a:pPr/>
                       <a:t>[VALUE]</a:t>
@@ -10408,11 +10419,6 @@
               </a:rPr>
               <a:t>Determine if the pre and post consultation times are trending positively or negatively.</a:t>
             </a:r>
-            <a:endParaRPr lang="en-US" sz="2400" dirty="0" smtClean="0">
-              <a:solidFill>
-                <a:schemeClr val="tx1"/>
-              </a:solidFill>
-            </a:endParaRPr>
           </a:p>
         </p:txBody>
       </p:sp>

</xml_diff>